<commit_message>
version used for dry ryn
</commit_message>
<xml_diff>
--- a/instructors/11-Version_Control_BT.pptx
+++ b/instructors/11-Version_Control_BT.pptx
@@ -5,19 +5,29 @@
     <p:sldMasterId id="2147483648" r:id="rId1"/>
   </p:sldMasterIdLst>
   <p:notesMasterIdLst>
-    <p:notesMasterId r:id="rId12"/>
+    <p:notesMasterId r:id="rId22"/>
   </p:notesMasterIdLst>
   <p:sldIdLst>
-    <p:sldId id="256" r:id="rId2"/>
-    <p:sldId id="259" r:id="rId3"/>
-    <p:sldId id="274" r:id="rId4"/>
-    <p:sldId id="271" r:id="rId5"/>
-    <p:sldId id="273" r:id="rId6"/>
-    <p:sldId id="272" r:id="rId7"/>
-    <p:sldId id="262" r:id="rId8"/>
-    <p:sldId id="258" r:id="rId9"/>
-    <p:sldId id="269" r:id="rId10"/>
-    <p:sldId id="275" r:id="rId11"/>
+    <p:sldId id="276" r:id="rId2"/>
+    <p:sldId id="256" r:id="rId3"/>
+    <p:sldId id="259" r:id="rId4"/>
+    <p:sldId id="274" r:id="rId5"/>
+    <p:sldId id="278" r:id="rId6"/>
+    <p:sldId id="277" r:id="rId7"/>
+    <p:sldId id="271" r:id="rId8"/>
+    <p:sldId id="280" r:id="rId9"/>
+    <p:sldId id="279" r:id="rId10"/>
+    <p:sldId id="273" r:id="rId11"/>
+    <p:sldId id="281" r:id="rId12"/>
+    <p:sldId id="262" r:id="rId13"/>
+    <p:sldId id="272" r:id="rId14"/>
+    <p:sldId id="258" r:id="rId15"/>
+    <p:sldId id="269" r:id="rId16"/>
+    <p:sldId id="282" r:id="rId17"/>
+    <p:sldId id="283" r:id="rId18"/>
+    <p:sldId id="275" r:id="rId19"/>
+    <p:sldId id="284" r:id="rId20"/>
+    <p:sldId id="285" r:id="rId21"/>
   </p:sldIdLst>
   <p:sldSz cx="12192000" cy="6858000"/>
   <p:notesSz cx="6858000" cy="9144000"/>
@@ -206,7 +216,7 @@
           <a:p>
             <a:fld id="{585C48AE-4A1E-9A43-835F-510354165F99}" type="datetimeFigureOut">
               <a:rPr lang="en-GB" smtClean="0"/>
-              <a:t>01/09/2021</a:t>
+              <a:t>06/09/2021</a:t>
             </a:fld>
             <a:endParaRPr lang="en-GB"/>
           </a:p>
@@ -604,7 +614,7 @@
           <a:p>
             <a:fld id="{B361C124-7373-F149-A166-BB8240B9FE77}" type="slidenum">
               <a:rPr lang="en-GB" smtClean="0"/>
-              <a:t>8</a:t>
+              <a:t>14</a:t>
             </a:fld>
             <a:endParaRPr lang="en-GB"/>
           </a:p>
@@ -772,7 +782,7 @@
           <a:p>
             <a:fld id="{5913FB77-D8DB-4AB9-8EA5-EE8C3B57A5E1}" type="datetimeFigureOut">
               <a:rPr lang="en-GB" smtClean="0"/>
-              <a:t>01/09/2021</a:t>
+              <a:t>06/09/2021</a:t>
             </a:fld>
             <a:endParaRPr lang="en-GB"/>
           </a:p>
@@ -972,7 +982,7 @@
           <a:p>
             <a:fld id="{5913FB77-D8DB-4AB9-8EA5-EE8C3B57A5E1}" type="datetimeFigureOut">
               <a:rPr lang="en-GB" smtClean="0"/>
-              <a:t>01/09/2021</a:t>
+              <a:t>06/09/2021</a:t>
             </a:fld>
             <a:endParaRPr lang="en-GB"/>
           </a:p>
@@ -1182,7 +1192,7 @@
           <a:p>
             <a:fld id="{5913FB77-D8DB-4AB9-8EA5-EE8C3B57A5E1}" type="datetimeFigureOut">
               <a:rPr lang="en-GB" smtClean="0"/>
-              <a:t>01/09/2021</a:t>
+              <a:t>06/09/2021</a:t>
             </a:fld>
             <a:endParaRPr lang="en-GB"/>
           </a:p>
@@ -1382,7 +1392,7 @@
           <a:p>
             <a:fld id="{5913FB77-D8DB-4AB9-8EA5-EE8C3B57A5E1}" type="datetimeFigureOut">
               <a:rPr lang="en-GB" smtClean="0"/>
-              <a:t>01/09/2021</a:t>
+              <a:t>06/09/2021</a:t>
             </a:fld>
             <a:endParaRPr lang="en-GB"/>
           </a:p>
@@ -1658,7 +1668,7 @@
           <a:p>
             <a:fld id="{5913FB77-D8DB-4AB9-8EA5-EE8C3B57A5E1}" type="datetimeFigureOut">
               <a:rPr lang="en-GB" smtClean="0"/>
-              <a:t>01/09/2021</a:t>
+              <a:t>06/09/2021</a:t>
             </a:fld>
             <a:endParaRPr lang="en-GB"/>
           </a:p>
@@ -1926,7 +1936,7 @@
           <a:p>
             <a:fld id="{5913FB77-D8DB-4AB9-8EA5-EE8C3B57A5E1}" type="datetimeFigureOut">
               <a:rPr lang="en-GB" smtClean="0"/>
-              <a:t>01/09/2021</a:t>
+              <a:t>06/09/2021</a:t>
             </a:fld>
             <a:endParaRPr lang="en-GB"/>
           </a:p>
@@ -2341,7 +2351,7 @@
           <a:p>
             <a:fld id="{5913FB77-D8DB-4AB9-8EA5-EE8C3B57A5E1}" type="datetimeFigureOut">
               <a:rPr lang="en-GB" smtClean="0"/>
-              <a:t>01/09/2021</a:t>
+              <a:t>06/09/2021</a:t>
             </a:fld>
             <a:endParaRPr lang="en-GB"/>
           </a:p>
@@ -2483,7 +2493,7 @@
           <a:p>
             <a:fld id="{5913FB77-D8DB-4AB9-8EA5-EE8C3B57A5E1}" type="datetimeFigureOut">
               <a:rPr lang="en-GB" smtClean="0"/>
-              <a:t>01/09/2021</a:t>
+              <a:t>06/09/2021</a:t>
             </a:fld>
             <a:endParaRPr lang="en-GB"/>
           </a:p>
@@ -2596,7 +2606,7 @@
           <a:p>
             <a:fld id="{5913FB77-D8DB-4AB9-8EA5-EE8C3B57A5E1}" type="datetimeFigureOut">
               <a:rPr lang="en-GB" smtClean="0"/>
-              <a:t>01/09/2021</a:t>
+              <a:t>06/09/2021</a:t>
             </a:fld>
             <a:endParaRPr lang="en-GB"/>
           </a:p>
@@ -2909,7 +2919,7 @@
           <a:p>
             <a:fld id="{5913FB77-D8DB-4AB9-8EA5-EE8C3B57A5E1}" type="datetimeFigureOut">
               <a:rPr lang="en-GB" smtClean="0"/>
-              <a:t>01/09/2021</a:t>
+              <a:t>06/09/2021</a:t>
             </a:fld>
             <a:endParaRPr lang="en-GB"/>
           </a:p>
@@ -3198,7 +3208,7 @@
           <a:p>
             <a:fld id="{5913FB77-D8DB-4AB9-8EA5-EE8C3B57A5E1}" type="datetimeFigureOut">
               <a:rPr lang="en-GB" smtClean="0"/>
-              <a:t>01/09/2021</a:t>
+              <a:t>06/09/2021</a:t>
             </a:fld>
             <a:endParaRPr lang="en-GB"/>
           </a:p>
@@ -3441,7 +3451,7 @@
           <a:p>
             <a:fld id="{5913FB77-D8DB-4AB9-8EA5-EE8C3B57A5E1}" type="datetimeFigureOut">
               <a:rPr lang="en-GB" smtClean="0"/>
-              <a:t>01/09/2021</a:t>
+              <a:t>06/09/2021</a:t>
             </a:fld>
             <a:endParaRPr lang="en-GB"/>
           </a:p>
@@ -3872,8 +3882,8 @@
         </p:nvSpPr>
         <p:spPr>
           <a:xfrm>
-            <a:off x="1691559" y="444110"/>
-            <a:ext cx="3648115" cy="769441"/>
+            <a:off x="2626807" y="2338224"/>
+            <a:ext cx="5879366" cy="769441"/>
           </a:xfrm>
           <a:prstGeom prst="rect">
             <a:avLst/>
@@ -3888,13 +3898,18 @@
           <a:p>
             <a:pPr algn="ctr"/>
             <a:r>
-              <a:rPr lang="en-GB" sz="4400" dirty="0">
-                <a:solidFill>
-                  <a:srgbClr val="0070C0"/>
-                </a:solidFill>
-              </a:rPr>
-              <a:t>Version control</a:t>
-            </a:r>
+              <a:rPr lang="pl-PL" sz="4400" dirty="0" smtClean="0">
+                <a:solidFill>
+                  <a:srgbClr val="0070C0"/>
+                </a:solidFill>
+              </a:rPr>
+              <a:t>Keeping track of changes</a:t>
+            </a:r>
+            <a:endParaRPr lang="en-GB" sz="4400" dirty="0">
+              <a:solidFill>
+                <a:srgbClr val="0070C0"/>
+              </a:solidFill>
+            </a:endParaRPr>
           </a:p>
         </p:txBody>
       </p:sp>
@@ -3913,7 +3928,7 @@
           <p:nvPr/>
         </p:nvPicPr>
         <p:blipFill>
-          <a:blip r:embed="rId2">
+          <a:blip r:embed="rId2" cstate="hqprint">
             <a:extLst>
               <a:ext uri="{28A0092B-C50C-407E-A947-70E740481C1C}">
                 <a14:useLocalDpi xmlns:a14="http://schemas.microsoft.com/office/drawing/2010/main" val="0"/>
@@ -4043,46 +4058,10 @@
           </a:p>
         </p:txBody>
       </p:sp>
-      <p:pic>
-        <p:nvPicPr>
-          <p:cNvPr id="3" name="Picture 2" descr="A picture containing timeline&#10;&#10;Description automatically generated">
-            <a:extLst>
-              <a:ext uri="{FF2B5EF4-FFF2-40B4-BE49-F238E27FC236}">
-                <a16:creationId xmlns:a16="http://schemas.microsoft.com/office/drawing/2014/main" id="{1C04F944-4E8A-2C43-982D-560B3A1FBC6B}"/>
-              </a:ext>
-            </a:extLst>
-          </p:cNvPr>
-          <p:cNvPicPr>
-            <a:picLocks noChangeAspect="1"/>
-          </p:cNvPicPr>
-          <p:nvPr/>
-        </p:nvPicPr>
-        <p:blipFill>
-          <a:blip r:embed="rId4">
-            <a:extLst>
-              <a:ext uri="{28A0092B-C50C-407E-A947-70E740481C1C}">
-                <a14:useLocalDpi xmlns:a14="http://schemas.microsoft.com/office/drawing/2010/main" val="0"/>
-              </a:ext>
-            </a:extLst>
-          </a:blip>
-          <a:stretch>
-            <a:fillRect/>
-          </a:stretch>
-        </p:blipFill>
-        <p:spPr>
-          <a:xfrm>
-            <a:off x="5557651" y="1"/>
-            <a:ext cx="5144265" cy="6869196"/>
-          </a:xfrm>
-          <a:prstGeom prst="rect">
-            <a:avLst/>
-          </a:prstGeom>
-        </p:spPr>
-      </p:pic>
     </p:spTree>
     <p:extLst>
       <p:ext uri="{BB962C8B-B14F-4D97-AF65-F5344CB8AC3E}">
-        <p14:creationId xmlns:p14="http://schemas.microsoft.com/office/powerpoint/2010/main" val="2061045459"/>
+        <p14:creationId xmlns:p14="http://schemas.microsoft.com/office/powerpoint/2010/main" val="1131350777"/>
       </p:ext>
     </p:extLst>
   </p:cSld>
@@ -4109,48 +4088,70 @@
           <a:chExt cx="0" cy="0"/>
         </a:xfrm>
       </p:grpSpPr>
-      <p:pic>
-        <p:nvPicPr>
-          <p:cNvPr id="8" name="Picture 7" descr="Diagram&#10;&#10;Description automatically generated with medium confidence">
-            <a:extLst>
-              <a:ext uri="{FF2B5EF4-FFF2-40B4-BE49-F238E27FC236}">
-                <a16:creationId xmlns:a16="http://schemas.microsoft.com/office/drawing/2014/main" id="{241EA632-9D85-9640-A37E-8140E49B7B2C}"/>
-              </a:ext>
-            </a:extLst>
-          </p:cNvPr>
-          <p:cNvPicPr>
-            <a:picLocks noChangeAspect="1"/>
-          </p:cNvPicPr>
+      <p:sp>
+        <p:nvSpPr>
+          <p:cNvPr id="5" name="TextBox 4">
+            <a:extLst>
+              <a:ext uri="{FF2B5EF4-FFF2-40B4-BE49-F238E27FC236}">
+                <a16:creationId xmlns:a16="http://schemas.microsoft.com/office/drawing/2014/main" id="{3A7A1F5C-9C70-4DE3-BA39-7835B2935EB3}"/>
+              </a:ext>
+            </a:extLst>
+          </p:cNvPr>
+          <p:cNvSpPr txBox="1"/>
           <p:nvPr/>
-        </p:nvPicPr>
-        <p:blipFill>
-          <a:blip r:embed="rId2">
-            <a:extLst>
-              <a:ext uri="{28A0092B-C50C-407E-A947-70E740481C1C}">
-                <a14:useLocalDpi xmlns:a14="http://schemas.microsoft.com/office/drawing/2010/main" val="0"/>
-              </a:ext>
-            </a:extLst>
-          </a:blip>
-          <a:stretch>
-            <a:fillRect/>
-          </a:stretch>
-        </p:blipFill>
+        </p:nvSpPr>
         <p:spPr>
           <a:xfrm>
-            <a:off x="4122965" y="2693128"/>
-            <a:ext cx="6697705" cy="4090981"/>
+            <a:off x="1363735" y="1129464"/>
+            <a:ext cx="9464530" cy="1384995"/>
           </a:xfrm>
           <a:prstGeom prst="rect">
             <a:avLst/>
           </a:prstGeom>
+          <a:noFill/>
         </p:spPr>
-      </p:pic>
+        <p:txBody>
+          <a:bodyPr wrap="square">
+            <a:spAutoFit/>
+          </a:bodyPr>
+          <a:lstStyle/>
+          <a:p>
+            <a:r>
+              <a:rPr lang="en-GB" sz="2800" dirty="0">
+                <a:solidFill>
+                  <a:srgbClr val="0070C0"/>
+                </a:solidFill>
+              </a:rPr>
+              <a:t>Exercise 2: </a:t>
+            </a:r>
+          </a:p>
+          <a:p>
+            <a:pPr algn="ctr"/>
+            <a:endParaRPr lang="en-GB" sz="2800" dirty="0">
+              <a:solidFill>
+                <a:srgbClr val="0070C0"/>
+              </a:solidFill>
+            </a:endParaRPr>
+          </a:p>
+          <a:p>
+            <a:pPr algn="ctr"/>
+            <a:r>
+              <a:rPr lang="en-GB" sz="2800" dirty="0">
+                <a:solidFill>
+                  <a:srgbClr val="0070C0"/>
+                </a:solidFill>
+              </a:rPr>
+              <a:t>Manual versioning</a:t>
+            </a:r>
+          </a:p>
+        </p:txBody>
+      </p:sp>
       <p:pic>
         <p:nvPicPr>
-          <p:cNvPr id="6" name="Picture 2" descr="Ed_DaSH">
-            <a:extLst>
-              <a:ext uri="{FF2B5EF4-FFF2-40B4-BE49-F238E27FC236}">
-                <a16:creationId xmlns:a16="http://schemas.microsoft.com/office/drawing/2014/main" id="{6F3CF586-06D2-46C3-A4A3-130E31C4A16F}"/>
+          <p:cNvPr id="4" name="Picture 2" descr="Ed_DaSH">
+            <a:extLst>
+              <a:ext uri="{FF2B5EF4-FFF2-40B4-BE49-F238E27FC236}">
+                <a16:creationId xmlns:a16="http://schemas.microsoft.com/office/drawing/2014/main" id="{A783256F-E39E-4712-96B0-240BD611CFEB}"/>
               </a:ext>
             </a:extLst>
           </p:cNvPr>
@@ -4160,7 +4161,7 @@
           <p:nvPr/>
         </p:nvPicPr>
         <p:blipFill>
-          <a:blip r:embed="rId3">
+          <a:blip r:embed="rId2" cstate="hqprint">
             <a:extLst>
               <a:ext uri="{28A0092B-C50C-407E-A947-70E740481C1C}">
                 <a14:useLocalDpi xmlns:a14="http://schemas.microsoft.com/office/drawing/2010/main" val="0"/>
@@ -4192,85 +4193,10 @@
           </a:extLst>
         </p:spPr>
       </p:pic>
-      <p:pic>
-        <p:nvPicPr>
-          <p:cNvPr id="3" name="Picture 2" descr="Diagram&#10;&#10;Description automatically generated">
-            <a:extLst>
-              <a:ext uri="{FF2B5EF4-FFF2-40B4-BE49-F238E27FC236}">
-                <a16:creationId xmlns:a16="http://schemas.microsoft.com/office/drawing/2014/main" id="{123E5C8E-6DF3-BA4D-A341-65A34873C501}"/>
-              </a:ext>
-            </a:extLst>
-          </p:cNvPr>
-          <p:cNvPicPr>
-            <a:picLocks noChangeAspect="1"/>
-          </p:cNvPicPr>
-          <p:nvPr/>
-        </p:nvPicPr>
-        <p:blipFill rotWithShape="1">
-          <a:blip r:embed="rId4">
-            <a:extLst>
-              <a:ext uri="{28A0092B-C50C-407E-A947-70E740481C1C}">
-                <a14:useLocalDpi xmlns:a14="http://schemas.microsoft.com/office/drawing/2010/main" val="0"/>
-              </a:ext>
-            </a:extLst>
-          </a:blip>
-          <a:srcRect b="4944"/>
-          <a:stretch/>
-        </p:blipFill>
-        <p:spPr>
-          <a:xfrm>
-            <a:off x="82116" y="288355"/>
-            <a:ext cx="6697705" cy="2996987"/>
-          </a:xfrm>
-          <a:prstGeom prst="rect">
-            <a:avLst/>
-          </a:prstGeom>
-        </p:spPr>
-      </p:pic>
-      <p:sp>
-        <p:nvSpPr>
-          <p:cNvPr id="4" name="TextBox 3">
-            <a:extLst>
-              <a:ext uri="{FF2B5EF4-FFF2-40B4-BE49-F238E27FC236}">
-                <a16:creationId xmlns:a16="http://schemas.microsoft.com/office/drawing/2014/main" id="{F4B0FDD5-5348-354F-A378-7241F2AF057B}"/>
-              </a:ext>
-            </a:extLst>
-          </p:cNvPr>
-          <p:cNvSpPr txBox="1"/>
-          <p:nvPr/>
-        </p:nvSpPr>
-        <p:spPr>
-          <a:xfrm>
-            <a:off x="6041348" y="379920"/>
-            <a:ext cx="4779322" cy="769441"/>
-          </a:xfrm>
-          <a:prstGeom prst="rect">
-            <a:avLst/>
-          </a:prstGeom>
-          <a:noFill/>
-        </p:spPr>
-        <p:txBody>
-          <a:bodyPr wrap="none" rtlCol="0">
-            <a:spAutoFit/>
-          </a:bodyPr>
-          <a:lstStyle/>
-          <a:p>
-            <a:pPr algn="ctr"/>
-            <a:r>
-              <a:rPr lang="en-GB" sz="4400" dirty="0">
-                <a:solidFill>
-                  <a:srgbClr val="0070C0"/>
-                </a:solidFill>
-              </a:rPr>
-              <a:t>Semantic versioning</a:t>
-            </a:r>
-          </a:p>
-        </p:txBody>
-      </p:sp>
     </p:spTree>
     <p:extLst>
       <p:ext uri="{BB962C8B-B14F-4D97-AF65-F5344CB8AC3E}">
-        <p14:creationId xmlns:p14="http://schemas.microsoft.com/office/powerpoint/2010/main" val="1474349348"/>
+        <p14:creationId xmlns:p14="http://schemas.microsoft.com/office/powerpoint/2010/main" val="373317662"/>
       </p:ext>
     </p:extLst>
   </p:cSld>
@@ -4280,7 +4206,7 @@
 </p:sld>
 </file>
 
-<file path=ppt/slides/slide2.xml><?xml version="1.0" encoding="utf-8"?>
+<file path=ppt/slides/slide11.xml><?xml version="1.0" encoding="utf-8"?>
 <p:sld xmlns:a="http://schemas.openxmlformats.org/drawingml/2006/main" xmlns:r="http://schemas.openxmlformats.org/officeDocument/2006/relationships" xmlns:p="http://schemas.openxmlformats.org/presentationml/2006/main">
   <p:cSld>
     <p:spTree>
@@ -4311,8 +4237,8 @@
         </p:nvSpPr>
         <p:spPr>
           <a:xfrm>
-            <a:off x="1138104" y="1569406"/>
-            <a:ext cx="9464530" cy="2246769"/>
+            <a:off x="1363735" y="1129464"/>
+            <a:ext cx="9464530" cy="954107"/>
           </a:xfrm>
           <a:prstGeom prst="rect">
             <a:avLst/>
@@ -4326,15 +4252,13 @@
           <a:lstStyle/>
           <a:p>
             <a:r>
-              <a:rPr lang="en-GB" sz="2800" dirty="0">
-                <a:solidFill>
-                  <a:srgbClr val="0070C0"/>
-                </a:solidFill>
-              </a:rPr>
-              <a:t>Projects are not static, and actions introduce changes.</a:t>
-            </a:r>
-          </a:p>
-          <a:p>
+              <a:rPr lang="en-GB" sz="2800" dirty="0" smtClean="0">
+                <a:solidFill>
+                  <a:srgbClr val="0070C0"/>
+                </a:solidFill>
+              </a:rPr>
+              <a:t> </a:t>
+            </a:r>
             <a:endParaRPr lang="en-GB" sz="2800" dirty="0">
               <a:solidFill>
                 <a:srgbClr val="0070C0"/>
@@ -4342,23 +4266,21 @@
             </a:endParaRPr>
           </a:p>
           <a:p>
-            <a:r>
-              <a:rPr lang="en-GB" sz="2800" dirty="0">
-                <a:solidFill>
-                  <a:srgbClr val="0070C0"/>
-                </a:solidFill>
-              </a:rPr>
-              <a:t>With version control, file names do not reflect their versions. Information about versions and changes are kept separate from the files.</a:t>
-            </a:r>
+            <a:pPr algn="ctr"/>
+            <a:endParaRPr lang="en-GB" sz="2800" dirty="0">
+              <a:solidFill>
+                <a:srgbClr val="0070C0"/>
+              </a:solidFill>
+            </a:endParaRPr>
           </a:p>
         </p:txBody>
       </p:sp>
       <p:pic>
         <p:nvPicPr>
-          <p:cNvPr id="6" name="Picture 2" descr="Ed_DaSH">
-            <a:extLst>
-              <a:ext uri="{FF2B5EF4-FFF2-40B4-BE49-F238E27FC236}">
-                <a16:creationId xmlns:a16="http://schemas.microsoft.com/office/drawing/2014/main" id="{6F3CF586-06D2-46C3-A4A3-130E31C4A16F}"/>
+          <p:cNvPr id="4" name="Picture 2" descr="Ed_DaSH">
+            <a:extLst>
+              <a:ext uri="{FF2B5EF4-FFF2-40B4-BE49-F238E27FC236}">
+                <a16:creationId xmlns:a16="http://schemas.microsoft.com/office/drawing/2014/main" id="{A783256F-E39E-4712-96B0-240BD611CFEB}"/>
               </a:ext>
             </a:extLst>
           </p:cNvPr>
@@ -4368,7 +4290,7 @@
           <p:nvPr/>
         </p:nvPicPr>
         <p:blipFill>
-          <a:blip r:embed="rId2">
+          <a:blip r:embed="rId2" cstate="hqprint">
             <a:extLst>
               <a:ext uri="{28A0092B-C50C-407E-A947-70E740481C1C}">
                 <a14:useLocalDpi xmlns:a14="http://schemas.microsoft.com/office/drawing/2010/main" val="0"/>
@@ -4400,10 +4322,33 @@
           </a:extLst>
         </p:spPr>
       </p:pic>
+      <p:pic>
+        <p:nvPicPr>
+          <p:cNvPr id="2" name="Picture 1"/>
+          <p:cNvPicPr>
+            <a:picLocks noChangeAspect="1"/>
+          </p:cNvPicPr>
+          <p:nvPr/>
+        </p:nvPicPr>
+        <p:blipFill rotWithShape="1">
+          <a:blip r:embed="rId3"/>
+          <a:srcRect l="26992" t="38599" r="26269" b="22850"/>
+          <a:stretch/>
+        </p:blipFill>
+        <p:spPr>
+          <a:xfrm>
+            <a:off x="231936" y="698863"/>
+            <a:ext cx="10797540" cy="5009606"/>
+          </a:xfrm>
+          <a:prstGeom prst="rect">
+            <a:avLst/>
+          </a:prstGeom>
+        </p:spPr>
+      </p:pic>
     </p:spTree>
     <p:extLst>
       <p:ext uri="{BB962C8B-B14F-4D97-AF65-F5344CB8AC3E}">
-        <p14:creationId xmlns:p14="http://schemas.microsoft.com/office/powerpoint/2010/main" val="4286087962"/>
+        <p14:creationId xmlns:p14="http://schemas.microsoft.com/office/powerpoint/2010/main" val="3233573493"/>
       </p:ext>
     </p:extLst>
   </p:cSld>
@@ -4413,7 +4358,7 @@
 </p:sld>
 </file>
 
-<file path=ppt/slides/slide3.xml><?xml version="1.0" encoding="utf-8"?>
+<file path=ppt/slides/slide12.xml><?xml version="1.0" encoding="utf-8"?>
 <p:sld xmlns:a="http://schemas.openxmlformats.org/drawingml/2006/main" xmlns:r="http://schemas.openxmlformats.org/officeDocument/2006/relationships" xmlns:p="http://schemas.openxmlformats.org/presentationml/2006/main">
   <p:cSld>
     <p:spTree>
@@ -4464,7 +4409,7 @@
                   <a:srgbClr val="0070C0"/>
                 </a:solidFill>
               </a:rPr>
-              <a:t>Exercise 1: </a:t>
+              <a:t>Exercise 3: </a:t>
             </a:r>
           </a:p>
           <a:p>
@@ -4483,7 +4428,7 @@
                   <a:srgbClr val="0070C0"/>
                 </a:solidFill>
               </a:rPr>
-              <a:t>Problems with a change</a:t>
+              <a:t>Changelog in action</a:t>
             </a:r>
           </a:p>
         </p:txBody>
@@ -4503,7 +4448,7 @@
           <p:nvPr/>
         </p:nvPicPr>
         <p:blipFill>
-          <a:blip r:embed="rId2">
+          <a:blip r:embed="rId2" cstate="hqprint">
             <a:extLst>
               <a:ext uri="{28A0092B-C50C-407E-A947-70E740481C1C}">
                 <a14:useLocalDpi xmlns:a14="http://schemas.microsoft.com/office/drawing/2010/main" val="0"/>
@@ -4538,7 +4483,7 @@
     </p:spTree>
     <p:extLst>
       <p:ext uri="{BB962C8B-B14F-4D97-AF65-F5344CB8AC3E}">
-        <p14:creationId xmlns:p14="http://schemas.microsoft.com/office/powerpoint/2010/main" val="2280054951"/>
+        <p14:creationId xmlns:p14="http://schemas.microsoft.com/office/powerpoint/2010/main" val="1908239480"/>
       </p:ext>
     </p:extLst>
   </p:cSld>
@@ -4548,373 +4493,7 @@
 </p:sld>
 </file>
 
-<file path=ppt/slides/slide4.xml><?xml version="1.0" encoding="utf-8"?>
-<p:sld xmlns:a="http://schemas.openxmlformats.org/drawingml/2006/main" xmlns:r="http://schemas.openxmlformats.org/officeDocument/2006/relationships" xmlns:p="http://schemas.openxmlformats.org/presentationml/2006/main">
-  <p:cSld>
-    <p:spTree>
-      <p:nvGrpSpPr>
-        <p:cNvPr id="1" name=""/>
-        <p:cNvGrpSpPr/>
-        <p:nvPr/>
-      </p:nvGrpSpPr>
-      <p:grpSpPr>
-        <a:xfrm>
-          <a:off x="0" y="0"/>
-          <a:ext cx="0" cy="0"/>
-          <a:chOff x="0" y="0"/>
-          <a:chExt cx="0" cy="0"/>
-        </a:xfrm>
-      </p:grpSpPr>
-      <p:sp>
-        <p:nvSpPr>
-          <p:cNvPr id="5" name="TextBox 4">
-            <a:extLst>
-              <a:ext uri="{FF2B5EF4-FFF2-40B4-BE49-F238E27FC236}">
-                <a16:creationId xmlns:a16="http://schemas.microsoft.com/office/drawing/2014/main" id="{3A7A1F5C-9C70-4DE3-BA39-7835B2935EB3}"/>
-              </a:ext>
-            </a:extLst>
-          </p:cNvPr>
-          <p:cNvSpPr txBox="1"/>
-          <p:nvPr/>
-        </p:nvSpPr>
-        <p:spPr>
-          <a:xfrm>
-            <a:off x="1138104" y="1569406"/>
-            <a:ext cx="9464530" cy="3970318"/>
-          </a:xfrm>
-          <a:prstGeom prst="rect">
-            <a:avLst/>
-          </a:prstGeom>
-          <a:noFill/>
-        </p:spPr>
-        <p:txBody>
-          <a:bodyPr wrap="square">
-            <a:spAutoFit/>
-          </a:bodyPr>
-          <a:lstStyle/>
-          <a:p>
-            <a:pPr marL="514350" indent="-514350" algn="just">
-              <a:buAutoNum type="arabicPeriod"/>
-            </a:pPr>
-            <a:r>
-              <a:rPr lang="en-GB" sz="2800" dirty="0">
-                <a:solidFill>
-                  <a:srgbClr val="0070C0"/>
-                </a:solidFill>
-              </a:rPr>
-              <a:t>Add a file called ’</a:t>
-            </a:r>
-            <a:r>
-              <a:rPr lang="en-GB" sz="2800" dirty="0" err="1">
-                <a:solidFill>
-                  <a:srgbClr val="0070C0"/>
-                </a:solidFill>
-              </a:rPr>
-              <a:t>CHANGELOG.txt</a:t>
-            </a:r>
-            <a:r>
-              <a:rPr lang="en-GB" sz="2800" dirty="0">
-                <a:solidFill>
-                  <a:srgbClr val="0070C0"/>
-                </a:solidFill>
-              </a:rPr>
-              <a:t>’ to the project's subfolder, and make dated notes about changes in reverse chronological order. </a:t>
-            </a:r>
-          </a:p>
-          <a:p>
-            <a:pPr marL="514350" indent="-514350" algn="just">
-              <a:buFontTx/>
-              <a:buAutoNum type="arabicPeriod"/>
-            </a:pPr>
-            <a:r>
-              <a:rPr lang="en-GB" sz="2800" dirty="0">
-                <a:solidFill>
-                  <a:srgbClr val="0070C0"/>
-                </a:solidFill>
-              </a:rPr>
-              <a:t>Copy the entire project whenever a significant change is made, and store in a sub-folder.</a:t>
-            </a:r>
-          </a:p>
-          <a:p>
-            <a:pPr marL="514350" indent="-514350" algn="just">
-              <a:buFontTx/>
-              <a:buAutoNum type="arabicPeriod"/>
-            </a:pPr>
-            <a:r>
-              <a:rPr lang="en-GB" sz="2800" dirty="0">
-                <a:solidFill>
-                  <a:srgbClr val="0070C0"/>
-                </a:solidFill>
-              </a:rPr>
-              <a:t>Keep changes small.</a:t>
-            </a:r>
-          </a:p>
-          <a:p>
-            <a:pPr marL="514350" indent="-514350" algn="just">
-              <a:buFontTx/>
-              <a:buAutoNum type="arabicPeriod"/>
-            </a:pPr>
-            <a:r>
-              <a:rPr lang="en-GB" sz="2800" dirty="0">
-                <a:solidFill>
-                  <a:srgbClr val="0070C0"/>
-                </a:solidFill>
-              </a:rPr>
-              <a:t>Store each project in a folder that is mirrored off the researcher's working machine</a:t>
-            </a:r>
-          </a:p>
-          <a:p>
-            <a:pPr marL="514350" indent="-514350" algn="just">
-              <a:buFontTx/>
-              <a:buAutoNum type="arabicPeriod"/>
-            </a:pPr>
-            <a:r>
-              <a:rPr lang="en-GB" sz="2800" dirty="0">
-                <a:solidFill>
-                  <a:srgbClr val="0070C0"/>
-                </a:solidFill>
-              </a:rPr>
-              <a:t>Share changes frequently.</a:t>
-            </a:r>
-          </a:p>
-        </p:txBody>
-      </p:sp>
-      <p:pic>
-        <p:nvPicPr>
-          <p:cNvPr id="6" name="Picture 2" descr="Ed_DaSH">
-            <a:extLst>
-              <a:ext uri="{FF2B5EF4-FFF2-40B4-BE49-F238E27FC236}">
-                <a16:creationId xmlns:a16="http://schemas.microsoft.com/office/drawing/2014/main" id="{6F3CF586-06D2-46C3-A4A3-130E31C4A16F}"/>
-              </a:ext>
-            </a:extLst>
-          </p:cNvPr>
-          <p:cNvPicPr>
-            <a:picLocks noChangeAspect="1" noChangeArrowheads="1"/>
-          </p:cNvPicPr>
-          <p:nvPr/>
-        </p:nvPicPr>
-        <p:blipFill>
-          <a:blip r:embed="rId2">
-            <a:extLst>
-              <a:ext uri="{28A0092B-C50C-407E-A947-70E740481C1C}">
-                <a14:useLocalDpi xmlns:a14="http://schemas.microsoft.com/office/drawing/2010/main" val="0"/>
-              </a:ext>
-            </a:extLst>
-          </a:blip>
-          <a:srcRect/>
-          <a:stretch>
-            <a:fillRect/>
-          </a:stretch>
-        </p:blipFill>
-        <p:spPr bwMode="auto">
-          <a:xfrm>
-            <a:off x="10820670" y="5458691"/>
-            <a:ext cx="1289214" cy="1325418"/>
-          </a:xfrm>
-          <a:prstGeom prst="rect">
-            <a:avLst/>
-          </a:prstGeom>
-          <a:noFill/>
-          <a:extLst>
-            <a:ext uri="{909E8E84-426E-40DD-AFC4-6F175D3DCCD1}">
-              <a14:hiddenFill xmlns:a14="http://schemas.microsoft.com/office/drawing/2010/main">
-                <a:solidFill>
-                  <a:srgbClr val="FFFFFF"/>
-                </a:solidFill>
-              </a14:hiddenFill>
-            </a:ext>
-          </a:extLst>
-        </p:spPr>
-      </p:pic>
-      <p:sp>
-        <p:nvSpPr>
-          <p:cNvPr id="4" name="TextBox 3">
-            <a:extLst>
-              <a:ext uri="{FF2B5EF4-FFF2-40B4-BE49-F238E27FC236}">
-                <a16:creationId xmlns:a16="http://schemas.microsoft.com/office/drawing/2014/main" id="{F4B0FDD5-5348-354F-A378-7241F2AF057B}"/>
-              </a:ext>
-            </a:extLst>
-          </p:cNvPr>
-          <p:cNvSpPr txBox="1"/>
-          <p:nvPr/>
-        </p:nvSpPr>
-        <p:spPr>
-          <a:xfrm>
-            <a:off x="1307676" y="444110"/>
-            <a:ext cx="4415889" cy="769441"/>
-          </a:xfrm>
-          <a:prstGeom prst="rect">
-            <a:avLst/>
-          </a:prstGeom>
-          <a:noFill/>
-        </p:spPr>
-        <p:txBody>
-          <a:bodyPr wrap="none" rtlCol="0">
-            <a:spAutoFit/>
-          </a:bodyPr>
-          <a:lstStyle/>
-          <a:p>
-            <a:pPr algn="ctr"/>
-            <a:r>
-              <a:rPr lang="en-GB" sz="4400" dirty="0">
-                <a:solidFill>
-                  <a:srgbClr val="0070C0"/>
-                </a:solidFill>
-              </a:rPr>
-              <a:t>Manual versioning</a:t>
-            </a:r>
-          </a:p>
-        </p:txBody>
-      </p:sp>
-    </p:spTree>
-    <p:extLst>
-      <p:ext uri="{BB962C8B-B14F-4D97-AF65-F5344CB8AC3E}">
-        <p14:creationId xmlns:p14="http://schemas.microsoft.com/office/powerpoint/2010/main" val="1052159509"/>
-      </p:ext>
-    </p:extLst>
-  </p:cSld>
-  <p:clrMapOvr>
-    <a:masterClrMapping/>
-  </p:clrMapOvr>
-</p:sld>
-</file>
-
-<file path=ppt/slides/slide5.xml><?xml version="1.0" encoding="utf-8"?>
-<p:sld xmlns:a="http://schemas.openxmlformats.org/drawingml/2006/main" xmlns:r="http://schemas.openxmlformats.org/officeDocument/2006/relationships" xmlns:p="http://schemas.openxmlformats.org/presentationml/2006/main">
-  <p:cSld>
-    <p:spTree>
-      <p:nvGrpSpPr>
-        <p:cNvPr id="1" name=""/>
-        <p:cNvGrpSpPr/>
-        <p:nvPr/>
-      </p:nvGrpSpPr>
-      <p:grpSpPr>
-        <a:xfrm>
-          <a:off x="0" y="0"/>
-          <a:ext cx="0" cy="0"/>
-          <a:chOff x="0" y="0"/>
-          <a:chExt cx="0" cy="0"/>
-        </a:xfrm>
-      </p:grpSpPr>
-      <p:sp>
-        <p:nvSpPr>
-          <p:cNvPr id="5" name="TextBox 4">
-            <a:extLst>
-              <a:ext uri="{FF2B5EF4-FFF2-40B4-BE49-F238E27FC236}">
-                <a16:creationId xmlns:a16="http://schemas.microsoft.com/office/drawing/2014/main" id="{3A7A1F5C-9C70-4DE3-BA39-7835B2935EB3}"/>
-              </a:ext>
-            </a:extLst>
-          </p:cNvPr>
-          <p:cNvSpPr txBox="1"/>
-          <p:nvPr/>
-        </p:nvSpPr>
-        <p:spPr>
-          <a:xfrm>
-            <a:off x="1363735" y="1129464"/>
-            <a:ext cx="9464530" cy="1384995"/>
-          </a:xfrm>
-          <a:prstGeom prst="rect">
-            <a:avLst/>
-          </a:prstGeom>
-          <a:noFill/>
-        </p:spPr>
-        <p:txBody>
-          <a:bodyPr wrap="square">
-            <a:spAutoFit/>
-          </a:bodyPr>
-          <a:lstStyle/>
-          <a:p>
-            <a:r>
-              <a:rPr lang="en-GB" sz="2800" dirty="0">
-                <a:solidFill>
-                  <a:srgbClr val="0070C0"/>
-                </a:solidFill>
-              </a:rPr>
-              <a:t>Exercise 2: </a:t>
-            </a:r>
-          </a:p>
-          <a:p>
-            <a:pPr algn="ctr"/>
-            <a:endParaRPr lang="en-GB" sz="2800" dirty="0">
-              <a:solidFill>
-                <a:srgbClr val="0070C0"/>
-              </a:solidFill>
-            </a:endParaRPr>
-          </a:p>
-          <a:p>
-            <a:pPr algn="ctr"/>
-            <a:r>
-              <a:rPr lang="en-GB" sz="2800" dirty="0">
-                <a:solidFill>
-                  <a:srgbClr val="0070C0"/>
-                </a:solidFill>
-              </a:rPr>
-              <a:t>Manual versioning</a:t>
-            </a:r>
-          </a:p>
-        </p:txBody>
-      </p:sp>
-      <p:pic>
-        <p:nvPicPr>
-          <p:cNvPr id="4" name="Picture 2" descr="Ed_DaSH">
-            <a:extLst>
-              <a:ext uri="{FF2B5EF4-FFF2-40B4-BE49-F238E27FC236}">
-                <a16:creationId xmlns:a16="http://schemas.microsoft.com/office/drawing/2014/main" id="{A783256F-E39E-4712-96B0-240BD611CFEB}"/>
-              </a:ext>
-            </a:extLst>
-          </p:cNvPr>
-          <p:cNvPicPr>
-            <a:picLocks noChangeAspect="1" noChangeArrowheads="1"/>
-          </p:cNvPicPr>
-          <p:nvPr/>
-        </p:nvPicPr>
-        <p:blipFill>
-          <a:blip r:embed="rId2">
-            <a:extLst>
-              <a:ext uri="{28A0092B-C50C-407E-A947-70E740481C1C}">
-                <a14:useLocalDpi xmlns:a14="http://schemas.microsoft.com/office/drawing/2010/main" val="0"/>
-              </a:ext>
-            </a:extLst>
-          </a:blip>
-          <a:srcRect/>
-          <a:stretch>
-            <a:fillRect/>
-          </a:stretch>
-        </p:blipFill>
-        <p:spPr bwMode="auto">
-          <a:xfrm>
-            <a:off x="10820670" y="5458691"/>
-            <a:ext cx="1289214" cy="1325418"/>
-          </a:xfrm>
-          <a:prstGeom prst="rect">
-            <a:avLst/>
-          </a:prstGeom>
-          <a:noFill/>
-          <a:extLst>
-            <a:ext uri="{909E8E84-426E-40DD-AFC4-6F175D3DCCD1}">
-              <a14:hiddenFill xmlns:a14="http://schemas.microsoft.com/office/drawing/2010/main">
-                <a:solidFill>
-                  <a:srgbClr val="FFFFFF"/>
-                </a:solidFill>
-              </a14:hiddenFill>
-            </a:ext>
-          </a:extLst>
-        </p:spPr>
-      </p:pic>
-    </p:spTree>
-    <p:extLst>
-      <p:ext uri="{BB962C8B-B14F-4D97-AF65-F5344CB8AC3E}">
-        <p14:creationId xmlns:p14="http://schemas.microsoft.com/office/powerpoint/2010/main" val="373317662"/>
-      </p:ext>
-    </p:extLst>
-  </p:cSld>
-  <p:clrMapOvr>
-    <a:masterClrMapping/>
-  </p:clrMapOvr>
-</p:sld>
-</file>
-
-<file path=ppt/slides/slide6.xml><?xml version="1.0" encoding="utf-8"?>
+<file path=ppt/slides/slide13.xml><?xml version="1.0" encoding="utf-8"?>
 <p:sld xmlns:a="http://schemas.openxmlformats.org/drawingml/2006/main" xmlns:r="http://schemas.openxmlformats.org/officeDocument/2006/relationships" xmlns:p="http://schemas.openxmlformats.org/presentationml/2006/main">
   <p:cSld>
     <p:spTree>
@@ -4946,7 +4525,7 @@
           <p:nvPr/>
         </p:nvPicPr>
         <p:blipFill>
-          <a:blip r:embed="rId2">
+          <a:blip r:embed="rId2" cstate="hqprint">
             <a:extLst>
               <a:ext uri="{28A0092B-C50C-407E-A947-70E740481C1C}">
                 <a14:useLocalDpi xmlns:a14="http://schemas.microsoft.com/office/drawing/2010/main" val="0"/>
@@ -5053,13 +4632,13 @@
             <p:nvPr/>
           </p:nvPicPr>
           <p:blipFill>
-            <a:blip r:embed="rId3">
+            <a:blip r:embed="rId3" cstate="hqprint">
               <a:extLst>
                 <a:ext uri="{28A0092B-C50C-407E-A947-70E740481C1C}">
                   <a14:useLocalDpi xmlns:a14="http://schemas.microsoft.com/office/drawing/2010/main" val="0"/>
                 </a:ext>
                 <a:ext uri="{96DAC541-7B7A-43D3-8B79-37D633B846F1}">
-                  <asvg:svgBlip xmlns:asvg="http://schemas.microsoft.com/office/drawing/2016/SVG/main" r:embed="rId4"/>
+                  <asvg:svgBlip xmlns:asvg="http://schemas.microsoft.com/office/drawing/2016/SVG/main" xmlns="" r:embed="rId4"/>
                 </a:ext>
               </a:extLst>
             </a:blip>
@@ -5092,13 +4671,13 @@
             <p:nvPr/>
           </p:nvPicPr>
           <p:blipFill>
-            <a:blip r:embed="rId5">
+            <a:blip r:embed="rId5" cstate="hqprint">
               <a:extLst>
                 <a:ext uri="{28A0092B-C50C-407E-A947-70E740481C1C}">
                   <a14:useLocalDpi xmlns:a14="http://schemas.microsoft.com/office/drawing/2010/main" val="0"/>
                 </a:ext>
                 <a:ext uri="{96DAC541-7B7A-43D3-8B79-37D633B846F1}">
-                  <asvg:svgBlip xmlns:asvg="http://schemas.microsoft.com/office/drawing/2016/SVG/main" r:embed="rId6"/>
+                  <asvg:svgBlip xmlns:asvg="http://schemas.microsoft.com/office/drawing/2016/SVG/main" xmlns="" r:embed="rId6"/>
                 </a:ext>
               </a:extLst>
             </a:blip>
@@ -5131,13 +4710,13 @@
             <p:nvPr/>
           </p:nvPicPr>
           <p:blipFill>
-            <a:blip r:embed="rId7">
+            <a:blip r:embed="rId7" cstate="hqprint">
               <a:extLst>
                 <a:ext uri="{28A0092B-C50C-407E-A947-70E740481C1C}">
                   <a14:useLocalDpi xmlns:a14="http://schemas.microsoft.com/office/drawing/2010/main" val="0"/>
                 </a:ext>
                 <a:ext uri="{96DAC541-7B7A-43D3-8B79-37D633B846F1}">
-                  <asvg:svgBlip xmlns:asvg="http://schemas.microsoft.com/office/drawing/2016/SVG/main" r:embed="rId8"/>
+                  <asvg:svgBlip xmlns:asvg="http://schemas.microsoft.com/office/drawing/2016/SVG/main" xmlns="" r:embed="rId8"/>
                 </a:ext>
               </a:extLst>
             </a:blip>
@@ -5203,6 +4782,2338 @@
     <p:extLst>
       <p:ext uri="{BB962C8B-B14F-4D97-AF65-F5344CB8AC3E}">
         <p14:creationId xmlns:p14="http://schemas.microsoft.com/office/powerpoint/2010/main" val="693671975"/>
+      </p:ext>
+    </p:extLst>
+  </p:cSld>
+  <p:clrMapOvr>
+    <a:masterClrMapping/>
+  </p:clrMapOvr>
+</p:sld>
+</file>
+
+<file path=ppt/slides/slide14.xml><?xml version="1.0" encoding="utf-8"?>
+<p:sld xmlns:a="http://schemas.openxmlformats.org/drawingml/2006/main" xmlns:r="http://schemas.openxmlformats.org/officeDocument/2006/relationships" xmlns:p="http://schemas.openxmlformats.org/presentationml/2006/main">
+  <p:cSld>
+    <p:spTree>
+      <p:nvGrpSpPr>
+        <p:cNvPr id="1" name=""/>
+        <p:cNvGrpSpPr/>
+        <p:nvPr/>
+      </p:nvGrpSpPr>
+      <p:grpSpPr>
+        <a:xfrm>
+          <a:off x="0" y="0"/>
+          <a:ext cx="0" cy="0"/>
+          <a:chOff x="0" y="0"/>
+          <a:chExt cx="0" cy="0"/>
+        </a:xfrm>
+      </p:grpSpPr>
+      <p:sp>
+        <p:nvSpPr>
+          <p:cNvPr id="12" name="TextBox 11">
+            <a:extLst>
+              <a:ext uri="{FF2B5EF4-FFF2-40B4-BE49-F238E27FC236}">
+                <a16:creationId xmlns:a16="http://schemas.microsoft.com/office/drawing/2014/main" id="{32F0452B-E9D9-441C-8E99-96A0537CECD4}"/>
+              </a:ext>
+            </a:extLst>
+          </p:cNvPr>
+          <p:cNvSpPr txBox="1"/>
+          <p:nvPr/>
+        </p:nvSpPr>
+        <p:spPr>
+          <a:xfrm>
+            <a:off x="1508922" y="1524088"/>
+            <a:ext cx="9174155" cy="2766911"/>
+          </a:xfrm>
+          <a:prstGeom prst="rect">
+            <a:avLst/>
+          </a:prstGeom>
+          <a:noFill/>
+        </p:spPr>
+        <p:txBody>
+          <a:bodyPr wrap="square">
+            <a:spAutoFit/>
+          </a:bodyPr>
+          <a:lstStyle/>
+          <a:p>
+            <a:pPr algn="ctr">
+              <a:lnSpc>
+                <a:spcPct val="150000"/>
+              </a:lnSpc>
+            </a:pPr>
+            <a:r>
+              <a:rPr lang="en-GB" sz="4000" dirty="0">
+                <a:solidFill>
+                  <a:srgbClr val="0070C0"/>
+                </a:solidFill>
+              </a:rPr>
+              <a:t>Looking at the reasons to use a version control system (VCS) in research, how does using VCS help in being FAIR?</a:t>
+            </a:r>
+          </a:p>
+        </p:txBody>
+      </p:sp>
+    </p:spTree>
+    <p:extLst>
+      <p:ext uri="{BB962C8B-B14F-4D97-AF65-F5344CB8AC3E}">
+        <p14:creationId xmlns:p14="http://schemas.microsoft.com/office/powerpoint/2010/main" val="3747721469"/>
+      </p:ext>
+    </p:extLst>
+  </p:cSld>
+  <p:clrMapOvr>
+    <a:masterClrMapping/>
+  </p:clrMapOvr>
+</p:sld>
+</file>
+
+<file path=ppt/slides/slide15.xml><?xml version="1.0" encoding="utf-8"?>
+<p:sld xmlns:a="http://schemas.openxmlformats.org/drawingml/2006/main" xmlns:r="http://schemas.openxmlformats.org/officeDocument/2006/relationships" xmlns:p="http://schemas.openxmlformats.org/presentationml/2006/main">
+  <p:cSld>
+    <p:spTree>
+      <p:nvGrpSpPr>
+        <p:cNvPr id="1" name=""/>
+        <p:cNvGrpSpPr/>
+        <p:nvPr/>
+      </p:nvGrpSpPr>
+      <p:grpSpPr>
+        <a:xfrm>
+          <a:off x="0" y="0"/>
+          <a:ext cx="0" cy="0"/>
+          <a:chOff x="0" y="0"/>
+          <a:chExt cx="0" cy="0"/>
+        </a:xfrm>
+      </p:grpSpPr>
+      <p:sp>
+        <p:nvSpPr>
+          <p:cNvPr id="5" name="TextBox 4">
+            <a:extLst>
+              <a:ext uri="{FF2B5EF4-FFF2-40B4-BE49-F238E27FC236}">
+                <a16:creationId xmlns:a16="http://schemas.microsoft.com/office/drawing/2014/main" id="{3A7A1F5C-9C70-4DE3-BA39-7835B2935EB3}"/>
+              </a:ext>
+            </a:extLst>
+          </p:cNvPr>
+          <p:cNvSpPr txBox="1"/>
+          <p:nvPr/>
+        </p:nvSpPr>
+        <p:spPr>
+          <a:xfrm>
+            <a:off x="515880" y="488425"/>
+            <a:ext cx="9464530" cy="1200329"/>
+          </a:xfrm>
+          <a:prstGeom prst="rect">
+            <a:avLst/>
+          </a:prstGeom>
+          <a:noFill/>
+        </p:spPr>
+        <p:txBody>
+          <a:bodyPr wrap="square">
+            <a:spAutoFit/>
+          </a:bodyPr>
+          <a:lstStyle/>
+          <a:p>
+            <a:r>
+              <a:rPr lang="pl-PL" sz="3600" dirty="0" smtClean="0">
+                <a:solidFill>
+                  <a:srgbClr val="0070C0"/>
+                </a:solidFill>
+              </a:rPr>
+              <a:t>Learning git</a:t>
+            </a:r>
+            <a:endParaRPr lang="en-GB" sz="3600" dirty="0">
+              <a:solidFill>
+                <a:srgbClr val="0070C0"/>
+              </a:solidFill>
+            </a:endParaRPr>
+          </a:p>
+          <a:p>
+            <a:pPr algn="ctr"/>
+            <a:endParaRPr lang="en-GB" sz="3600" dirty="0">
+              <a:solidFill>
+                <a:srgbClr val="0070C0"/>
+              </a:solidFill>
+            </a:endParaRPr>
+          </a:p>
+        </p:txBody>
+      </p:sp>
+      <p:pic>
+        <p:nvPicPr>
+          <p:cNvPr id="4" name="Picture 2" descr="Ed_DaSH">
+            <a:extLst>
+              <a:ext uri="{FF2B5EF4-FFF2-40B4-BE49-F238E27FC236}">
+                <a16:creationId xmlns:a16="http://schemas.microsoft.com/office/drawing/2014/main" id="{A783256F-E39E-4712-96B0-240BD611CFEB}"/>
+              </a:ext>
+            </a:extLst>
+          </p:cNvPr>
+          <p:cNvPicPr>
+            <a:picLocks noChangeAspect="1" noChangeArrowheads="1"/>
+          </p:cNvPicPr>
+          <p:nvPr/>
+        </p:nvPicPr>
+        <p:blipFill>
+          <a:blip r:embed="rId2" cstate="hqprint">
+            <a:extLst>
+              <a:ext uri="{28A0092B-C50C-407E-A947-70E740481C1C}">
+                <a14:useLocalDpi xmlns:a14="http://schemas.microsoft.com/office/drawing/2010/main" val="0"/>
+              </a:ext>
+            </a:extLst>
+          </a:blip>
+          <a:srcRect/>
+          <a:stretch>
+            <a:fillRect/>
+          </a:stretch>
+        </p:blipFill>
+        <p:spPr bwMode="auto">
+          <a:xfrm>
+            <a:off x="10820670" y="5458691"/>
+            <a:ext cx="1289214" cy="1325418"/>
+          </a:xfrm>
+          <a:prstGeom prst="rect">
+            <a:avLst/>
+          </a:prstGeom>
+          <a:noFill/>
+          <a:extLst>
+            <a:ext uri="{909E8E84-426E-40DD-AFC4-6F175D3DCCD1}">
+              <a14:hiddenFill xmlns:a14="http://schemas.microsoft.com/office/drawing/2010/main">
+                <a:solidFill>
+                  <a:srgbClr val="FFFFFF"/>
+                </a:solidFill>
+              </a14:hiddenFill>
+            </a:ext>
+          </a:extLst>
+        </p:spPr>
+      </p:pic>
+      <p:sp>
+        <p:nvSpPr>
+          <p:cNvPr id="2" name="Rectangle 1">
+            <a:extLst>
+              <a:ext uri="{FF2B5EF4-FFF2-40B4-BE49-F238E27FC236}">
+                <a16:creationId xmlns:a16="http://schemas.microsoft.com/office/drawing/2014/main" id="{7AAE078A-6B0F-0A4D-8D08-92C32F04F022}"/>
+              </a:ext>
+            </a:extLst>
+          </p:cNvPr>
+          <p:cNvSpPr/>
+          <p:nvPr/>
+        </p:nvSpPr>
+        <p:spPr>
+          <a:xfrm>
+            <a:off x="978965" y="2088855"/>
+            <a:ext cx="10195715" cy="3108543"/>
+          </a:xfrm>
+          <a:prstGeom prst="rect">
+            <a:avLst/>
+          </a:prstGeom>
+        </p:spPr>
+        <p:txBody>
+          <a:bodyPr wrap="square">
+            <a:spAutoFit/>
+          </a:bodyPr>
+          <a:lstStyle/>
+          <a:p>
+            <a:pPr marL="285750" indent="-285750">
+              <a:buFont typeface="Arial" panose="020B0604020202020204" pitchFamily="34" charset="0"/>
+              <a:buChar char="•"/>
+            </a:pPr>
+            <a:r>
+              <a:rPr lang="en-GB" sz="2800" dirty="0">
+                <a:solidFill>
+                  <a:srgbClr val="0070C0"/>
+                </a:solidFill>
+              </a:rPr>
+              <a:t>Software Carpentry git workshop https://</a:t>
+            </a:r>
+            <a:r>
+              <a:rPr lang="en-GB" sz="2800" dirty="0" err="1">
+                <a:solidFill>
+                  <a:srgbClr val="0070C0"/>
+                </a:solidFill>
+              </a:rPr>
+              <a:t>swcarpentry.github.io</a:t>
+            </a:r>
+            <a:r>
+              <a:rPr lang="en-GB" sz="2800" dirty="0">
+                <a:solidFill>
+                  <a:srgbClr val="0070C0"/>
+                </a:solidFill>
+              </a:rPr>
+              <a:t>/git-novice/</a:t>
+            </a:r>
+          </a:p>
+          <a:p>
+            <a:pPr marL="285750" indent="-285750">
+              <a:buFont typeface="Arial" panose="020B0604020202020204" pitchFamily="34" charset="0"/>
+              <a:buChar char="•"/>
+            </a:pPr>
+            <a:r>
+              <a:rPr lang="en-GB" sz="2800" dirty="0">
+                <a:solidFill>
+                  <a:srgbClr val="0070C0"/>
+                </a:solidFill>
+              </a:rPr>
+              <a:t>Edinburgh Carpentries runs courses: https://</a:t>
+            </a:r>
+            <a:r>
+              <a:rPr lang="en-GB" sz="2800" dirty="0" err="1">
+                <a:solidFill>
+                  <a:srgbClr val="0070C0"/>
+                </a:solidFill>
+              </a:rPr>
+              <a:t>edcarp.github.io</a:t>
+            </a:r>
+            <a:r>
+              <a:rPr lang="en-GB" sz="2800" dirty="0">
+                <a:solidFill>
+                  <a:srgbClr val="0070C0"/>
+                </a:solidFill>
+              </a:rPr>
+              <a:t>/</a:t>
+            </a:r>
+          </a:p>
+          <a:p>
+            <a:pPr marL="285750" indent="-285750">
+              <a:buFont typeface="Arial" panose="020B0604020202020204" pitchFamily="34" charset="0"/>
+              <a:buChar char="•"/>
+            </a:pPr>
+            <a:r>
+              <a:rPr lang="en-GB" sz="2800" dirty="0">
+                <a:solidFill>
+                  <a:srgbClr val="0070C0"/>
+                </a:solidFill>
+              </a:rPr>
+              <a:t>https://</a:t>
+            </a:r>
+            <a:r>
+              <a:rPr lang="en-GB" sz="2800" dirty="0" err="1">
+                <a:solidFill>
+                  <a:srgbClr val="0070C0"/>
+                </a:solidFill>
+              </a:rPr>
+              <a:t>ourcodingclub.github.io</a:t>
+            </a:r>
+            <a:r>
+              <a:rPr lang="en-GB" sz="2800" dirty="0">
+                <a:solidFill>
+                  <a:srgbClr val="0070C0"/>
+                </a:solidFill>
+              </a:rPr>
+              <a:t>/tutorials/git/</a:t>
+            </a:r>
+          </a:p>
+          <a:p>
+            <a:pPr marL="285750" indent="-285750">
+              <a:buFont typeface="Arial" panose="020B0604020202020204" pitchFamily="34" charset="0"/>
+              <a:buChar char="•"/>
+            </a:pPr>
+            <a:r>
+              <a:rPr lang="en-GB" sz="2800" dirty="0">
+                <a:solidFill>
+                  <a:srgbClr val="0070C0"/>
+                </a:solidFill>
+              </a:rPr>
+              <a:t>Crash course on </a:t>
+            </a:r>
+            <a:r>
+              <a:rPr lang="en-GB" sz="2800" dirty="0" err="1">
+                <a:solidFill>
+                  <a:srgbClr val="0070C0"/>
+                </a:solidFill>
+              </a:rPr>
+              <a:t>youtube</a:t>
+            </a:r>
+            <a:r>
+              <a:rPr lang="en-GB" sz="2800" dirty="0">
+                <a:solidFill>
+                  <a:srgbClr val="0070C0"/>
+                </a:solidFill>
+              </a:rPr>
+              <a:t>: https://</a:t>
+            </a:r>
+            <a:r>
+              <a:rPr lang="en-GB" sz="2800" dirty="0" err="1">
+                <a:solidFill>
+                  <a:srgbClr val="0070C0"/>
+                </a:solidFill>
+              </a:rPr>
+              <a:t>youtu.be</a:t>
+            </a:r>
+            <a:r>
+              <a:rPr lang="en-GB" sz="2800" dirty="0">
+                <a:solidFill>
+                  <a:srgbClr val="0070C0"/>
+                </a:solidFill>
+              </a:rPr>
+              <a:t>/SWYqp7iY_Tc</a:t>
+            </a:r>
+          </a:p>
+          <a:p>
+            <a:pPr marL="285750" indent="-285750">
+              <a:buFont typeface="Arial" panose="020B0604020202020204" pitchFamily="34" charset="0"/>
+              <a:buChar char="•"/>
+            </a:pPr>
+            <a:r>
+              <a:rPr lang="en-GB" sz="2800" dirty="0">
+                <a:solidFill>
+                  <a:srgbClr val="0070C0"/>
+                </a:solidFill>
+              </a:rPr>
+              <a:t>Learn git branching: https://</a:t>
+            </a:r>
+            <a:r>
+              <a:rPr lang="en-GB" sz="2800" dirty="0" err="1">
+                <a:solidFill>
+                  <a:srgbClr val="0070C0"/>
+                </a:solidFill>
+              </a:rPr>
+              <a:t>learngitbranching.js.org</a:t>
+            </a:r>
+            <a:r>
+              <a:rPr lang="en-GB" sz="2800" dirty="0">
+                <a:solidFill>
+                  <a:srgbClr val="0070C0"/>
+                </a:solidFill>
+              </a:rPr>
+              <a:t>/</a:t>
+            </a:r>
+          </a:p>
+          <a:p>
+            <a:pPr marL="285750" indent="-285750">
+              <a:buFont typeface="Arial" panose="020B0604020202020204" pitchFamily="34" charset="0"/>
+              <a:buChar char="•"/>
+            </a:pPr>
+            <a:r>
+              <a:rPr lang="en-GB" sz="2800" dirty="0">
+                <a:solidFill>
+                  <a:srgbClr val="0070C0"/>
+                </a:solidFill>
+              </a:rPr>
+              <a:t>Learn git-game: https://</a:t>
+            </a:r>
+            <a:r>
+              <a:rPr lang="en-GB" sz="2800" dirty="0" err="1">
+                <a:solidFill>
+                  <a:srgbClr val="0070C0"/>
+                </a:solidFill>
+              </a:rPr>
+              <a:t>github.com</a:t>
+            </a:r>
+            <a:r>
+              <a:rPr lang="en-GB" sz="2800" dirty="0">
+                <a:solidFill>
+                  <a:srgbClr val="0070C0"/>
+                </a:solidFill>
+              </a:rPr>
+              <a:t>/git-game/git-game</a:t>
+            </a:r>
+          </a:p>
+        </p:txBody>
+      </p:sp>
+    </p:spTree>
+    <p:extLst>
+      <p:ext uri="{BB962C8B-B14F-4D97-AF65-F5344CB8AC3E}">
+        <p14:creationId xmlns:p14="http://schemas.microsoft.com/office/powerpoint/2010/main" val="149368189"/>
+      </p:ext>
+    </p:extLst>
+  </p:cSld>
+  <p:clrMapOvr>
+    <a:masterClrMapping/>
+  </p:clrMapOvr>
+</p:sld>
+</file>
+
+<file path=ppt/slides/slide16.xml><?xml version="1.0" encoding="utf-8"?>
+<p:sld xmlns:a="http://schemas.openxmlformats.org/drawingml/2006/main" xmlns:r="http://schemas.openxmlformats.org/officeDocument/2006/relationships" xmlns:p="http://schemas.openxmlformats.org/presentationml/2006/main">
+  <p:cSld>
+    <p:spTree>
+      <p:nvGrpSpPr>
+        <p:cNvPr id="1" name=""/>
+        <p:cNvGrpSpPr/>
+        <p:nvPr/>
+      </p:nvGrpSpPr>
+      <p:grpSpPr>
+        <a:xfrm>
+          <a:off x="0" y="0"/>
+          <a:ext cx="0" cy="0"/>
+          <a:chOff x="0" y="0"/>
+          <a:chExt cx="0" cy="0"/>
+        </a:xfrm>
+      </p:grpSpPr>
+      <p:pic>
+        <p:nvPicPr>
+          <p:cNvPr id="6" name="Picture 2" descr="Ed_DaSH">
+            <a:extLst>
+              <a:ext uri="{FF2B5EF4-FFF2-40B4-BE49-F238E27FC236}">
+                <a16:creationId xmlns:a16="http://schemas.microsoft.com/office/drawing/2014/main" id="{6F3CF586-06D2-46C3-A4A3-130E31C4A16F}"/>
+              </a:ext>
+            </a:extLst>
+          </p:cNvPr>
+          <p:cNvPicPr>
+            <a:picLocks noChangeAspect="1" noChangeArrowheads="1"/>
+          </p:cNvPicPr>
+          <p:nvPr/>
+        </p:nvPicPr>
+        <p:blipFill>
+          <a:blip r:embed="rId2" cstate="hqprint">
+            <a:extLst>
+              <a:ext uri="{28A0092B-C50C-407E-A947-70E740481C1C}">
+                <a14:useLocalDpi xmlns:a14="http://schemas.microsoft.com/office/drawing/2010/main" val="0"/>
+              </a:ext>
+            </a:extLst>
+          </a:blip>
+          <a:srcRect/>
+          <a:stretch>
+            <a:fillRect/>
+          </a:stretch>
+        </p:blipFill>
+        <p:spPr bwMode="auto">
+          <a:xfrm>
+            <a:off x="10820670" y="5458691"/>
+            <a:ext cx="1289214" cy="1325418"/>
+          </a:xfrm>
+          <a:prstGeom prst="rect">
+            <a:avLst/>
+          </a:prstGeom>
+          <a:noFill/>
+          <a:extLst>
+            <a:ext uri="{909E8E84-426E-40DD-AFC4-6F175D3DCCD1}">
+              <a14:hiddenFill xmlns:a14="http://schemas.microsoft.com/office/drawing/2010/main">
+                <a:solidFill>
+                  <a:srgbClr val="FFFFFF"/>
+                </a:solidFill>
+              </a14:hiddenFill>
+            </a:ext>
+          </a:extLst>
+        </p:spPr>
+      </p:pic>
+      <p:sp>
+        <p:nvSpPr>
+          <p:cNvPr id="4" name="TextBox 3">
+            <a:extLst>
+              <a:ext uri="{FF2B5EF4-FFF2-40B4-BE49-F238E27FC236}">
+                <a16:creationId xmlns:a16="http://schemas.microsoft.com/office/drawing/2014/main" id="{F4B0FDD5-5348-354F-A378-7241F2AF057B}"/>
+              </a:ext>
+            </a:extLst>
+          </p:cNvPr>
+          <p:cNvSpPr txBox="1"/>
+          <p:nvPr/>
+        </p:nvSpPr>
+        <p:spPr>
+          <a:xfrm>
+            <a:off x="777240" y="379920"/>
+            <a:ext cx="10043430" cy="769441"/>
+          </a:xfrm>
+          <a:prstGeom prst="rect">
+            <a:avLst/>
+          </a:prstGeom>
+          <a:noFill/>
+        </p:spPr>
+        <p:txBody>
+          <a:bodyPr wrap="square" rtlCol="0">
+            <a:spAutoFit/>
+          </a:bodyPr>
+          <a:lstStyle/>
+          <a:p>
+            <a:pPr algn="ctr"/>
+            <a:r>
+              <a:rPr lang="en-GB" sz="4400" dirty="0">
+                <a:solidFill>
+                  <a:srgbClr val="0070C0"/>
+                </a:solidFill>
+              </a:rPr>
+              <a:t>Semantic versioning</a:t>
+            </a:r>
+          </a:p>
+        </p:txBody>
+      </p:sp>
+      <p:sp>
+        <p:nvSpPr>
+          <p:cNvPr id="7" name="Rectangle 6">
+            <a:extLst>
+              <a:ext uri="{FF2B5EF4-FFF2-40B4-BE49-F238E27FC236}">
+                <a16:creationId xmlns:a16="http://schemas.microsoft.com/office/drawing/2014/main" id="{7AAE078A-6B0F-0A4D-8D08-92C32F04F022}"/>
+              </a:ext>
+            </a:extLst>
+          </p:cNvPr>
+          <p:cNvSpPr/>
+          <p:nvPr/>
+        </p:nvSpPr>
+        <p:spPr>
+          <a:xfrm>
+            <a:off x="978965" y="2088855"/>
+            <a:ext cx="10195715" cy="3970318"/>
+          </a:xfrm>
+          <a:prstGeom prst="rect">
+            <a:avLst/>
+          </a:prstGeom>
+        </p:spPr>
+        <p:txBody>
+          <a:bodyPr wrap="square">
+            <a:spAutoFit/>
+          </a:bodyPr>
+          <a:lstStyle/>
+          <a:p>
+            <a:pPr marL="285750" indent="-285750">
+              <a:buFont typeface="Arial" panose="020B0604020202020204" pitchFamily="34" charset="0"/>
+              <a:buChar char="•"/>
+            </a:pPr>
+            <a:r>
+              <a:rPr lang="en-GB" sz="2800" dirty="0">
+                <a:solidFill>
+                  <a:srgbClr val="0070C0"/>
+                </a:solidFill>
+              </a:rPr>
+              <a:t>a particular point in time (a set of changes) has its logical </a:t>
+            </a:r>
+            <a:r>
+              <a:rPr lang="en-GB" sz="2800" dirty="0" smtClean="0">
+                <a:solidFill>
+                  <a:srgbClr val="0070C0"/>
+                </a:solidFill>
+              </a:rPr>
+              <a:t>meaning</a:t>
+            </a:r>
+            <a:endParaRPr lang="pl-PL" sz="2800" dirty="0" smtClean="0">
+              <a:solidFill>
+                <a:srgbClr val="0070C0"/>
+              </a:solidFill>
+            </a:endParaRPr>
+          </a:p>
+          <a:p>
+            <a:pPr marL="285750" indent="-285750">
+              <a:buFont typeface="Arial" panose="020B0604020202020204" pitchFamily="34" charset="0"/>
+              <a:buChar char="•"/>
+            </a:pPr>
+            <a:endParaRPr lang="pl-PL" sz="2800" dirty="0">
+              <a:solidFill>
+                <a:srgbClr val="0070C0"/>
+              </a:solidFill>
+            </a:endParaRPr>
+          </a:p>
+          <a:p>
+            <a:pPr marL="285750" indent="-285750">
+              <a:buFont typeface="Arial" panose="020B0604020202020204" pitchFamily="34" charset="0"/>
+              <a:buChar char="•"/>
+            </a:pPr>
+            <a:r>
+              <a:rPr lang="en-GB" sz="2800" dirty="0">
+                <a:solidFill>
+                  <a:srgbClr val="0070C0"/>
+                </a:solidFill>
+              </a:rPr>
+              <a:t>the “official” point in time (especially if it is meant to be consumed by others) is called release</a:t>
+            </a:r>
+            <a:r>
+              <a:rPr lang="en-GB" sz="2800" dirty="0" smtClean="0">
+                <a:solidFill>
+                  <a:srgbClr val="0070C0"/>
+                </a:solidFill>
+              </a:rPr>
+              <a:t>.</a:t>
+            </a:r>
+            <a:endParaRPr lang="pl-PL" sz="2800" dirty="0" smtClean="0">
+              <a:solidFill>
+                <a:srgbClr val="0070C0"/>
+              </a:solidFill>
+            </a:endParaRPr>
+          </a:p>
+          <a:p>
+            <a:pPr marL="285750" indent="-285750">
+              <a:buFont typeface="Arial" panose="020B0604020202020204" pitchFamily="34" charset="0"/>
+              <a:buChar char="•"/>
+            </a:pPr>
+            <a:endParaRPr lang="en-GB" sz="2800" dirty="0">
+              <a:solidFill>
+                <a:srgbClr val="0070C0"/>
+              </a:solidFill>
+            </a:endParaRPr>
+          </a:p>
+          <a:p>
+            <a:pPr marL="285750" indent="-285750">
+              <a:buFont typeface="Arial" panose="020B0604020202020204" pitchFamily="34" charset="0"/>
+              <a:buChar char="•"/>
+            </a:pPr>
+            <a:r>
+              <a:rPr lang="en-GB" sz="2800" dirty="0">
+                <a:solidFill>
+                  <a:srgbClr val="0070C0"/>
+                </a:solidFill>
+              </a:rPr>
+              <a:t>you may not always want to use the latest version of a software. </a:t>
+            </a:r>
+            <a:endParaRPr lang="pl-PL" sz="2800" dirty="0" smtClean="0">
+              <a:solidFill>
+                <a:srgbClr val="0070C0"/>
+              </a:solidFill>
+            </a:endParaRPr>
+          </a:p>
+          <a:p>
+            <a:pPr marL="285750" indent="-285750">
+              <a:buFont typeface="Arial" panose="020B0604020202020204" pitchFamily="34" charset="0"/>
+              <a:buChar char="•"/>
+            </a:pPr>
+            <a:endParaRPr lang="pl-PL" sz="2800" dirty="0" smtClean="0">
+              <a:solidFill>
+                <a:srgbClr val="0070C0"/>
+              </a:solidFill>
+            </a:endParaRPr>
+          </a:p>
+          <a:p>
+            <a:pPr marL="285750" indent="-285750">
+              <a:buFont typeface="Arial" panose="020B0604020202020204" pitchFamily="34" charset="0"/>
+              <a:buChar char="•"/>
+            </a:pPr>
+            <a:r>
+              <a:rPr lang="en-GB" sz="2800" dirty="0">
+                <a:solidFill>
+                  <a:srgbClr val="0070C0"/>
+                </a:solidFill>
+              </a:rPr>
+              <a:t>the potential issue when using the “newest version” of a library is well known and called “dependency hell”. </a:t>
+            </a:r>
+            <a:endParaRPr lang="pl-PL" sz="2800" dirty="0">
+              <a:solidFill>
+                <a:srgbClr val="0070C0"/>
+              </a:solidFill>
+            </a:endParaRPr>
+          </a:p>
+        </p:txBody>
+      </p:sp>
+    </p:spTree>
+    <p:extLst>
+      <p:ext uri="{BB962C8B-B14F-4D97-AF65-F5344CB8AC3E}">
+        <p14:creationId xmlns:p14="http://schemas.microsoft.com/office/powerpoint/2010/main" val="3399400293"/>
+      </p:ext>
+    </p:extLst>
+  </p:cSld>
+  <p:clrMapOvr>
+    <a:masterClrMapping/>
+  </p:clrMapOvr>
+</p:sld>
+</file>
+
+<file path=ppt/slides/slide17.xml><?xml version="1.0" encoding="utf-8"?>
+<p:sld xmlns:a="http://schemas.openxmlformats.org/drawingml/2006/main" xmlns:r="http://schemas.openxmlformats.org/officeDocument/2006/relationships" xmlns:p="http://schemas.openxmlformats.org/presentationml/2006/main">
+  <p:cSld>
+    <p:spTree>
+      <p:nvGrpSpPr>
+        <p:cNvPr id="1" name=""/>
+        <p:cNvGrpSpPr/>
+        <p:nvPr/>
+      </p:nvGrpSpPr>
+      <p:grpSpPr>
+        <a:xfrm>
+          <a:off x="0" y="0"/>
+          <a:ext cx="0" cy="0"/>
+          <a:chOff x="0" y="0"/>
+          <a:chExt cx="0" cy="0"/>
+        </a:xfrm>
+      </p:grpSpPr>
+      <p:pic>
+        <p:nvPicPr>
+          <p:cNvPr id="6" name="Picture 2" descr="Ed_DaSH">
+            <a:extLst>
+              <a:ext uri="{FF2B5EF4-FFF2-40B4-BE49-F238E27FC236}">
+                <a16:creationId xmlns:a16="http://schemas.microsoft.com/office/drawing/2014/main" id="{6F3CF586-06D2-46C3-A4A3-130E31C4A16F}"/>
+              </a:ext>
+            </a:extLst>
+          </p:cNvPr>
+          <p:cNvPicPr>
+            <a:picLocks noChangeAspect="1" noChangeArrowheads="1"/>
+          </p:cNvPicPr>
+          <p:nvPr/>
+        </p:nvPicPr>
+        <p:blipFill>
+          <a:blip r:embed="rId2" cstate="hqprint">
+            <a:extLst>
+              <a:ext uri="{28A0092B-C50C-407E-A947-70E740481C1C}">
+                <a14:useLocalDpi xmlns:a14="http://schemas.microsoft.com/office/drawing/2010/main" val="0"/>
+              </a:ext>
+            </a:extLst>
+          </a:blip>
+          <a:srcRect/>
+          <a:stretch>
+            <a:fillRect/>
+          </a:stretch>
+        </p:blipFill>
+        <p:spPr bwMode="auto">
+          <a:xfrm>
+            <a:off x="10820670" y="5458691"/>
+            <a:ext cx="1289214" cy="1325418"/>
+          </a:xfrm>
+          <a:prstGeom prst="rect">
+            <a:avLst/>
+          </a:prstGeom>
+          <a:noFill/>
+          <a:extLst>
+            <a:ext uri="{909E8E84-426E-40DD-AFC4-6F175D3DCCD1}">
+              <a14:hiddenFill xmlns:a14="http://schemas.microsoft.com/office/drawing/2010/main">
+                <a:solidFill>
+                  <a:srgbClr val="FFFFFF"/>
+                </a:solidFill>
+              </a14:hiddenFill>
+            </a:ext>
+          </a:extLst>
+        </p:spPr>
+      </p:pic>
+      <p:pic>
+        <p:nvPicPr>
+          <p:cNvPr id="3" name="Picture 2" descr="Diagram&#10;&#10;Description automatically generated">
+            <a:extLst>
+              <a:ext uri="{FF2B5EF4-FFF2-40B4-BE49-F238E27FC236}">
+                <a16:creationId xmlns:a16="http://schemas.microsoft.com/office/drawing/2014/main" id="{123E5C8E-6DF3-BA4D-A341-65A34873C501}"/>
+              </a:ext>
+            </a:extLst>
+          </p:cNvPr>
+          <p:cNvPicPr>
+            <a:picLocks noChangeAspect="1"/>
+          </p:cNvPicPr>
+          <p:nvPr/>
+        </p:nvPicPr>
+        <p:blipFill rotWithShape="1">
+          <a:blip r:embed="rId3">
+            <a:extLst>
+              <a:ext uri="{28A0092B-C50C-407E-A947-70E740481C1C}">
+                <a14:useLocalDpi xmlns:a14="http://schemas.microsoft.com/office/drawing/2010/main" val="0"/>
+              </a:ext>
+            </a:extLst>
+          </a:blip>
+          <a:srcRect b="4944"/>
+          <a:stretch/>
+        </p:blipFill>
+        <p:spPr>
+          <a:xfrm>
+            <a:off x="2864504" y="2019182"/>
+            <a:ext cx="6697705" cy="2996987"/>
+          </a:xfrm>
+          <a:prstGeom prst="rect">
+            <a:avLst/>
+          </a:prstGeom>
+        </p:spPr>
+      </p:pic>
+      <p:sp>
+        <p:nvSpPr>
+          <p:cNvPr id="4" name="TextBox 3">
+            <a:extLst>
+              <a:ext uri="{FF2B5EF4-FFF2-40B4-BE49-F238E27FC236}">
+                <a16:creationId xmlns:a16="http://schemas.microsoft.com/office/drawing/2014/main" id="{F4B0FDD5-5348-354F-A378-7241F2AF057B}"/>
+              </a:ext>
+            </a:extLst>
+          </p:cNvPr>
+          <p:cNvSpPr txBox="1"/>
+          <p:nvPr/>
+        </p:nvSpPr>
+        <p:spPr>
+          <a:xfrm>
+            <a:off x="6041348" y="379920"/>
+            <a:ext cx="4779322" cy="769441"/>
+          </a:xfrm>
+          <a:prstGeom prst="rect">
+            <a:avLst/>
+          </a:prstGeom>
+          <a:noFill/>
+        </p:spPr>
+        <p:txBody>
+          <a:bodyPr wrap="none" rtlCol="0">
+            <a:spAutoFit/>
+          </a:bodyPr>
+          <a:lstStyle/>
+          <a:p>
+            <a:pPr algn="ctr"/>
+            <a:r>
+              <a:rPr lang="en-GB" sz="4400" dirty="0">
+                <a:solidFill>
+                  <a:srgbClr val="0070C0"/>
+                </a:solidFill>
+              </a:rPr>
+              <a:t>Semantic versioning</a:t>
+            </a:r>
+          </a:p>
+        </p:txBody>
+      </p:sp>
+    </p:spTree>
+    <p:extLst>
+      <p:ext uri="{BB962C8B-B14F-4D97-AF65-F5344CB8AC3E}">
+        <p14:creationId xmlns:p14="http://schemas.microsoft.com/office/powerpoint/2010/main" val="2081516040"/>
+      </p:ext>
+    </p:extLst>
+  </p:cSld>
+  <p:clrMapOvr>
+    <a:masterClrMapping/>
+  </p:clrMapOvr>
+</p:sld>
+</file>
+
+<file path=ppt/slides/slide18.xml><?xml version="1.0" encoding="utf-8"?>
+<p:sld xmlns:a="http://schemas.openxmlformats.org/drawingml/2006/main" xmlns:r="http://schemas.openxmlformats.org/officeDocument/2006/relationships" xmlns:p="http://schemas.openxmlformats.org/presentationml/2006/main">
+  <p:cSld>
+    <p:spTree>
+      <p:nvGrpSpPr>
+        <p:cNvPr id="1" name=""/>
+        <p:cNvGrpSpPr/>
+        <p:nvPr/>
+      </p:nvGrpSpPr>
+      <p:grpSpPr>
+        <a:xfrm>
+          <a:off x="0" y="0"/>
+          <a:ext cx="0" cy="0"/>
+          <a:chOff x="0" y="0"/>
+          <a:chExt cx="0" cy="0"/>
+        </a:xfrm>
+      </p:grpSpPr>
+      <p:pic>
+        <p:nvPicPr>
+          <p:cNvPr id="8" name="Picture 7" descr="Diagram&#10;&#10;Description automatically generated with medium confidence">
+            <a:extLst>
+              <a:ext uri="{FF2B5EF4-FFF2-40B4-BE49-F238E27FC236}">
+                <a16:creationId xmlns:a16="http://schemas.microsoft.com/office/drawing/2014/main" id="{241EA632-9D85-9640-A37E-8140E49B7B2C}"/>
+              </a:ext>
+            </a:extLst>
+          </p:cNvPr>
+          <p:cNvPicPr>
+            <a:picLocks noChangeAspect="1"/>
+          </p:cNvPicPr>
+          <p:nvPr/>
+        </p:nvPicPr>
+        <p:blipFill>
+          <a:blip r:embed="rId2">
+            <a:extLst>
+              <a:ext uri="{28A0092B-C50C-407E-A947-70E740481C1C}">
+                <a14:useLocalDpi xmlns:a14="http://schemas.microsoft.com/office/drawing/2010/main" val="0"/>
+              </a:ext>
+            </a:extLst>
+          </a:blip>
+          <a:stretch>
+            <a:fillRect/>
+          </a:stretch>
+        </p:blipFill>
+        <p:spPr>
+          <a:xfrm>
+            <a:off x="2254977" y="1942014"/>
+            <a:ext cx="6697705" cy="4090981"/>
+          </a:xfrm>
+          <a:prstGeom prst="rect">
+            <a:avLst/>
+          </a:prstGeom>
+        </p:spPr>
+      </p:pic>
+      <p:pic>
+        <p:nvPicPr>
+          <p:cNvPr id="6" name="Picture 2" descr="Ed_DaSH">
+            <a:extLst>
+              <a:ext uri="{FF2B5EF4-FFF2-40B4-BE49-F238E27FC236}">
+                <a16:creationId xmlns:a16="http://schemas.microsoft.com/office/drawing/2014/main" id="{6F3CF586-06D2-46C3-A4A3-130E31C4A16F}"/>
+              </a:ext>
+            </a:extLst>
+          </p:cNvPr>
+          <p:cNvPicPr>
+            <a:picLocks noChangeAspect="1" noChangeArrowheads="1"/>
+          </p:cNvPicPr>
+          <p:nvPr/>
+        </p:nvPicPr>
+        <p:blipFill>
+          <a:blip r:embed="rId3" cstate="hqprint">
+            <a:extLst>
+              <a:ext uri="{28A0092B-C50C-407E-A947-70E740481C1C}">
+                <a14:useLocalDpi xmlns:a14="http://schemas.microsoft.com/office/drawing/2010/main" val="0"/>
+              </a:ext>
+            </a:extLst>
+          </a:blip>
+          <a:srcRect/>
+          <a:stretch>
+            <a:fillRect/>
+          </a:stretch>
+        </p:blipFill>
+        <p:spPr bwMode="auto">
+          <a:xfrm>
+            <a:off x="10820670" y="5458691"/>
+            <a:ext cx="1289214" cy="1325418"/>
+          </a:xfrm>
+          <a:prstGeom prst="rect">
+            <a:avLst/>
+          </a:prstGeom>
+          <a:noFill/>
+          <a:extLst>
+            <a:ext uri="{909E8E84-426E-40DD-AFC4-6F175D3DCCD1}">
+              <a14:hiddenFill xmlns:a14="http://schemas.microsoft.com/office/drawing/2010/main">
+                <a:solidFill>
+                  <a:srgbClr val="FFFFFF"/>
+                </a:solidFill>
+              </a14:hiddenFill>
+            </a:ext>
+          </a:extLst>
+        </p:spPr>
+      </p:pic>
+      <p:sp>
+        <p:nvSpPr>
+          <p:cNvPr id="4" name="TextBox 3">
+            <a:extLst>
+              <a:ext uri="{FF2B5EF4-FFF2-40B4-BE49-F238E27FC236}">
+                <a16:creationId xmlns:a16="http://schemas.microsoft.com/office/drawing/2014/main" id="{F4B0FDD5-5348-354F-A378-7241F2AF057B}"/>
+              </a:ext>
+            </a:extLst>
+          </p:cNvPr>
+          <p:cNvSpPr txBox="1"/>
+          <p:nvPr/>
+        </p:nvSpPr>
+        <p:spPr>
+          <a:xfrm>
+            <a:off x="6041348" y="379920"/>
+            <a:ext cx="4779322" cy="769441"/>
+          </a:xfrm>
+          <a:prstGeom prst="rect">
+            <a:avLst/>
+          </a:prstGeom>
+          <a:noFill/>
+        </p:spPr>
+        <p:txBody>
+          <a:bodyPr wrap="none" rtlCol="0">
+            <a:spAutoFit/>
+          </a:bodyPr>
+          <a:lstStyle/>
+          <a:p>
+            <a:pPr algn="ctr"/>
+            <a:r>
+              <a:rPr lang="en-GB" sz="4400" dirty="0">
+                <a:solidFill>
+                  <a:srgbClr val="0070C0"/>
+                </a:solidFill>
+              </a:rPr>
+              <a:t>Semantic versioning</a:t>
+            </a:r>
+          </a:p>
+        </p:txBody>
+      </p:sp>
+    </p:spTree>
+    <p:extLst>
+      <p:ext uri="{BB962C8B-B14F-4D97-AF65-F5344CB8AC3E}">
+        <p14:creationId xmlns:p14="http://schemas.microsoft.com/office/powerpoint/2010/main" val="1474349348"/>
+      </p:ext>
+    </p:extLst>
+  </p:cSld>
+  <p:clrMapOvr>
+    <a:masterClrMapping/>
+  </p:clrMapOvr>
+</p:sld>
+</file>
+
+<file path=ppt/slides/slide19.xml><?xml version="1.0" encoding="utf-8"?>
+<p:sld xmlns:a="http://schemas.openxmlformats.org/drawingml/2006/main" xmlns:r="http://schemas.openxmlformats.org/officeDocument/2006/relationships" xmlns:p="http://schemas.openxmlformats.org/presentationml/2006/main">
+  <p:cSld>
+    <p:spTree>
+      <p:nvGrpSpPr>
+        <p:cNvPr id="1" name=""/>
+        <p:cNvGrpSpPr/>
+        <p:nvPr/>
+      </p:nvGrpSpPr>
+      <p:grpSpPr>
+        <a:xfrm>
+          <a:off x="0" y="0"/>
+          <a:ext cx="0" cy="0"/>
+          <a:chOff x="0" y="0"/>
+          <a:chExt cx="0" cy="0"/>
+        </a:xfrm>
+      </p:grpSpPr>
+      <p:pic>
+        <p:nvPicPr>
+          <p:cNvPr id="6" name="Picture 2" descr="Ed_DaSH">
+            <a:extLst>
+              <a:ext uri="{FF2B5EF4-FFF2-40B4-BE49-F238E27FC236}">
+                <a16:creationId xmlns:a16="http://schemas.microsoft.com/office/drawing/2014/main" id="{6F3CF586-06D2-46C3-A4A3-130E31C4A16F}"/>
+              </a:ext>
+            </a:extLst>
+          </p:cNvPr>
+          <p:cNvPicPr>
+            <a:picLocks noChangeAspect="1" noChangeArrowheads="1"/>
+          </p:cNvPicPr>
+          <p:nvPr/>
+        </p:nvPicPr>
+        <p:blipFill>
+          <a:blip r:embed="rId2" cstate="hqprint">
+            <a:extLst>
+              <a:ext uri="{28A0092B-C50C-407E-A947-70E740481C1C}">
+                <a14:useLocalDpi xmlns:a14="http://schemas.microsoft.com/office/drawing/2010/main" val="0"/>
+              </a:ext>
+            </a:extLst>
+          </a:blip>
+          <a:srcRect/>
+          <a:stretch>
+            <a:fillRect/>
+          </a:stretch>
+        </p:blipFill>
+        <p:spPr bwMode="auto">
+          <a:xfrm>
+            <a:off x="10820670" y="5458691"/>
+            <a:ext cx="1289214" cy="1325418"/>
+          </a:xfrm>
+          <a:prstGeom prst="rect">
+            <a:avLst/>
+          </a:prstGeom>
+          <a:noFill/>
+          <a:extLst>
+            <a:ext uri="{909E8E84-426E-40DD-AFC4-6F175D3DCCD1}">
+              <a14:hiddenFill xmlns:a14="http://schemas.microsoft.com/office/drawing/2010/main">
+                <a:solidFill>
+                  <a:srgbClr val="FFFFFF"/>
+                </a:solidFill>
+              </a14:hiddenFill>
+            </a:ext>
+          </a:extLst>
+        </p:spPr>
+      </p:pic>
+      <p:sp>
+        <p:nvSpPr>
+          <p:cNvPr id="4" name="TextBox 3">
+            <a:extLst>
+              <a:ext uri="{FF2B5EF4-FFF2-40B4-BE49-F238E27FC236}">
+                <a16:creationId xmlns:a16="http://schemas.microsoft.com/office/drawing/2014/main" id="{F4B0FDD5-5348-354F-A378-7241F2AF057B}"/>
+              </a:ext>
+            </a:extLst>
+          </p:cNvPr>
+          <p:cNvSpPr txBox="1"/>
+          <p:nvPr/>
+        </p:nvSpPr>
+        <p:spPr>
+          <a:xfrm>
+            <a:off x="6041348" y="379920"/>
+            <a:ext cx="4779322" cy="769441"/>
+          </a:xfrm>
+          <a:prstGeom prst="rect">
+            <a:avLst/>
+          </a:prstGeom>
+          <a:noFill/>
+        </p:spPr>
+        <p:txBody>
+          <a:bodyPr wrap="none" rtlCol="0">
+            <a:spAutoFit/>
+          </a:bodyPr>
+          <a:lstStyle/>
+          <a:p>
+            <a:pPr algn="ctr"/>
+            <a:r>
+              <a:rPr lang="en-GB" sz="4400" dirty="0">
+                <a:solidFill>
+                  <a:srgbClr val="0070C0"/>
+                </a:solidFill>
+              </a:rPr>
+              <a:t>Semantic versioning</a:t>
+            </a:r>
+          </a:p>
+        </p:txBody>
+      </p:sp>
+      <p:sp>
+        <p:nvSpPr>
+          <p:cNvPr id="5" name="Rectangle 4">
+            <a:extLst>
+              <a:ext uri="{FF2B5EF4-FFF2-40B4-BE49-F238E27FC236}">
+                <a16:creationId xmlns:a16="http://schemas.microsoft.com/office/drawing/2014/main" id="{7AAE078A-6B0F-0A4D-8D08-92C32F04F022}"/>
+              </a:ext>
+            </a:extLst>
+          </p:cNvPr>
+          <p:cNvSpPr/>
+          <p:nvPr/>
+        </p:nvSpPr>
+        <p:spPr>
+          <a:xfrm>
+            <a:off x="978965" y="2088855"/>
+            <a:ext cx="10195715" cy="2677656"/>
+          </a:xfrm>
+          <a:prstGeom prst="rect">
+            <a:avLst/>
+          </a:prstGeom>
+        </p:spPr>
+        <p:txBody>
+          <a:bodyPr wrap="square">
+            <a:spAutoFit/>
+          </a:bodyPr>
+          <a:lstStyle/>
+          <a:p>
+            <a:r>
+              <a:rPr lang="sv-SE" sz="2800" dirty="0">
+                <a:solidFill>
+                  <a:srgbClr val="0070C0"/>
+                </a:solidFill>
+                <a:latin typeface="Courier New" panose="02070309020205020404" pitchFamily="49" charset="0"/>
+                <a:cs typeface="Courier New" panose="02070309020205020404" pitchFamily="49" charset="0"/>
+              </a:rPr>
+              <a:t>1.91.12</a:t>
+            </a:r>
+          </a:p>
+          <a:p>
+            <a:r>
+              <a:rPr lang="sv-SE" sz="2800" dirty="0">
+                <a:solidFill>
+                  <a:srgbClr val="0070C0"/>
+                </a:solidFill>
+                <a:latin typeface="Courier New" panose="02070309020205020404" pitchFamily="49" charset="0"/>
+                <a:cs typeface="Courier New" panose="02070309020205020404" pitchFamily="49" charset="0"/>
+              </a:rPr>
+              <a:t>1.91.8</a:t>
+            </a:r>
+          </a:p>
+          <a:p>
+            <a:r>
+              <a:rPr lang="sv-SE" sz="2800" dirty="0">
+                <a:solidFill>
+                  <a:srgbClr val="0070C0"/>
+                </a:solidFill>
+                <a:latin typeface="Courier New" panose="02070309020205020404" pitchFamily="49" charset="0"/>
+                <a:cs typeface="Courier New" panose="02070309020205020404" pitchFamily="49" charset="0"/>
+              </a:rPr>
+              <a:t>2.13.3-alpha </a:t>
+            </a:r>
+          </a:p>
+          <a:p>
+            <a:r>
+              <a:rPr lang="sv-SE" sz="2800" dirty="0">
+                <a:solidFill>
+                  <a:srgbClr val="0070C0"/>
+                </a:solidFill>
+                <a:latin typeface="Courier New" panose="02070309020205020404" pitchFamily="49" charset="0"/>
+                <a:cs typeface="Courier New" panose="02070309020205020404" pitchFamily="49" charset="0"/>
+              </a:rPr>
+              <a:t>2.14-alpha </a:t>
+            </a:r>
+          </a:p>
+          <a:p>
+            <a:r>
+              <a:rPr lang="sv-SE" sz="2800" dirty="0">
+                <a:solidFill>
+                  <a:srgbClr val="0070C0"/>
+                </a:solidFill>
+                <a:latin typeface="Courier New" panose="02070309020205020404" pitchFamily="49" charset="0"/>
+                <a:cs typeface="Courier New" panose="02070309020205020404" pitchFamily="49" charset="0"/>
+              </a:rPr>
+              <a:t>2.15-beta</a:t>
+            </a:r>
+          </a:p>
+          <a:p>
+            <a:r>
+              <a:rPr lang="sv-SE" sz="2800" dirty="0">
+                <a:solidFill>
+                  <a:srgbClr val="0070C0"/>
+                </a:solidFill>
+                <a:latin typeface="Courier New" panose="02070309020205020404" pitchFamily="49" charset="0"/>
+                <a:cs typeface="Courier New" panose="02070309020205020404" pitchFamily="49" charset="0"/>
+              </a:rPr>
+              <a:t>3.0.923</a:t>
+            </a:r>
+            <a:endParaRPr lang="pl-PL" sz="2800" dirty="0">
+              <a:solidFill>
+                <a:srgbClr val="0070C0"/>
+              </a:solidFill>
+              <a:latin typeface="Courier New" panose="02070309020205020404" pitchFamily="49" charset="0"/>
+              <a:cs typeface="Courier New" panose="02070309020205020404" pitchFamily="49" charset="0"/>
+            </a:endParaRPr>
+          </a:p>
+        </p:txBody>
+      </p:sp>
+    </p:spTree>
+    <p:extLst>
+      <p:ext uri="{BB962C8B-B14F-4D97-AF65-F5344CB8AC3E}">
+        <p14:creationId xmlns:p14="http://schemas.microsoft.com/office/powerpoint/2010/main" val="310600574"/>
+      </p:ext>
+    </p:extLst>
+  </p:cSld>
+  <p:clrMapOvr>
+    <a:masterClrMapping/>
+  </p:clrMapOvr>
+</p:sld>
+</file>
+
+<file path=ppt/slides/slide2.xml><?xml version="1.0" encoding="utf-8"?>
+<p:sld xmlns:a="http://schemas.openxmlformats.org/drawingml/2006/main" xmlns:r="http://schemas.openxmlformats.org/officeDocument/2006/relationships" xmlns:p="http://schemas.openxmlformats.org/presentationml/2006/main">
+  <p:cSld>
+    <p:spTree>
+      <p:nvGrpSpPr>
+        <p:cNvPr id="1" name=""/>
+        <p:cNvGrpSpPr/>
+        <p:nvPr/>
+      </p:nvGrpSpPr>
+      <p:grpSpPr>
+        <a:xfrm>
+          <a:off x="0" y="0"/>
+          <a:ext cx="0" cy="0"/>
+          <a:chOff x="0" y="0"/>
+          <a:chExt cx="0" cy="0"/>
+        </a:xfrm>
+      </p:grpSpPr>
+      <p:pic>
+        <p:nvPicPr>
+          <p:cNvPr id="5122" name="Picture 2" descr="Ed_DaSH">
+            <a:extLst>
+              <a:ext uri="{FF2B5EF4-FFF2-40B4-BE49-F238E27FC236}">
+                <a16:creationId xmlns:a16="http://schemas.microsoft.com/office/drawing/2014/main" id="{9D1BBF7C-A031-41E6-BB30-3FB40874A4B9}"/>
+              </a:ext>
+            </a:extLst>
+          </p:cNvPr>
+          <p:cNvPicPr>
+            <a:picLocks noChangeAspect="1" noChangeArrowheads="1"/>
+          </p:cNvPicPr>
+          <p:nvPr/>
+        </p:nvPicPr>
+        <p:blipFill>
+          <a:blip r:embed="rId2" cstate="hqprint">
+            <a:extLst>
+              <a:ext uri="{28A0092B-C50C-407E-A947-70E740481C1C}">
+                <a14:useLocalDpi xmlns:a14="http://schemas.microsoft.com/office/drawing/2010/main" val="0"/>
+              </a:ext>
+            </a:extLst>
+          </a:blip>
+          <a:srcRect/>
+          <a:stretch>
+            <a:fillRect/>
+          </a:stretch>
+        </p:blipFill>
+        <p:spPr bwMode="auto">
+          <a:xfrm>
+            <a:off x="10820670" y="5458691"/>
+            <a:ext cx="1289214" cy="1325418"/>
+          </a:xfrm>
+          <a:prstGeom prst="rect">
+            <a:avLst/>
+          </a:prstGeom>
+          <a:noFill/>
+          <a:extLst>
+            <a:ext uri="{909E8E84-426E-40DD-AFC4-6F175D3DCCD1}">
+              <a14:hiddenFill xmlns:a14="http://schemas.microsoft.com/office/drawing/2010/main">
+                <a:solidFill>
+                  <a:srgbClr val="FFFFFF"/>
+                </a:solidFill>
+              </a14:hiddenFill>
+            </a:ext>
+          </a:extLst>
+        </p:spPr>
+      </p:pic>
+      <p:pic>
+        <p:nvPicPr>
+          <p:cNvPr id="3" name="Picture 2" descr="A picture containing timeline&#10;&#10;Description automatically generated">
+            <a:extLst>
+              <a:ext uri="{FF2B5EF4-FFF2-40B4-BE49-F238E27FC236}">
+                <a16:creationId xmlns:a16="http://schemas.microsoft.com/office/drawing/2014/main" id="{1C04F944-4E8A-2C43-982D-560B3A1FBC6B}"/>
+              </a:ext>
+            </a:extLst>
+          </p:cNvPr>
+          <p:cNvPicPr>
+            <a:picLocks noChangeAspect="1"/>
+          </p:cNvPicPr>
+          <p:nvPr/>
+        </p:nvPicPr>
+        <p:blipFill>
+          <a:blip r:embed="rId3">
+            <a:extLst>
+              <a:ext uri="{28A0092B-C50C-407E-A947-70E740481C1C}">
+                <a14:useLocalDpi xmlns:a14="http://schemas.microsoft.com/office/drawing/2010/main" val="0"/>
+              </a:ext>
+            </a:extLst>
+          </a:blip>
+          <a:stretch>
+            <a:fillRect/>
+          </a:stretch>
+        </p:blipFill>
+        <p:spPr>
+          <a:xfrm>
+            <a:off x="3317966" y="162186"/>
+            <a:ext cx="4843225" cy="6467214"/>
+          </a:xfrm>
+          <a:prstGeom prst="rect">
+            <a:avLst/>
+          </a:prstGeom>
+        </p:spPr>
+      </p:pic>
+    </p:spTree>
+    <p:extLst>
+      <p:ext uri="{BB962C8B-B14F-4D97-AF65-F5344CB8AC3E}">
+        <p14:creationId xmlns:p14="http://schemas.microsoft.com/office/powerpoint/2010/main" val="2061045459"/>
+      </p:ext>
+    </p:extLst>
+  </p:cSld>
+  <p:clrMapOvr>
+    <a:masterClrMapping/>
+  </p:clrMapOvr>
+</p:sld>
+</file>
+
+<file path=ppt/slides/slide20.xml><?xml version="1.0" encoding="utf-8"?>
+<p:sld xmlns:a="http://schemas.openxmlformats.org/drawingml/2006/main" xmlns:r="http://schemas.openxmlformats.org/officeDocument/2006/relationships" xmlns:p="http://schemas.openxmlformats.org/presentationml/2006/main">
+  <p:cSld>
+    <p:spTree>
+      <p:nvGrpSpPr>
+        <p:cNvPr id="1" name=""/>
+        <p:cNvGrpSpPr/>
+        <p:nvPr/>
+      </p:nvGrpSpPr>
+      <p:grpSpPr>
+        <a:xfrm>
+          <a:off x="0" y="0"/>
+          <a:ext cx="0" cy="0"/>
+          <a:chOff x="0" y="0"/>
+          <a:chExt cx="0" cy="0"/>
+        </a:xfrm>
+      </p:grpSpPr>
+      <p:pic>
+        <p:nvPicPr>
+          <p:cNvPr id="6" name="Picture 2" descr="Ed_DaSH">
+            <a:extLst>
+              <a:ext uri="{FF2B5EF4-FFF2-40B4-BE49-F238E27FC236}">
+                <a16:creationId xmlns:a16="http://schemas.microsoft.com/office/drawing/2014/main" id="{6F3CF586-06D2-46C3-A4A3-130E31C4A16F}"/>
+              </a:ext>
+            </a:extLst>
+          </p:cNvPr>
+          <p:cNvPicPr>
+            <a:picLocks noChangeAspect="1" noChangeArrowheads="1"/>
+          </p:cNvPicPr>
+          <p:nvPr/>
+        </p:nvPicPr>
+        <p:blipFill>
+          <a:blip r:embed="rId2" cstate="hqprint">
+            <a:extLst>
+              <a:ext uri="{28A0092B-C50C-407E-A947-70E740481C1C}">
+                <a14:useLocalDpi xmlns:a14="http://schemas.microsoft.com/office/drawing/2010/main" val="0"/>
+              </a:ext>
+            </a:extLst>
+          </a:blip>
+          <a:srcRect/>
+          <a:stretch>
+            <a:fillRect/>
+          </a:stretch>
+        </p:blipFill>
+        <p:spPr bwMode="auto">
+          <a:xfrm>
+            <a:off x="10820670" y="5458691"/>
+            <a:ext cx="1289214" cy="1325418"/>
+          </a:xfrm>
+          <a:prstGeom prst="rect">
+            <a:avLst/>
+          </a:prstGeom>
+          <a:noFill/>
+          <a:extLst>
+            <a:ext uri="{909E8E84-426E-40DD-AFC4-6F175D3DCCD1}">
+              <a14:hiddenFill xmlns:a14="http://schemas.microsoft.com/office/drawing/2010/main">
+                <a:solidFill>
+                  <a:srgbClr val="FFFFFF"/>
+                </a:solidFill>
+              </a14:hiddenFill>
+            </a:ext>
+          </a:extLst>
+        </p:spPr>
+      </p:pic>
+      <p:sp>
+        <p:nvSpPr>
+          <p:cNvPr id="4" name="TextBox 3">
+            <a:extLst>
+              <a:ext uri="{FF2B5EF4-FFF2-40B4-BE49-F238E27FC236}">
+                <a16:creationId xmlns:a16="http://schemas.microsoft.com/office/drawing/2014/main" id="{F4B0FDD5-5348-354F-A378-7241F2AF057B}"/>
+              </a:ext>
+            </a:extLst>
+          </p:cNvPr>
+          <p:cNvSpPr txBox="1"/>
+          <p:nvPr/>
+        </p:nvSpPr>
+        <p:spPr>
+          <a:xfrm>
+            <a:off x="6041348" y="379920"/>
+            <a:ext cx="4779322" cy="769441"/>
+          </a:xfrm>
+          <a:prstGeom prst="rect">
+            <a:avLst/>
+          </a:prstGeom>
+          <a:noFill/>
+        </p:spPr>
+        <p:txBody>
+          <a:bodyPr wrap="none" rtlCol="0">
+            <a:spAutoFit/>
+          </a:bodyPr>
+          <a:lstStyle/>
+          <a:p>
+            <a:pPr algn="ctr"/>
+            <a:r>
+              <a:rPr lang="en-GB" sz="4400" dirty="0">
+                <a:solidFill>
+                  <a:srgbClr val="0070C0"/>
+                </a:solidFill>
+              </a:rPr>
+              <a:t>Semantic versioning</a:t>
+            </a:r>
+          </a:p>
+        </p:txBody>
+      </p:sp>
+      <p:sp>
+        <p:nvSpPr>
+          <p:cNvPr id="5" name="Rectangle 4">
+            <a:extLst>
+              <a:ext uri="{FF2B5EF4-FFF2-40B4-BE49-F238E27FC236}">
+                <a16:creationId xmlns:a16="http://schemas.microsoft.com/office/drawing/2014/main" id="{7AAE078A-6B0F-0A4D-8D08-92C32F04F022}"/>
+              </a:ext>
+            </a:extLst>
+          </p:cNvPr>
+          <p:cNvSpPr/>
+          <p:nvPr/>
+        </p:nvSpPr>
+        <p:spPr>
+          <a:xfrm>
+            <a:off x="978965" y="2088855"/>
+            <a:ext cx="10195715" cy="523220"/>
+          </a:xfrm>
+          <a:prstGeom prst="rect">
+            <a:avLst/>
+          </a:prstGeom>
+        </p:spPr>
+        <p:txBody>
+          <a:bodyPr wrap="square">
+            <a:spAutoFit/>
+          </a:bodyPr>
+          <a:lstStyle/>
+          <a:p>
+            <a:r>
+              <a:rPr lang="pl-PL" sz="2800" dirty="0" smtClean="0">
+                <a:solidFill>
+                  <a:srgbClr val="0070C0"/>
+                </a:solidFill>
+                <a:latin typeface="Courier New" panose="02070309020205020404" pitchFamily="49" charset="0"/>
+                <a:cs typeface="Courier New" panose="02070309020205020404" pitchFamily="49" charset="0"/>
+              </a:rPr>
+              <a:t>Excercise</a:t>
+            </a:r>
+            <a:endParaRPr lang="pl-PL" sz="2800" dirty="0">
+              <a:solidFill>
+                <a:srgbClr val="0070C0"/>
+              </a:solidFill>
+              <a:latin typeface="Courier New" panose="02070309020205020404" pitchFamily="49" charset="0"/>
+              <a:cs typeface="Courier New" panose="02070309020205020404" pitchFamily="49" charset="0"/>
+            </a:endParaRPr>
+          </a:p>
+        </p:txBody>
+      </p:sp>
+    </p:spTree>
+    <p:extLst>
+      <p:ext uri="{BB962C8B-B14F-4D97-AF65-F5344CB8AC3E}">
+        <p14:creationId xmlns:p14="http://schemas.microsoft.com/office/powerpoint/2010/main" val="2028217241"/>
+      </p:ext>
+    </p:extLst>
+  </p:cSld>
+  <p:clrMapOvr>
+    <a:masterClrMapping/>
+  </p:clrMapOvr>
+</p:sld>
+</file>
+
+<file path=ppt/slides/slide3.xml><?xml version="1.0" encoding="utf-8"?>
+<p:sld xmlns:a="http://schemas.openxmlformats.org/drawingml/2006/main" xmlns:r="http://schemas.openxmlformats.org/officeDocument/2006/relationships" xmlns:p="http://schemas.openxmlformats.org/presentationml/2006/main">
+  <p:cSld>
+    <p:spTree>
+      <p:nvGrpSpPr>
+        <p:cNvPr id="1" name=""/>
+        <p:cNvGrpSpPr/>
+        <p:nvPr/>
+      </p:nvGrpSpPr>
+      <p:grpSpPr>
+        <a:xfrm>
+          <a:off x="0" y="0"/>
+          <a:ext cx="0" cy="0"/>
+          <a:chOff x="0" y="0"/>
+          <a:chExt cx="0" cy="0"/>
+        </a:xfrm>
+      </p:grpSpPr>
+      <p:sp>
+        <p:nvSpPr>
+          <p:cNvPr id="5" name="TextBox 4">
+            <a:extLst>
+              <a:ext uri="{FF2B5EF4-FFF2-40B4-BE49-F238E27FC236}">
+                <a16:creationId xmlns:a16="http://schemas.microsoft.com/office/drawing/2014/main" id="{3A7A1F5C-9C70-4DE3-BA39-7835B2935EB3}"/>
+              </a:ext>
+            </a:extLst>
+          </p:cNvPr>
+          <p:cNvSpPr txBox="1"/>
+          <p:nvPr/>
+        </p:nvSpPr>
+        <p:spPr>
+          <a:xfrm>
+            <a:off x="1138104" y="1569406"/>
+            <a:ext cx="9464530" cy="3970318"/>
+          </a:xfrm>
+          <a:prstGeom prst="rect">
+            <a:avLst/>
+          </a:prstGeom>
+          <a:noFill/>
+        </p:spPr>
+        <p:txBody>
+          <a:bodyPr wrap="square">
+            <a:spAutoFit/>
+          </a:bodyPr>
+          <a:lstStyle/>
+          <a:p>
+            <a:r>
+              <a:rPr lang="en-GB" sz="2800" dirty="0">
+                <a:solidFill>
+                  <a:srgbClr val="0070C0"/>
+                </a:solidFill>
+              </a:rPr>
+              <a:t>Projects are not static, and actions introduce changes.</a:t>
+            </a:r>
+          </a:p>
+          <a:p>
+            <a:endParaRPr lang="en-GB" sz="2800" dirty="0">
+              <a:solidFill>
+                <a:srgbClr val="0070C0"/>
+              </a:solidFill>
+            </a:endParaRPr>
+          </a:p>
+          <a:p>
+            <a:pPr marL="457200" indent="-457200">
+              <a:buFont typeface="Arial" panose="020B0604020202020204" pitchFamily="34" charset="0"/>
+              <a:buChar char="•"/>
+            </a:pPr>
+            <a:r>
+              <a:rPr lang="en-GB" sz="2800" dirty="0">
+                <a:solidFill>
+                  <a:srgbClr val="0070C0"/>
+                </a:solidFill>
+              </a:rPr>
+              <a:t>add new files</a:t>
+            </a:r>
+          </a:p>
+          <a:p>
+            <a:pPr marL="457200" indent="-457200">
+              <a:buFont typeface="Arial" panose="020B0604020202020204" pitchFamily="34" charset="0"/>
+              <a:buChar char="•"/>
+            </a:pPr>
+            <a:r>
+              <a:rPr lang="en-GB" sz="2800" dirty="0">
+                <a:solidFill>
+                  <a:srgbClr val="0070C0"/>
+                </a:solidFill>
+              </a:rPr>
+              <a:t>add data entries to files</a:t>
+            </a:r>
+          </a:p>
+          <a:p>
+            <a:pPr marL="457200" indent="-457200">
+              <a:buFont typeface="Arial" panose="020B0604020202020204" pitchFamily="34" charset="0"/>
+              <a:buChar char="•"/>
+            </a:pPr>
+            <a:r>
+              <a:rPr lang="en-GB" sz="2800" dirty="0">
+                <a:solidFill>
+                  <a:srgbClr val="0070C0"/>
+                </a:solidFill>
+              </a:rPr>
+              <a:t>modify manuscripts / methods</a:t>
+            </a:r>
+          </a:p>
+          <a:p>
+            <a:pPr marL="457200" indent="-457200">
+              <a:buFont typeface="Arial" panose="020B0604020202020204" pitchFamily="34" charset="0"/>
+              <a:buChar char="•"/>
+            </a:pPr>
+            <a:r>
+              <a:rPr lang="en-GB" sz="2800" dirty="0">
+                <a:solidFill>
+                  <a:srgbClr val="0070C0"/>
+                </a:solidFill>
+              </a:rPr>
+              <a:t>reformat / reorganize data tables</a:t>
+            </a:r>
+          </a:p>
+          <a:p>
+            <a:pPr marL="457200" indent="-457200">
+              <a:buFont typeface="Arial" panose="020B0604020202020204" pitchFamily="34" charset="0"/>
+              <a:buChar char="•"/>
+            </a:pPr>
+            <a:r>
+              <a:rPr lang="en-GB" sz="2800" dirty="0">
+                <a:solidFill>
+                  <a:srgbClr val="0070C0"/>
+                </a:solidFill>
+              </a:rPr>
+              <a:t>reanalyse data / update figures</a:t>
+            </a:r>
+          </a:p>
+          <a:p>
+            <a:pPr marL="457200" indent="-457200">
+              <a:buFont typeface="Arial" panose="020B0604020202020204" pitchFamily="34" charset="0"/>
+              <a:buChar char="•"/>
+            </a:pPr>
+            <a:r>
+              <a:rPr lang="en-GB" sz="2800" dirty="0">
+                <a:solidFill>
+                  <a:srgbClr val="0070C0"/>
+                </a:solidFill>
+              </a:rPr>
+              <a:t>experiment with data cleaning / processing / visualization</a:t>
+            </a:r>
+          </a:p>
+          <a:p>
+            <a:pPr marL="457200" indent="-457200">
+              <a:buFont typeface="Arial" panose="020B0604020202020204" pitchFamily="34" charset="0"/>
+              <a:buChar char="•"/>
+            </a:pPr>
+            <a:r>
+              <a:rPr lang="en-GB" sz="2800" dirty="0">
+                <a:solidFill>
+                  <a:srgbClr val="0070C0"/>
+                </a:solidFill>
+              </a:rPr>
+              <a:t>share and co-edit data or text file</a:t>
+            </a:r>
+            <a:endParaRPr lang="en-GB" sz="2800" dirty="0">
+              <a:solidFill>
+                <a:srgbClr val="0070C0"/>
+              </a:solidFill>
+            </a:endParaRPr>
+          </a:p>
+        </p:txBody>
+      </p:sp>
+      <p:pic>
+        <p:nvPicPr>
+          <p:cNvPr id="6" name="Picture 2" descr="Ed_DaSH">
+            <a:extLst>
+              <a:ext uri="{FF2B5EF4-FFF2-40B4-BE49-F238E27FC236}">
+                <a16:creationId xmlns:a16="http://schemas.microsoft.com/office/drawing/2014/main" id="{6F3CF586-06D2-46C3-A4A3-130E31C4A16F}"/>
+              </a:ext>
+            </a:extLst>
+          </p:cNvPr>
+          <p:cNvPicPr>
+            <a:picLocks noChangeAspect="1" noChangeArrowheads="1"/>
+          </p:cNvPicPr>
+          <p:nvPr/>
+        </p:nvPicPr>
+        <p:blipFill>
+          <a:blip r:embed="rId2" cstate="hqprint">
+            <a:extLst>
+              <a:ext uri="{28A0092B-C50C-407E-A947-70E740481C1C}">
+                <a14:useLocalDpi xmlns:a14="http://schemas.microsoft.com/office/drawing/2010/main" val="0"/>
+              </a:ext>
+            </a:extLst>
+          </a:blip>
+          <a:srcRect/>
+          <a:stretch>
+            <a:fillRect/>
+          </a:stretch>
+        </p:blipFill>
+        <p:spPr bwMode="auto">
+          <a:xfrm>
+            <a:off x="10820670" y="5458691"/>
+            <a:ext cx="1289214" cy="1325418"/>
+          </a:xfrm>
+          <a:prstGeom prst="rect">
+            <a:avLst/>
+          </a:prstGeom>
+          <a:noFill/>
+          <a:extLst>
+            <a:ext uri="{909E8E84-426E-40DD-AFC4-6F175D3DCCD1}">
+              <a14:hiddenFill xmlns:a14="http://schemas.microsoft.com/office/drawing/2010/main">
+                <a:solidFill>
+                  <a:srgbClr val="FFFFFF"/>
+                </a:solidFill>
+              </a14:hiddenFill>
+            </a:ext>
+          </a:extLst>
+        </p:spPr>
+      </p:pic>
+    </p:spTree>
+    <p:extLst>
+      <p:ext uri="{BB962C8B-B14F-4D97-AF65-F5344CB8AC3E}">
+        <p14:creationId xmlns:p14="http://schemas.microsoft.com/office/powerpoint/2010/main" val="4286087962"/>
+      </p:ext>
+    </p:extLst>
+  </p:cSld>
+  <p:clrMapOvr>
+    <a:masterClrMapping/>
+  </p:clrMapOvr>
+</p:sld>
+</file>
+
+<file path=ppt/slides/slide4.xml><?xml version="1.0" encoding="utf-8"?>
+<p:sld xmlns:a="http://schemas.openxmlformats.org/drawingml/2006/main" xmlns:r="http://schemas.openxmlformats.org/officeDocument/2006/relationships" xmlns:p="http://schemas.openxmlformats.org/presentationml/2006/main">
+  <p:cSld>
+    <p:spTree>
+      <p:nvGrpSpPr>
+        <p:cNvPr id="1" name=""/>
+        <p:cNvGrpSpPr/>
+        <p:nvPr/>
+      </p:nvGrpSpPr>
+      <p:grpSpPr>
+        <a:xfrm>
+          <a:off x="0" y="0"/>
+          <a:ext cx="0" cy="0"/>
+          <a:chOff x="0" y="0"/>
+          <a:chExt cx="0" cy="0"/>
+        </a:xfrm>
+      </p:grpSpPr>
+      <p:sp>
+        <p:nvSpPr>
+          <p:cNvPr id="5" name="TextBox 4">
+            <a:extLst>
+              <a:ext uri="{FF2B5EF4-FFF2-40B4-BE49-F238E27FC236}">
+                <a16:creationId xmlns:a16="http://schemas.microsoft.com/office/drawing/2014/main" id="{3A7A1F5C-9C70-4DE3-BA39-7835B2935EB3}"/>
+              </a:ext>
+            </a:extLst>
+          </p:cNvPr>
+          <p:cNvSpPr txBox="1"/>
+          <p:nvPr/>
+        </p:nvSpPr>
+        <p:spPr>
+          <a:xfrm>
+            <a:off x="1363735" y="1129464"/>
+            <a:ext cx="9464530" cy="1384995"/>
+          </a:xfrm>
+          <a:prstGeom prst="rect">
+            <a:avLst/>
+          </a:prstGeom>
+          <a:noFill/>
+        </p:spPr>
+        <p:txBody>
+          <a:bodyPr wrap="square">
+            <a:spAutoFit/>
+          </a:bodyPr>
+          <a:lstStyle/>
+          <a:p>
+            <a:r>
+              <a:rPr lang="en-GB" sz="2800" dirty="0">
+                <a:solidFill>
+                  <a:srgbClr val="0070C0"/>
+                </a:solidFill>
+              </a:rPr>
+              <a:t>Exercise 1: </a:t>
+            </a:r>
+          </a:p>
+          <a:p>
+            <a:pPr algn="ctr"/>
+            <a:endParaRPr lang="en-GB" sz="2800" dirty="0">
+              <a:solidFill>
+                <a:srgbClr val="0070C0"/>
+              </a:solidFill>
+            </a:endParaRPr>
+          </a:p>
+          <a:p>
+            <a:pPr algn="ctr"/>
+            <a:r>
+              <a:rPr lang="en-GB" sz="2800" dirty="0">
+                <a:solidFill>
+                  <a:srgbClr val="0070C0"/>
+                </a:solidFill>
+              </a:rPr>
+              <a:t>Problems with a change</a:t>
+            </a:r>
+          </a:p>
+        </p:txBody>
+      </p:sp>
+      <p:pic>
+        <p:nvPicPr>
+          <p:cNvPr id="4" name="Picture 2" descr="Ed_DaSH">
+            <a:extLst>
+              <a:ext uri="{FF2B5EF4-FFF2-40B4-BE49-F238E27FC236}">
+                <a16:creationId xmlns:a16="http://schemas.microsoft.com/office/drawing/2014/main" id="{A783256F-E39E-4712-96B0-240BD611CFEB}"/>
+              </a:ext>
+            </a:extLst>
+          </p:cNvPr>
+          <p:cNvPicPr>
+            <a:picLocks noChangeAspect="1" noChangeArrowheads="1"/>
+          </p:cNvPicPr>
+          <p:nvPr/>
+        </p:nvPicPr>
+        <p:blipFill>
+          <a:blip r:embed="rId2" cstate="hqprint">
+            <a:extLst>
+              <a:ext uri="{28A0092B-C50C-407E-A947-70E740481C1C}">
+                <a14:useLocalDpi xmlns:a14="http://schemas.microsoft.com/office/drawing/2010/main" val="0"/>
+              </a:ext>
+            </a:extLst>
+          </a:blip>
+          <a:srcRect/>
+          <a:stretch>
+            <a:fillRect/>
+          </a:stretch>
+        </p:blipFill>
+        <p:spPr bwMode="auto">
+          <a:xfrm>
+            <a:off x="10820670" y="5458691"/>
+            <a:ext cx="1289214" cy="1325418"/>
+          </a:xfrm>
+          <a:prstGeom prst="rect">
+            <a:avLst/>
+          </a:prstGeom>
+          <a:noFill/>
+          <a:extLst>
+            <a:ext uri="{909E8E84-426E-40DD-AFC4-6F175D3DCCD1}">
+              <a14:hiddenFill xmlns:a14="http://schemas.microsoft.com/office/drawing/2010/main">
+                <a:solidFill>
+                  <a:srgbClr val="FFFFFF"/>
+                </a:solidFill>
+              </a14:hiddenFill>
+            </a:ext>
+          </a:extLst>
+        </p:spPr>
+      </p:pic>
+    </p:spTree>
+    <p:extLst>
+      <p:ext uri="{BB962C8B-B14F-4D97-AF65-F5344CB8AC3E}">
+        <p14:creationId xmlns:p14="http://schemas.microsoft.com/office/powerpoint/2010/main" val="2280054951"/>
+      </p:ext>
+    </p:extLst>
+  </p:cSld>
+  <p:clrMapOvr>
+    <a:masterClrMapping/>
+  </p:clrMapOvr>
+</p:sld>
+</file>
+
+<file path=ppt/slides/slide5.xml><?xml version="1.0" encoding="utf-8"?>
+<p:sld xmlns:a="http://schemas.openxmlformats.org/drawingml/2006/main" xmlns:r="http://schemas.openxmlformats.org/officeDocument/2006/relationships" xmlns:p="http://schemas.openxmlformats.org/presentationml/2006/main">
+  <p:cSld>
+    <p:spTree>
+      <p:nvGrpSpPr>
+        <p:cNvPr id="1" name=""/>
+        <p:cNvGrpSpPr/>
+        <p:nvPr/>
+      </p:nvGrpSpPr>
+      <p:grpSpPr>
+        <a:xfrm>
+          <a:off x="0" y="0"/>
+          <a:ext cx="0" cy="0"/>
+          <a:chOff x="0" y="0"/>
+          <a:chExt cx="0" cy="0"/>
+        </a:xfrm>
+      </p:grpSpPr>
+      <p:sp>
+        <p:nvSpPr>
+          <p:cNvPr id="5" name="TextBox 4">
+            <a:extLst>
+              <a:ext uri="{FF2B5EF4-FFF2-40B4-BE49-F238E27FC236}">
+                <a16:creationId xmlns:a16="http://schemas.microsoft.com/office/drawing/2014/main" id="{3A7A1F5C-9C70-4DE3-BA39-7835B2935EB3}"/>
+              </a:ext>
+            </a:extLst>
+          </p:cNvPr>
+          <p:cNvSpPr txBox="1"/>
+          <p:nvPr/>
+        </p:nvSpPr>
+        <p:spPr>
+          <a:xfrm>
+            <a:off x="1079321" y="530909"/>
+            <a:ext cx="9464530" cy="5262979"/>
+          </a:xfrm>
+          <a:prstGeom prst="rect">
+            <a:avLst/>
+          </a:prstGeom>
+          <a:noFill/>
+        </p:spPr>
+        <p:txBody>
+          <a:bodyPr wrap="square">
+            <a:spAutoFit/>
+          </a:bodyPr>
+          <a:lstStyle/>
+          <a:p>
+            <a:r>
+              <a:rPr lang="en-GB" sz="2800" dirty="0">
+                <a:solidFill>
+                  <a:srgbClr val="0070C0"/>
+                </a:solidFill>
+              </a:rPr>
+              <a:t>When introducing changes to files and their content, we:</a:t>
+            </a:r>
+          </a:p>
+          <a:p>
+            <a:endParaRPr lang="en-GB" sz="2800" dirty="0">
+              <a:solidFill>
+                <a:srgbClr val="0070C0"/>
+              </a:solidFill>
+            </a:endParaRPr>
+          </a:p>
+          <a:p>
+            <a:pPr marL="457200" indent="-457200">
+              <a:buFont typeface="Arial" panose="020B0604020202020204" pitchFamily="34" charset="0"/>
+              <a:buChar char="•"/>
+            </a:pPr>
+            <a:r>
+              <a:rPr lang="en-GB" sz="2800" dirty="0" smtClean="0">
+                <a:solidFill>
+                  <a:srgbClr val="0070C0"/>
+                </a:solidFill>
+              </a:rPr>
+              <a:t>overwrite </a:t>
+            </a:r>
+            <a:r>
+              <a:rPr lang="en-GB" sz="2800" dirty="0">
+                <a:solidFill>
+                  <a:srgbClr val="0070C0"/>
+                </a:solidFill>
+              </a:rPr>
+              <a:t>old content or loose whole </a:t>
+            </a:r>
+            <a:r>
+              <a:rPr lang="en-GB" sz="2800" dirty="0" smtClean="0">
+                <a:solidFill>
+                  <a:srgbClr val="0070C0"/>
+                </a:solidFill>
+              </a:rPr>
+              <a:t>files</a:t>
+            </a:r>
+            <a:endParaRPr lang="pl-PL" sz="2800" dirty="0" smtClean="0">
+              <a:solidFill>
+                <a:srgbClr val="0070C0"/>
+              </a:solidFill>
+            </a:endParaRPr>
+          </a:p>
+          <a:p>
+            <a:pPr marL="457200" indent="-457200">
+              <a:buFont typeface="Arial" panose="020B0604020202020204" pitchFamily="34" charset="0"/>
+              <a:buChar char="•"/>
+            </a:pPr>
+            <a:endParaRPr lang="en-GB" sz="2800" dirty="0">
+              <a:solidFill>
+                <a:srgbClr val="0070C0"/>
+              </a:solidFill>
+            </a:endParaRPr>
+          </a:p>
+          <a:p>
+            <a:pPr marL="457200" indent="-457200">
+              <a:buFont typeface="Arial" panose="020B0604020202020204" pitchFamily="34" charset="0"/>
+              <a:buChar char="•"/>
+            </a:pPr>
+            <a:r>
+              <a:rPr lang="en-GB" sz="2800" dirty="0" smtClean="0">
+                <a:solidFill>
+                  <a:srgbClr val="0070C0"/>
+                </a:solidFill>
+              </a:rPr>
+              <a:t>may </a:t>
+            </a:r>
+            <a:r>
+              <a:rPr lang="en-GB" sz="2800" dirty="0">
+                <a:solidFill>
+                  <a:srgbClr val="0070C0"/>
+                </a:solidFill>
+              </a:rPr>
+              <a:t>introduce side effects, e.g. renaming files may break analysis </a:t>
+            </a:r>
+            <a:r>
+              <a:rPr lang="en-GB" sz="2800" dirty="0" smtClean="0">
+                <a:solidFill>
+                  <a:srgbClr val="0070C0"/>
+                </a:solidFill>
+              </a:rPr>
+              <a:t>pipelines</a:t>
+            </a:r>
+            <a:endParaRPr lang="pl-PL" sz="2800" dirty="0" smtClean="0">
+              <a:solidFill>
+                <a:srgbClr val="0070C0"/>
+              </a:solidFill>
+            </a:endParaRPr>
+          </a:p>
+          <a:p>
+            <a:pPr marL="457200" indent="-457200">
+              <a:buFont typeface="Arial" panose="020B0604020202020204" pitchFamily="34" charset="0"/>
+              <a:buChar char="•"/>
+            </a:pPr>
+            <a:endParaRPr lang="en-GB" sz="2800" dirty="0">
+              <a:solidFill>
+                <a:srgbClr val="0070C0"/>
+              </a:solidFill>
+            </a:endParaRPr>
+          </a:p>
+          <a:p>
+            <a:pPr marL="457200" indent="-457200">
+              <a:buFont typeface="Arial" panose="020B0604020202020204" pitchFamily="34" charset="0"/>
+              <a:buChar char="•"/>
+            </a:pPr>
+            <a:r>
+              <a:rPr lang="en-GB" sz="2800" dirty="0">
+                <a:solidFill>
+                  <a:srgbClr val="0070C0"/>
+                </a:solidFill>
+              </a:rPr>
+              <a:t> </a:t>
+            </a:r>
+            <a:r>
+              <a:rPr lang="en-GB" sz="2800" dirty="0" smtClean="0">
+                <a:solidFill>
+                  <a:srgbClr val="0070C0"/>
+                </a:solidFill>
+              </a:rPr>
+              <a:t>introduce </a:t>
+            </a:r>
+            <a:r>
+              <a:rPr lang="en-GB" sz="2800" dirty="0">
+                <a:solidFill>
+                  <a:srgbClr val="0070C0"/>
+                </a:solidFill>
+              </a:rPr>
+              <a:t>multiple changes to multiple files which should be treated as one change</a:t>
+            </a:r>
+            <a:r>
+              <a:rPr lang="en-GB" sz="2800" dirty="0" smtClean="0">
+                <a:solidFill>
+                  <a:srgbClr val="0070C0"/>
+                </a:solidFill>
+              </a:rPr>
+              <a:t>,</a:t>
+            </a:r>
+            <a:endParaRPr lang="pl-PL" sz="2800" dirty="0" smtClean="0">
+              <a:solidFill>
+                <a:srgbClr val="0070C0"/>
+              </a:solidFill>
+            </a:endParaRPr>
+          </a:p>
+          <a:p>
+            <a:r>
+              <a:rPr lang="en-GB" sz="2800" dirty="0" smtClean="0">
+                <a:solidFill>
+                  <a:srgbClr val="0070C0"/>
+                </a:solidFill>
+              </a:rPr>
+              <a:t> </a:t>
+            </a:r>
+            <a:endParaRPr lang="pl-PL" sz="2800" dirty="0" smtClean="0">
+              <a:solidFill>
+                <a:srgbClr val="0070C0"/>
+              </a:solidFill>
+            </a:endParaRPr>
+          </a:p>
+          <a:p>
+            <a:pPr marL="457200" indent="-457200">
+              <a:buFont typeface="Arial" panose="020B0604020202020204" pitchFamily="34" charset="0"/>
+              <a:buChar char="•"/>
+            </a:pPr>
+            <a:r>
+              <a:rPr lang="en-GB" sz="2800" dirty="0" smtClean="0">
+                <a:solidFill>
+                  <a:srgbClr val="0070C0"/>
+                </a:solidFill>
+              </a:rPr>
+              <a:t>need </a:t>
+            </a:r>
+            <a:r>
+              <a:rPr lang="en-GB" sz="2800" dirty="0">
+                <a:solidFill>
+                  <a:srgbClr val="0070C0"/>
+                </a:solidFill>
+              </a:rPr>
+              <a:t>to collate concurrent changes from collaborators e.g. “resolve conflicts”</a:t>
+            </a:r>
+            <a:endParaRPr lang="en-GB" sz="2800" dirty="0">
+              <a:solidFill>
+                <a:srgbClr val="0070C0"/>
+              </a:solidFill>
+            </a:endParaRPr>
+          </a:p>
+        </p:txBody>
+      </p:sp>
+      <p:pic>
+        <p:nvPicPr>
+          <p:cNvPr id="6" name="Picture 2" descr="Ed_DaSH">
+            <a:extLst>
+              <a:ext uri="{FF2B5EF4-FFF2-40B4-BE49-F238E27FC236}">
+                <a16:creationId xmlns:a16="http://schemas.microsoft.com/office/drawing/2014/main" id="{6F3CF586-06D2-46C3-A4A3-130E31C4A16F}"/>
+              </a:ext>
+            </a:extLst>
+          </p:cNvPr>
+          <p:cNvPicPr>
+            <a:picLocks noChangeAspect="1" noChangeArrowheads="1"/>
+          </p:cNvPicPr>
+          <p:nvPr/>
+        </p:nvPicPr>
+        <p:blipFill>
+          <a:blip r:embed="rId2" cstate="hqprint">
+            <a:extLst>
+              <a:ext uri="{28A0092B-C50C-407E-A947-70E740481C1C}">
+                <a14:useLocalDpi xmlns:a14="http://schemas.microsoft.com/office/drawing/2010/main" val="0"/>
+              </a:ext>
+            </a:extLst>
+          </a:blip>
+          <a:srcRect/>
+          <a:stretch>
+            <a:fillRect/>
+          </a:stretch>
+        </p:blipFill>
+        <p:spPr bwMode="auto">
+          <a:xfrm>
+            <a:off x="10820670" y="5458691"/>
+            <a:ext cx="1289214" cy="1325418"/>
+          </a:xfrm>
+          <a:prstGeom prst="rect">
+            <a:avLst/>
+          </a:prstGeom>
+          <a:noFill/>
+          <a:extLst>
+            <a:ext uri="{909E8E84-426E-40DD-AFC4-6F175D3DCCD1}">
+              <a14:hiddenFill xmlns:a14="http://schemas.microsoft.com/office/drawing/2010/main">
+                <a:solidFill>
+                  <a:srgbClr val="FFFFFF"/>
+                </a:solidFill>
+              </a14:hiddenFill>
+            </a:ext>
+          </a:extLst>
+        </p:spPr>
+      </p:pic>
+    </p:spTree>
+    <p:extLst>
+      <p:ext uri="{BB962C8B-B14F-4D97-AF65-F5344CB8AC3E}">
+        <p14:creationId xmlns:p14="http://schemas.microsoft.com/office/powerpoint/2010/main" val="1221672353"/>
+      </p:ext>
+    </p:extLst>
+  </p:cSld>
+  <p:clrMapOvr>
+    <a:masterClrMapping/>
+  </p:clrMapOvr>
+</p:sld>
+</file>
+
+<file path=ppt/slides/slide6.xml><?xml version="1.0" encoding="utf-8"?>
+<p:sld xmlns:a="http://schemas.openxmlformats.org/drawingml/2006/main" xmlns:r="http://schemas.openxmlformats.org/officeDocument/2006/relationships" xmlns:p="http://schemas.openxmlformats.org/presentationml/2006/main">
+  <p:cSld>
+    <p:spTree>
+      <p:nvGrpSpPr>
+        <p:cNvPr id="1" name=""/>
+        <p:cNvGrpSpPr/>
+        <p:nvPr/>
+      </p:nvGrpSpPr>
+      <p:grpSpPr>
+        <a:xfrm>
+          <a:off x="0" y="0"/>
+          <a:ext cx="0" cy="0"/>
+          <a:chOff x="0" y="0"/>
+          <a:chExt cx="0" cy="0"/>
+        </a:xfrm>
+      </p:grpSpPr>
+      <p:sp>
+        <p:nvSpPr>
+          <p:cNvPr id="5" name="TextBox 4">
+            <a:extLst>
+              <a:ext uri="{FF2B5EF4-FFF2-40B4-BE49-F238E27FC236}">
+                <a16:creationId xmlns:a16="http://schemas.microsoft.com/office/drawing/2014/main" id="{3A7A1F5C-9C70-4DE3-BA39-7835B2935EB3}"/>
+              </a:ext>
+            </a:extLst>
+          </p:cNvPr>
+          <p:cNvSpPr txBox="1"/>
+          <p:nvPr/>
+        </p:nvSpPr>
+        <p:spPr>
+          <a:xfrm>
+            <a:off x="1138104" y="1569406"/>
+            <a:ext cx="9464530" cy="3108543"/>
+          </a:xfrm>
+          <a:prstGeom prst="rect">
+            <a:avLst/>
+          </a:prstGeom>
+          <a:noFill/>
+        </p:spPr>
+        <p:txBody>
+          <a:bodyPr wrap="square">
+            <a:spAutoFit/>
+          </a:bodyPr>
+          <a:lstStyle/>
+          <a:p>
+            <a:r>
+              <a:rPr lang="en-GB" sz="2800" dirty="0">
+                <a:solidFill>
+                  <a:srgbClr val="0070C0"/>
+                </a:solidFill>
+              </a:rPr>
+              <a:t>Addressing those issues by tracking changes is called version control. .</a:t>
+            </a:r>
+            <a:endParaRPr lang="en-GB" sz="2800" dirty="0">
+              <a:solidFill>
+                <a:srgbClr val="0070C0"/>
+              </a:solidFill>
+            </a:endParaRPr>
+          </a:p>
+          <a:p>
+            <a:endParaRPr lang="en-GB" sz="2800" dirty="0">
+              <a:solidFill>
+                <a:srgbClr val="0070C0"/>
+              </a:solidFill>
+            </a:endParaRPr>
+          </a:p>
+          <a:p>
+            <a:r>
+              <a:rPr lang="en-GB" sz="2800" dirty="0">
+                <a:solidFill>
+                  <a:srgbClr val="0070C0"/>
+                </a:solidFill>
+              </a:rPr>
+              <a:t>With version control, file names do not reflect their versions. </a:t>
+            </a:r>
+            <a:endParaRPr lang="pl-PL" sz="2800" dirty="0" smtClean="0">
+              <a:solidFill>
+                <a:srgbClr val="0070C0"/>
+              </a:solidFill>
+            </a:endParaRPr>
+          </a:p>
+          <a:p>
+            <a:endParaRPr lang="pl-PL" sz="2800" dirty="0">
+              <a:solidFill>
+                <a:srgbClr val="0070C0"/>
+              </a:solidFill>
+            </a:endParaRPr>
+          </a:p>
+          <a:p>
+            <a:r>
+              <a:rPr lang="en-GB" sz="2800" dirty="0" smtClean="0">
+                <a:solidFill>
+                  <a:srgbClr val="0070C0"/>
+                </a:solidFill>
+              </a:rPr>
+              <a:t>Information </a:t>
+            </a:r>
+            <a:r>
+              <a:rPr lang="en-GB" sz="2800" dirty="0">
+                <a:solidFill>
+                  <a:srgbClr val="0070C0"/>
+                </a:solidFill>
+              </a:rPr>
+              <a:t>about versions and changes are kept separate from the files.</a:t>
+            </a:r>
+          </a:p>
+        </p:txBody>
+      </p:sp>
+      <p:pic>
+        <p:nvPicPr>
+          <p:cNvPr id="6" name="Picture 2" descr="Ed_DaSH">
+            <a:extLst>
+              <a:ext uri="{FF2B5EF4-FFF2-40B4-BE49-F238E27FC236}">
+                <a16:creationId xmlns:a16="http://schemas.microsoft.com/office/drawing/2014/main" id="{6F3CF586-06D2-46C3-A4A3-130E31C4A16F}"/>
+              </a:ext>
+            </a:extLst>
+          </p:cNvPr>
+          <p:cNvPicPr>
+            <a:picLocks noChangeAspect="1" noChangeArrowheads="1"/>
+          </p:cNvPicPr>
+          <p:nvPr/>
+        </p:nvPicPr>
+        <p:blipFill>
+          <a:blip r:embed="rId2" cstate="hqprint">
+            <a:extLst>
+              <a:ext uri="{28A0092B-C50C-407E-A947-70E740481C1C}">
+                <a14:useLocalDpi xmlns:a14="http://schemas.microsoft.com/office/drawing/2010/main" val="0"/>
+              </a:ext>
+            </a:extLst>
+          </a:blip>
+          <a:srcRect/>
+          <a:stretch>
+            <a:fillRect/>
+          </a:stretch>
+        </p:blipFill>
+        <p:spPr bwMode="auto">
+          <a:xfrm>
+            <a:off x="10820670" y="5458691"/>
+            <a:ext cx="1289214" cy="1325418"/>
+          </a:xfrm>
+          <a:prstGeom prst="rect">
+            <a:avLst/>
+          </a:prstGeom>
+          <a:noFill/>
+          <a:extLst>
+            <a:ext uri="{909E8E84-426E-40DD-AFC4-6F175D3DCCD1}">
+              <a14:hiddenFill xmlns:a14="http://schemas.microsoft.com/office/drawing/2010/main">
+                <a:solidFill>
+                  <a:srgbClr val="FFFFFF"/>
+                </a:solidFill>
+              </a14:hiddenFill>
+            </a:ext>
+          </a:extLst>
+        </p:spPr>
+      </p:pic>
+    </p:spTree>
+    <p:extLst>
+      <p:ext uri="{BB962C8B-B14F-4D97-AF65-F5344CB8AC3E}">
+        <p14:creationId xmlns:p14="http://schemas.microsoft.com/office/powerpoint/2010/main" val="2446718311"/>
       </p:ext>
     </p:extLst>
   </p:cSld>
@@ -5243,8 +7154,8 @@
         </p:nvSpPr>
         <p:spPr>
           <a:xfrm>
-            <a:off x="1363735" y="1129464"/>
-            <a:ext cx="9464530" cy="1384995"/>
+            <a:off x="1138104" y="1569406"/>
+            <a:ext cx="9464530" cy="4585871"/>
           </a:xfrm>
           <a:prstGeom prst="rect">
             <a:avLst/>
@@ -5257,17 +7168,27 @@
           </a:bodyPr>
           <a:lstStyle/>
           <a:p>
+            <a:pPr marL="514350" indent="-514350" algn="just">
+              <a:buAutoNum type="arabicPeriod"/>
+            </a:pPr>
             <a:r>
               <a:rPr lang="en-GB" sz="2800" dirty="0">
                 <a:solidFill>
                   <a:srgbClr val="0070C0"/>
                 </a:solidFill>
               </a:rPr>
-              <a:t>Exercise 3: </a:t>
-            </a:r>
-          </a:p>
-          <a:p>
-            <a:pPr algn="ctr"/>
+              <a:t>Add a file called ’CHANGELOG.txt’ to the project's subfolder, and make dated notes about changes in reverse chronological order. </a:t>
+            </a:r>
+            <a:endParaRPr lang="pl-PL" sz="2800" dirty="0" smtClean="0">
+              <a:solidFill>
+                <a:srgbClr val="0070C0"/>
+              </a:solidFill>
+            </a:endParaRPr>
+          </a:p>
+          <a:p>
+            <a:pPr marL="514350" indent="-514350" algn="just">
+              <a:buAutoNum type="arabicPeriod"/>
+            </a:pPr>
             <a:endParaRPr lang="en-GB" sz="2800" dirty="0">
               <a:solidFill>
                 <a:srgbClr val="0070C0"/>
@@ -5275,24 +7196,191 @@
             </a:endParaRPr>
           </a:p>
           <a:p>
-            <a:pPr algn="ctr"/>
-            <a:r>
-              <a:rPr lang="en-GB" sz="2800" dirty="0">
-                <a:solidFill>
-                  <a:srgbClr val="0070C0"/>
-                </a:solidFill>
-              </a:rPr>
-              <a:t>Changelog in action</a:t>
-            </a:r>
+            <a:pPr algn="just"/>
+            <a:r>
+              <a:rPr lang="en-GB" sz="2000" dirty="0">
+                <a:solidFill>
+                  <a:srgbClr val="0070C0"/>
+                </a:solidFill>
+                <a:latin typeface="Courier New" panose="02070309020205020404" pitchFamily="49" charset="0"/>
+                <a:cs typeface="Courier New" panose="02070309020205020404" pitchFamily="49" charset="0"/>
+              </a:rPr>
+              <a:t>## 2016-04-08</a:t>
+            </a:r>
+          </a:p>
+          <a:p>
+            <a:pPr algn="just"/>
+            <a:r>
+              <a:rPr lang="en-GB" sz="2000" dirty="0" smtClean="0">
+                <a:solidFill>
+                  <a:srgbClr val="0070C0"/>
+                </a:solidFill>
+                <a:latin typeface="Courier New" panose="02070309020205020404" pitchFamily="49" charset="0"/>
+                <a:cs typeface="Courier New" panose="02070309020205020404" pitchFamily="49" charset="0"/>
+              </a:rPr>
+              <a:t>* </a:t>
+            </a:r>
+            <a:r>
+              <a:rPr lang="en-GB" sz="2000" dirty="0">
+                <a:solidFill>
+                  <a:srgbClr val="0070C0"/>
+                </a:solidFill>
+                <a:latin typeface="Courier New" panose="02070309020205020404" pitchFamily="49" charset="0"/>
+                <a:cs typeface="Courier New" panose="02070309020205020404" pitchFamily="49" charset="0"/>
+              </a:rPr>
+              <a:t>Switched to cubic interpolation as default.</a:t>
+            </a:r>
+          </a:p>
+          <a:p>
+            <a:pPr algn="just"/>
+            <a:r>
+              <a:rPr lang="en-GB" sz="2000" dirty="0" smtClean="0">
+                <a:solidFill>
+                  <a:srgbClr val="0070C0"/>
+                </a:solidFill>
+                <a:latin typeface="Courier New" panose="02070309020205020404" pitchFamily="49" charset="0"/>
+                <a:cs typeface="Courier New" panose="02070309020205020404" pitchFamily="49" charset="0"/>
+              </a:rPr>
+              <a:t>*</a:t>
+            </a:r>
+            <a:r>
+              <a:rPr lang="pl-PL" sz="2000" dirty="0" smtClean="0">
+                <a:solidFill>
+                  <a:srgbClr val="0070C0"/>
+                </a:solidFill>
+                <a:latin typeface="Courier New" panose="02070309020205020404" pitchFamily="49" charset="0"/>
+                <a:cs typeface="Courier New" panose="02070309020205020404" pitchFamily="49" charset="0"/>
+              </a:rPr>
+              <a:t> </a:t>
+            </a:r>
+            <a:r>
+              <a:rPr lang="en-GB" sz="2000" dirty="0" smtClean="0">
+                <a:solidFill>
+                  <a:srgbClr val="0070C0"/>
+                </a:solidFill>
+                <a:latin typeface="Courier New" panose="02070309020205020404" pitchFamily="49" charset="0"/>
+                <a:cs typeface="Courier New" panose="02070309020205020404" pitchFamily="49" charset="0"/>
+              </a:rPr>
+              <a:t>Moved </a:t>
+            </a:r>
+            <a:r>
+              <a:rPr lang="en-GB" sz="2000" dirty="0">
+                <a:solidFill>
+                  <a:srgbClr val="0070C0"/>
+                </a:solidFill>
+                <a:latin typeface="Courier New" panose="02070309020205020404" pitchFamily="49" charset="0"/>
+                <a:cs typeface="Courier New" panose="02070309020205020404" pitchFamily="49" charset="0"/>
+              </a:rPr>
+              <a:t>question about family's TB history to end of questionnaire.</a:t>
+            </a:r>
+          </a:p>
+          <a:p>
+            <a:pPr marL="514350" indent="-514350" algn="just">
+              <a:buFontTx/>
+              <a:buAutoNum type="arabicPeriod"/>
+            </a:pPr>
+            <a:endParaRPr lang="en-GB" sz="2000" dirty="0">
+              <a:solidFill>
+                <a:srgbClr val="0070C0"/>
+              </a:solidFill>
+              <a:latin typeface="Courier New" panose="02070309020205020404" pitchFamily="49" charset="0"/>
+              <a:cs typeface="Courier New" panose="02070309020205020404" pitchFamily="49" charset="0"/>
+            </a:endParaRPr>
+          </a:p>
+          <a:p>
+            <a:pPr algn="just"/>
+            <a:r>
+              <a:rPr lang="en-GB" sz="2000" dirty="0">
+                <a:solidFill>
+                  <a:srgbClr val="0070C0"/>
+                </a:solidFill>
+                <a:latin typeface="Courier New" panose="02070309020205020404" pitchFamily="49" charset="0"/>
+                <a:cs typeface="Courier New" panose="02070309020205020404" pitchFamily="49" charset="0"/>
+              </a:rPr>
+              <a:t>## 2016-04-06</a:t>
+            </a:r>
+          </a:p>
+          <a:p>
+            <a:pPr algn="just"/>
+            <a:r>
+              <a:rPr lang="en-GB" sz="2000" dirty="0" smtClean="0">
+                <a:solidFill>
+                  <a:srgbClr val="0070C0"/>
+                </a:solidFill>
+                <a:latin typeface="Courier New" panose="02070309020205020404" pitchFamily="49" charset="0"/>
+                <a:cs typeface="Courier New" panose="02070309020205020404" pitchFamily="49" charset="0"/>
+              </a:rPr>
+              <a:t>* </a:t>
+            </a:r>
+            <a:r>
+              <a:rPr lang="en-GB" sz="2000" dirty="0">
+                <a:solidFill>
+                  <a:srgbClr val="0070C0"/>
+                </a:solidFill>
+                <a:latin typeface="Courier New" panose="02070309020205020404" pitchFamily="49" charset="0"/>
+                <a:cs typeface="Courier New" panose="02070309020205020404" pitchFamily="49" charset="0"/>
+              </a:rPr>
+              <a:t>Added option for cubic interpolation.</a:t>
+            </a:r>
+          </a:p>
+          <a:p>
+            <a:pPr algn="just"/>
+            <a:r>
+              <a:rPr lang="en-GB" sz="2000" dirty="0" smtClean="0">
+                <a:solidFill>
+                  <a:srgbClr val="0070C0"/>
+                </a:solidFill>
+                <a:latin typeface="Courier New" panose="02070309020205020404" pitchFamily="49" charset="0"/>
+                <a:cs typeface="Courier New" panose="02070309020205020404" pitchFamily="49" charset="0"/>
+              </a:rPr>
+              <a:t>*</a:t>
+            </a:r>
+            <a:r>
+              <a:rPr lang="pl-PL" sz="2000" dirty="0" smtClean="0">
+                <a:solidFill>
+                  <a:srgbClr val="0070C0"/>
+                </a:solidFill>
+                <a:latin typeface="Courier New" panose="02070309020205020404" pitchFamily="49" charset="0"/>
+                <a:cs typeface="Courier New" panose="02070309020205020404" pitchFamily="49" charset="0"/>
+              </a:rPr>
+              <a:t> </a:t>
+            </a:r>
+            <a:r>
+              <a:rPr lang="en-GB" sz="2000" dirty="0" smtClean="0">
+                <a:solidFill>
+                  <a:srgbClr val="0070C0"/>
+                </a:solidFill>
+                <a:latin typeface="Courier New" panose="02070309020205020404" pitchFamily="49" charset="0"/>
+                <a:cs typeface="Courier New" panose="02070309020205020404" pitchFamily="49" charset="0"/>
+              </a:rPr>
+              <a:t>Removed </a:t>
+            </a:r>
+            <a:r>
+              <a:rPr lang="en-GB" sz="2000" dirty="0">
+                <a:solidFill>
+                  <a:srgbClr val="0070C0"/>
+                </a:solidFill>
+                <a:latin typeface="Courier New" panose="02070309020205020404" pitchFamily="49" charset="0"/>
+                <a:cs typeface="Courier New" panose="02070309020205020404" pitchFamily="49" charset="0"/>
+              </a:rPr>
+              <a:t>question about staph exposure (can be inferred from blood test results).</a:t>
+            </a:r>
+            <a:endParaRPr lang="en-GB" sz="2000" dirty="0">
+              <a:solidFill>
+                <a:srgbClr val="0070C0"/>
+              </a:solidFill>
+              <a:latin typeface="Courier New" panose="02070309020205020404" pitchFamily="49" charset="0"/>
+              <a:cs typeface="Courier New" panose="02070309020205020404" pitchFamily="49" charset="0"/>
+            </a:endParaRPr>
           </a:p>
         </p:txBody>
       </p:sp>
       <p:pic>
         <p:nvPicPr>
-          <p:cNvPr id="4" name="Picture 2" descr="Ed_DaSH">
-            <a:extLst>
-              <a:ext uri="{FF2B5EF4-FFF2-40B4-BE49-F238E27FC236}">
-                <a16:creationId xmlns:a16="http://schemas.microsoft.com/office/drawing/2014/main" id="{A783256F-E39E-4712-96B0-240BD611CFEB}"/>
+          <p:cNvPr id="6" name="Picture 2" descr="Ed_DaSH">
+            <a:extLst>
+              <a:ext uri="{FF2B5EF4-FFF2-40B4-BE49-F238E27FC236}">
+                <a16:creationId xmlns:a16="http://schemas.microsoft.com/office/drawing/2014/main" id="{6F3CF586-06D2-46C3-A4A3-130E31C4A16F}"/>
               </a:ext>
             </a:extLst>
           </p:cNvPr>
@@ -5302,7 +7390,7 @@
           <p:nvPr/>
         </p:nvPicPr>
         <p:blipFill>
-          <a:blip r:embed="rId2">
+          <a:blip r:embed="rId2" cstate="hqprint">
             <a:extLst>
               <a:ext uri="{28A0092B-C50C-407E-A947-70E740481C1C}">
                 <a14:useLocalDpi xmlns:a14="http://schemas.microsoft.com/office/drawing/2010/main" val="0"/>
@@ -5334,10 +7422,50 @@
           </a:extLst>
         </p:spPr>
       </p:pic>
+      <p:sp>
+        <p:nvSpPr>
+          <p:cNvPr id="4" name="TextBox 3">
+            <a:extLst>
+              <a:ext uri="{FF2B5EF4-FFF2-40B4-BE49-F238E27FC236}">
+                <a16:creationId xmlns:a16="http://schemas.microsoft.com/office/drawing/2014/main" id="{F4B0FDD5-5348-354F-A378-7241F2AF057B}"/>
+              </a:ext>
+            </a:extLst>
+          </p:cNvPr>
+          <p:cNvSpPr txBox="1"/>
+          <p:nvPr/>
+        </p:nvSpPr>
+        <p:spPr>
+          <a:xfrm>
+            <a:off x="1307676" y="444110"/>
+            <a:ext cx="4415889" cy="769441"/>
+          </a:xfrm>
+          <a:prstGeom prst="rect">
+            <a:avLst/>
+          </a:prstGeom>
+          <a:noFill/>
+        </p:spPr>
+        <p:txBody>
+          <a:bodyPr wrap="none" rtlCol="0">
+            <a:spAutoFit/>
+          </a:bodyPr>
+          <a:lstStyle/>
+          <a:p>
+            <a:pPr algn="ctr"/>
+            <a:r>
+              <a:rPr lang="en-GB" sz="4400" dirty="0">
+                <a:solidFill>
+                  <a:srgbClr val="0070C0"/>
+                </a:solidFill>
+              </a:rPr>
+              <a:t>Manual versioning</a:t>
+            </a:r>
+          </a:p>
+        </p:txBody>
+      </p:sp>
     </p:spTree>
     <p:extLst>
       <p:ext uri="{BB962C8B-B14F-4D97-AF65-F5344CB8AC3E}">
-        <p14:creationId xmlns:p14="http://schemas.microsoft.com/office/powerpoint/2010/main" val="1908239480"/>
+        <p14:creationId xmlns:p14="http://schemas.microsoft.com/office/powerpoint/2010/main" val="1052159509"/>
       </p:ext>
     </p:extLst>
   </p:cSld>
@@ -5366,10 +7494,10 @@
       </p:grpSpPr>
       <p:sp>
         <p:nvSpPr>
-          <p:cNvPr id="12" name="TextBox 11">
-            <a:extLst>
-              <a:ext uri="{FF2B5EF4-FFF2-40B4-BE49-F238E27FC236}">
-                <a16:creationId xmlns:a16="http://schemas.microsoft.com/office/drawing/2014/main" id="{32F0452B-E9D9-441C-8E99-96A0537CECD4}"/>
+          <p:cNvPr id="5" name="TextBox 4">
+            <a:extLst>
+              <a:ext uri="{FF2B5EF4-FFF2-40B4-BE49-F238E27FC236}">
+                <a16:creationId xmlns:a16="http://schemas.microsoft.com/office/drawing/2014/main" id="{3A7A1F5C-9C70-4DE3-BA39-7835B2935EB3}"/>
               </a:ext>
             </a:extLst>
           </p:cNvPr>
@@ -5378,8 +7506,8 @@
         </p:nvSpPr>
         <p:spPr>
           <a:xfrm>
-            <a:off x="1508922" y="1524088"/>
-            <a:ext cx="9174155" cy="2766911"/>
+            <a:off x="1138104" y="1569406"/>
+            <a:ext cx="9464530" cy="4585871"/>
           </a:xfrm>
           <a:prstGeom prst="rect">
             <a:avLst/>
@@ -5392,18 +7520,296 @@
           </a:bodyPr>
           <a:lstStyle/>
           <a:p>
-            <a:pPr algn="ctr">
-              <a:lnSpc>
-                <a:spcPct val="150000"/>
-              </a:lnSpc>
-            </a:pPr>
-            <a:r>
-              <a:rPr lang="en-GB" sz="4000" dirty="0">
-                <a:solidFill>
-                  <a:srgbClr val="0070C0"/>
-                </a:solidFill>
-              </a:rPr>
-              <a:t>Looking at the reasons to use a version control system (VCS) in research, how does using VCS help in being FAIR?</a:t>
+            <a:pPr algn="just"/>
+            <a:r>
+              <a:rPr lang="en-GB" sz="2800" dirty="0" smtClean="0">
+                <a:solidFill>
+                  <a:srgbClr val="0070C0"/>
+                </a:solidFill>
+              </a:rPr>
+              <a:t>Copy </a:t>
+            </a:r>
+            <a:r>
+              <a:rPr lang="en-GB" sz="2800" dirty="0">
+                <a:solidFill>
+                  <a:srgbClr val="0070C0"/>
+                </a:solidFill>
+              </a:rPr>
+              <a:t>the entire project whenever a significant change is made, and store in a sub-folder</a:t>
+            </a:r>
+            <a:r>
+              <a:rPr lang="en-GB" sz="2800" dirty="0" smtClean="0">
+                <a:solidFill>
+                  <a:srgbClr val="0070C0"/>
+                </a:solidFill>
+              </a:rPr>
+              <a:t>.</a:t>
+            </a:r>
+            <a:endParaRPr lang="pl-PL" sz="2800" dirty="0" smtClean="0">
+              <a:solidFill>
+                <a:srgbClr val="0070C0"/>
+              </a:solidFill>
+            </a:endParaRPr>
+          </a:p>
+          <a:p>
+            <a:pPr algn="just"/>
+            <a:endParaRPr lang="pl-PL" sz="2800" dirty="0" smtClean="0">
+              <a:solidFill>
+                <a:srgbClr val="0070C0"/>
+              </a:solidFill>
+            </a:endParaRPr>
+          </a:p>
+          <a:p>
+            <a:pPr algn="just"/>
+            <a:r>
+              <a:rPr lang="en-GB" sz="2000" dirty="0">
+                <a:solidFill>
+                  <a:srgbClr val="0070C0"/>
+                </a:solidFill>
+                <a:latin typeface="Courier New" panose="02070309020205020404" pitchFamily="49" charset="0"/>
+                <a:cs typeface="Courier New" panose="02070309020205020404" pitchFamily="49" charset="0"/>
+              </a:rPr>
+              <a:t>.</a:t>
+            </a:r>
+          </a:p>
+          <a:p>
+            <a:pPr algn="just"/>
+            <a:r>
+              <a:rPr lang="en-GB" sz="2000" dirty="0">
+                <a:solidFill>
+                  <a:srgbClr val="0070C0"/>
+                </a:solidFill>
+                <a:latin typeface="Courier New" panose="02070309020205020404" pitchFamily="49" charset="0"/>
+                <a:cs typeface="Courier New" panose="02070309020205020404" pitchFamily="49" charset="0"/>
+              </a:rPr>
+              <a:t>|-- </a:t>
+            </a:r>
+            <a:r>
+              <a:rPr lang="en-GB" sz="2000" dirty="0" err="1">
+                <a:solidFill>
+                  <a:srgbClr val="0070C0"/>
+                </a:solidFill>
+                <a:latin typeface="Courier New" panose="02070309020205020404" pitchFamily="49" charset="0"/>
+                <a:cs typeface="Courier New" panose="02070309020205020404" pitchFamily="49" charset="0"/>
+              </a:rPr>
+              <a:t>project_name</a:t>
+            </a:r>
+            <a:endParaRPr lang="en-GB" sz="2000" dirty="0">
+              <a:solidFill>
+                <a:srgbClr val="0070C0"/>
+              </a:solidFill>
+              <a:latin typeface="Courier New" panose="02070309020205020404" pitchFamily="49" charset="0"/>
+              <a:cs typeface="Courier New" panose="02070309020205020404" pitchFamily="49" charset="0"/>
+            </a:endParaRPr>
+          </a:p>
+          <a:p>
+            <a:pPr algn="just"/>
+            <a:r>
+              <a:rPr lang="en-GB" sz="2000" dirty="0">
+                <a:solidFill>
+                  <a:srgbClr val="0070C0"/>
+                </a:solidFill>
+                <a:latin typeface="Courier New" panose="02070309020205020404" pitchFamily="49" charset="0"/>
+                <a:cs typeface="Courier New" panose="02070309020205020404" pitchFamily="49" charset="0"/>
+              </a:rPr>
+              <a:t>|   -- current</a:t>
+            </a:r>
+          </a:p>
+          <a:p>
+            <a:pPr algn="just"/>
+            <a:r>
+              <a:rPr lang="en-GB" sz="2000" dirty="0">
+                <a:solidFill>
+                  <a:srgbClr val="0070C0"/>
+                </a:solidFill>
+                <a:latin typeface="Courier New" panose="02070309020205020404" pitchFamily="49" charset="0"/>
+                <a:cs typeface="Courier New" panose="02070309020205020404" pitchFamily="49" charset="0"/>
+              </a:rPr>
+              <a:t>|       -- ...project content as described earlier...</a:t>
+            </a:r>
+          </a:p>
+          <a:p>
+            <a:pPr algn="just"/>
+            <a:r>
+              <a:rPr lang="en-GB" sz="2000" dirty="0">
+                <a:solidFill>
+                  <a:srgbClr val="0070C0"/>
+                </a:solidFill>
+                <a:latin typeface="Courier New" panose="02070309020205020404" pitchFamily="49" charset="0"/>
+                <a:cs typeface="Courier New" panose="02070309020205020404" pitchFamily="49" charset="0"/>
+              </a:rPr>
+              <a:t>|   -- 2016-03-01</a:t>
+            </a:r>
+          </a:p>
+          <a:p>
+            <a:pPr algn="just"/>
+            <a:r>
+              <a:rPr lang="en-GB" sz="2000" dirty="0">
+                <a:solidFill>
+                  <a:srgbClr val="0070C0"/>
+                </a:solidFill>
+                <a:latin typeface="Courier New" panose="02070309020205020404" pitchFamily="49" charset="0"/>
+                <a:cs typeface="Courier New" panose="02070309020205020404" pitchFamily="49" charset="0"/>
+              </a:rPr>
+              <a:t>|       -- ...content of 'current' on Mar 1, 2016</a:t>
+            </a:r>
+          </a:p>
+          <a:p>
+            <a:pPr algn="just"/>
+            <a:r>
+              <a:rPr lang="en-GB" sz="2000" dirty="0">
+                <a:solidFill>
+                  <a:srgbClr val="0070C0"/>
+                </a:solidFill>
+                <a:latin typeface="Courier New" panose="02070309020205020404" pitchFamily="49" charset="0"/>
+                <a:cs typeface="Courier New" panose="02070309020205020404" pitchFamily="49" charset="0"/>
+              </a:rPr>
+              <a:t>|   -- 2016-02-19</a:t>
+            </a:r>
+          </a:p>
+          <a:p>
+            <a:pPr algn="just"/>
+            <a:r>
+              <a:rPr lang="en-GB" sz="2000" dirty="0">
+                <a:solidFill>
+                  <a:srgbClr val="0070C0"/>
+                </a:solidFill>
+                <a:latin typeface="Courier New" panose="02070309020205020404" pitchFamily="49" charset="0"/>
+                <a:cs typeface="Courier New" panose="02070309020205020404" pitchFamily="49" charset="0"/>
+              </a:rPr>
+              <a:t>|       -- ...content of 'current' on Feb 19, </a:t>
+            </a:r>
+            <a:r>
+              <a:rPr lang="en-GB" sz="2000" dirty="0" smtClean="0">
+                <a:solidFill>
+                  <a:srgbClr val="0070C0"/>
+                </a:solidFill>
+                <a:latin typeface="Courier New" panose="02070309020205020404" pitchFamily="49" charset="0"/>
+                <a:cs typeface="Courier New" panose="02070309020205020404" pitchFamily="49" charset="0"/>
+              </a:rPr>
+              <a:t>2016</a:t>
+            </a:r>
+            <a:endParaRPr lang="pl-PL" sz="2000" dirty="0" smtClean="0">
+              <a:solidFill>
+                <a:srgbClr val="0070C0"/>
+              </a:solidFill>
+              <a:latin typeface="Courier New" panose="02070309020205020404" pitchFamily="49" charset="0"/>
+              <a:cs typeface="Courier New" panose="02070309020205020404" pitchFamily="49" charset="0"/>
+            </a:endParaRPr>
+          </a:p>
+          <a:p>
+            <a:pPr algn="just"/>
+            <a:endParaRPr lang="pl-PL" sz="2000" dirty="0">
+              <a:solidFill>
+                <a:srgbClr val="0070C0"/>
+              </a:solidFill>
+              <a:latin typeface="Courier New" panose="02070309020205020404" pitchFamily="49" charset="0"/>
+              <a:cs typeface="Courier New" panose="02070309020205020404" pitchFamily="49" charset="0"/>
+            </a:endParaRPr>
+          </a:p>
+          <a:p>
+            <a:pPr algn="just"/>
+            <a:r>
+              <a:rPr lang="en-GB" sz="2800" dirty="0">
+                <a:solidFill>
+                  <a:srgbClr val="0070C0"/>
+                </a:solidFill>
+                <a:cs typeface="Courier New" panose="02070309020205020404" pitchFamily="49" charset="0"/>
+              </a:rPr>
+              <a:t>Data is Cheap, Time is Expensive</a:t>
+            </a:r>
+            <a:endParaRPr lang="pl-PL" sz="2800" dirty="0">
+              <a:solidFill>
+                <a:srgbClr val="0070C0"/>
+              </a:solidFill>
+              <a:cs typeface="Courier New" panose="02070309020205020404" pitchFamily="49" charset="0"/>
+            </a:endParaRPr>
+          </a:p>
+        </p:txBody>
+      </p:sp>
+      <p:pic>
+        <p:nvPicPr>
+          <p:cNvPr id="6" name="Picture 2" descr="Ed_DaSH">
+            <a:extLst>
+              <a:ext uri="{FF2B5EF4-FFF2-40B4-BE49-F238E27FC236}">
+                <a16:creationId xmlns:a16="http://schemas.microsoft.com/office/drawing/2014/main" id="{6F3CF586-06D2-46C3-A4A3-130E31C4A16F}"/>
+              </a:ext>
+            </a:extLst>
+          </p:cNvPr>
+          <p:cNvPicPr>
+            <a:picLocks noChangeAspect="1" noChangeArrowheads="1"/>
+          </p:cNvPicPr>
+          <p:nvPr/>
+        </p:nvPicPr>
+        <p:blipFill>
+          <a:blip r:embed="rId2" cstate="hqprint">
+            <a:extLst>
+              <a:ext uri="{28A0092B-C50C-407E-A947-70E740481C1C}">
+                <a14:useLocalDpi xmlns:a14="http://schemas.microsoft.com/office/drawing/2010/main" val="0"/>
+              </a:ext>
+            </a:extLst>
+          </a:blip>
+          <a:srcRect/>
+          <a:stretch>
+            <a:fillRect/>
+          </a:stretch>
+        </p:blipFill>
+        <p:spPr bwMode="auto">
+          <a:xfrm>
+            <a:off x="10820670" y="5458691"/>
+            <a:ext cx="1289214" cy="1325418"/>
+          </a:xfrm>
+          <a:prstGeom prst="rect">
+            <a:avLst/>
+          </a:prstGeom>
+          <a:noFill/>
+          <a:extLst>
+            <a:ext uri="{909E8E84-426E-40DD-AFC4-6F175D3DCCD1}">
+              <a14:hiddenFill xmlns:a14="http://schemas.microsoft.com/office/drawing/2010/main">
+                <a:solidFill>
+                  <a:srgbClr val="FFFFFF"/>
+                </a:solidFill>
+              </a14:hiddenFill>
+            </a:ext>
+          </a:extLst>
+        </p:spPr>
+      </p:pic>
+      <p:sp>
+        <p:nvSpPr>
+          <p:cNvPr id="4" name="TextBox 3">
+            <a:extLst>
+              <a:ext uri="{FF2B5EF4-FFF2-40B4-BE49-F238E27FC236}">
+                <a16:creationId xmlns:a16="http://schemas.microsoft.com/office/drawing/2014/main" id="{F4B0FDD5-5348-354F-A378-7241F2AF057B}"/>
+              </a:ext>
+            </a:extLst>
+          </p:cNvPr>
+          <p:cNvSpPr txBox="1"/>
+          <p:nvPr/>
+        </p:nvSpPr>
+        <p:spPr>
+          <a:xfrm>
+            <a:off x="1307676" y="444110"/>
+            <a:ext cx="4415889" cy="769441"/>
+          </a:xfrm>
+          <a:prstGeom prst="rect">
+            <a:avLst/>
+          </a:prstGeom>
+          <a:noFill/>
+        </p:spPr>
+        <p:txBody>
+          <a:bodyPr wrap="none" rtlCol="0">
+            <a:spAutoFit/>
+          </a:bodyPr>
+          <a:lstStyle/>
+          <a:p>
+            <a:pPr algn="ctr"/>
+            <a:r>
+              <a:rPr lang="en-GB" sz="4400" dirty="0">
+                <a:solidFill>
+                  <a:srgbClr val="0070C0"/>
+                </a:solidFill>
+              </a:rPr>
+              <a:t>Manual versioning</a:t>
             </a:r>
           </a:p>
         </p:txBody>
@@ -5411,7 +7817,7 @@
     </p:spTree>
     <p:extLst>
       <p:ext uri="{BB962C8B-B14F-4D97-AF65-F5344CB8AC3E}">
-        <p14:creationId xmlns:p14="http://schemas.microsoft.com/office/powerpoint/2010/main" val="3747721469"/>
+        <p14:creationId xmlns:p14="http://schemas.microsoft.com/office/powerpoint/2010/main" val="1995349528"/>
       </p:ext>
     </p:extLst>
   </p:cSld>
@@ -5452,8 +7858,8 @@
         </p:nvSpPr>
         <p:spPr>
           <a:xfrm>
-            <a:off x="515880" y="488425"/>
-            <a:ext cx="9464530" cy="1200329"/>
+            <a:off x="1138104" y="1569406"/>
+            <a:ext cx="9464530" cy="3108543"/>
           </a:xfrm>
           <a:prstGeom prst="rect">
             <a:avLst/>
@@ -5466,31 +7872,111 @@
           </a:bodyPr>
           <a:lstStyle/>
           <a:p>
-            <a:r>
-              <a:rPr lang="en-GB" sz="3600" dirty="0">
-                <a:solidFill>
-                  <a:srgbClr val="0070C0"/>
-                </a:solidFill>
-              </a:rPr>
-              <a:t>Useful (Git) resources</a:t>
-            </a:r>
-          </a:p>
-          <a:p>
-            <a:pPr algn="ctr"/>
-            <a:endParaRPr lang="en-GB" sz="3600" dirty="0">
+            <a:pPr algn="just"/>
+            <a:endParaRPr lang="en-GB" sz="2800" dirty="0">
               <a:solidFill>
                 <a:srgbClr val="0070C0"/>
               </a:solidFill>
             </a:endParaRPr>
           </a:p>
+          <a:p>
+            <a:pPr marL="514350" indent="-514350" algn="just">
+              <a:buFont typeface="Arial" panose="020B0604020202020204" pitchFamily="34" charset="0"/>
+              <a:buChar char="•"/>
+            </a:pPr>
+            <a:r>
+              <a:rPr lang="en-GB" sz="2800" dirty="0">
+                <a:solidFill>
+                  <a:srgbClr val="0070C0"/>
+                </a:solidFill>
+              </a:rPr>
+              <a:t>Keep changes small</a:t>
+            </a:r>
+            <a:r>
+              <a:rPr lang="en-GB" sz="2800" dirty="0" smtClean="0">
+                <a:solidFill>
+                  <a:srgbClr val="0070C0"/>
+                </a:solidFill>
+              </a:rPr>
+              <a:t>.</a:t>
+            </a:r>
+            <a:endParaRPr lang="pl-PL" sz="2800" dirty="0" smtClean="0">
+              <a:solidFill>
+                <a:srgbClr val="0070C0"/>
+              </a:solidFill>
+            </a:endParaRPr>
+          </a:p>
+          <a:p>
+            <a:pPr marL="514350" indent="-514350" algn="just">
+              <a:buFont typeface="Arial" panose="020B0604020202020204" pitchFamily="34" charset="0"/>
+              <a:buChar char="•"/>
+            </a:pPr>
+            <a:endParaRPr lang="en-GB" sz="2800" dirty="0">
+              <a:solidFill>
+                <a:srgbClr val="0070C0"/>
+              </a:solidFill>
+            </a:endParaRPr>
+          </a:p>
+          <a:p>
+            <a:pPr marL="514350" indent="-514350" algn="just">
+              <a:buFont typeface="Arial" panose="020B0604020202020204" pitchFamily="34" charset="0"/>
+              <a:buChar char="•"/>
+            </a:pPr>
+            <a:r>
+              <a:rPr lang="en-GB" sz="2800" dirty="0">
+                <a:solidFill>
+                  <a:srgbClr val="0070C0"/>
+                </a:solidFill>
+              </a:rPr>
+              <a:t>Store each project in a folder that is mirrored off the researcher's working </a:t>
+            </a:r>
+            <a:r>
+              <a:rPr lang="en-GB" sz="2800" dirty="0" smtClean="0">
+                <a:solidFill>
+                  <a:srgbClr val="0070C0"/>
+                </a:solidFill>
+              </a:rPr>
+              <a:t>machine</a:t>
+            </a:r>
+            <a:endParaRPr lang="pl-PL" sz="2800" dirty="0" smtClean="0">
+              <a:solidFill>
+                <a:srgbClr val="0070C0"/>
+              </a:solidFill>
+            </a:endParaRPr>
+          </a:p>
+          <a:p>
+            <a:pPr marL="514350" indent="-514350" algn="just">
+              <a:buFont typeface="Arial" panose="020B0604020202020204" pitchFamily="34" charset="0"/>
+              <a:buChar char="•"/>
+            </a:pPr>
+            <a:endParaRPr lang="en-GB" sz="2800" dirty="0">
+              <a:solidFill>
+                <a:srgbClr val="0070C0"/>
+              </a:solidFill>
+            </a:endParaRPr>
+          </a:p>
+          <a:p>
+            <a:pPr marL="514350" indent="-514350" algn="just">
+              <a:buFont typeface="Arial" panose="020B0604020202020204" pitchFamily="34" charset="0"/>
+              <a:buChar char="•"/>
+            </a:pPr>
+            <a:r>
+              <a:rPr lang="en-GB" sz="2800" dirty="0">
+                <a:solidFill>
+                  <a:srgbClr val="0070C0"/>
+                </a:solidFill>
+              </a:rPr>
+              <a:t>Share changes frequently.</a:t>
+            </a:r>
+          </a:p>
         </p:txBody>
       </p:sp>
       <p:pic>
         <p:nvPicPr>
-          <p:cNvPr id="4" name="Picture 2" descr="Ed_DaSH">
-            <a:extLst>
-              <a:ext uri="{FF2B5EF4-FFF2-40B4-BE49-F238E27FC236}">
-                <a16:creationId xmlns:a16="http://schemas.microsoft.com/office/drawing/2014/main" id="{A783256F-E39E-4712-96B0-240BD611CFEB}"/>
+          <p:cNvPr id="6" name="Picture 2" descr="Ed_DaSH">
+            <a:extLst>
+              <a:ext uri="{FF2B5EF4-FFF2-40B4-BE49-F238E27FC236}">
+                <a16:creationId xmlns:a16="http://schemas.microsoft.com/office/drawing/2014/main" id="{6F3CF586-06D2-46C3-A4A3-130E31C4A16F}"/>
               </a:ext>
             </a:extLst>
           </p:cNvPr>
@@ -5500,7 +7986,7 @@
           <p:nvPr/>
         </p:nvPicPr>
         <p:blipFill>
-          <a:blip r:embed="rId2">
+          <a:blip r:embed="rId2" cstate="hqprint">
             <a:extLst>
               <a:ext uri="{28A0092B-C50C-407E-A947-70E740481C1C}">
                 <a14:useLocalDpi xmlns:a14="http://schemas.microsoft.com/office/drawing/2010/main" val="0"/>
@@ -5534,224 +8020,40 @@
       </p:pic>
       <p:sp>
         <p:nvSpPr>
-          <p:cNvPr id="2" name="Rectangle 1">
-            <a:extLst>
-              <a:ext uri="{FF2B5EF4-FFF2-40B4-BE49-F238E27FC236}">
-                <a16:creationId xmlns:a16="http://schemas.microsoft.com/office/drawing/2014/main" id="{7AAE078A-6B0F-0A4D-8D08-92C32F04F022}"/>
-              </a:ext>
-            </a:extLst>
-          </p:cNvPr>
-          <p:cNvSpPr/>
+          <p:cNvPr id="4" name="TextBox 3">
+            <a:extLst>
+              <a:ext uri="{FF2B5EF4-FFF2-40B4-BE49-F238E27FC236}">
+                <a16:creationId xmlns:a16="http://schemas.microsoft.com/office/drawing/2014/main" id="{F4B0FDD5-5348-354F-A378-7241F2AF057B}"/>
+              </a:ext>
+            </a:extLst>
+          </p:cNvPr>
+          <p:cNvSpPr txBox="1"/>
           <p:nvPr/>
         </p:nvSpPr>
         <p:spPr>
           <a:xfrm>
-            <a:off x="978965" y="2088855"/>
-            <a:ext cx="10195715" cy="3108543"/>
+            <a:off x="1307676" y="444110"/>
+            <a:ext cx="4415889" cy="769441"/>
           </a:xfrm>
           <a:prstGeom prst="rect">
             <a:avLst/>
           </a:prstGeom>
+          <a:noFill/>
         </p:spPr>
         <p:txBody>
-          <a:bodyPr wrap="square">
+          <a:bodyPr wrap="none" rtlCol="0">
             <a:spAutoFit/>
           </a:bodyPr>
           <a:lstStyle/>
           <a:p>
-            <a:pPr marL="285750" indent="-285750">
-              <a:buFont typeface="Arial" panose="020B0604020202020204" pitchFamily="34" charset="0"/>
-              <a:buChar char="•"/>
-            </a:pPr>
-            <a:r>
-              <a:rPr lang="en-GB" sz="2800" dirty="0">
-                <a:solidFill>
-                  <a:srgbClr val="0070C0"/>
-                </a:solidFill>
-              </a:rPr>
-              <a:t>Software Carpentry git workshop https://</a:t>
-            </a:r>
-            <a:r>
-              <a:rPr lang="en-GB" sz="2800" dirty="0" err="1">
-                <a:solidFill>
-                  <a:srgbClr val="0070C0"/>
-                </a:solidFill>
-              </a:rPr>
-              <a:t>swcarpentry.github.io</a:t>
-            </a:r>
-            <a:r>
-              <a:rPr lang="en-GB" sz="2800" dirty="0">
-                <a:solidFill>
-                  <a:srgbClr val="0070C0"/>
-                </a:solidFill>
-              </a:rPr>
-              <a:t>/git-novice/</a:t>
-            </a:r>
-          </a:p>
-          <a:p>
-            <a:pPr marL="285750" indent="-285750">
-              <a:buFont typeface="Arial" panose="020B0604020202020204" pitchFamily="34" charset="0"/>
-              <a:buChar char="•"/>
-            </a:pPr>
-            <a:r>
-              <a:rPr lang="en-GB" sz="2800" dirty="0">
-                <a:solidFill>
-                  <a:srgbClr val="0070C0"/>
-                </a:solidFill>
-              </a:rPr>
-              <a:t>Edinburgh Carpentries runs courses: https://</a:t>
-            </a:r>
-            <a:r>
-              <a:rPr lang="en-GB" sz="2800" dirty="0" err="1">
-                <a:solidFill>
-                  <a:srgbClr val="0070C0"/>
-                </a:solidFill>
-              </a:rPr>
-              <a:t>edcarp.github.io</a:t>
-            </a:r>
-            <a:r>
-              <a:rPr lang="en-GB" sz="2800" dirty="0">
-                <a:solidFill>
-                  <a:srgbClr val="0070C0"/>
-                </a:solidFill>
-              </a:rPr>
-              <a:t>/</a:t>
-            </a:r>
-          </a:p>
-          <a:p>
-            <a:pPr marL="285750" indent="-285750">
-              <a:buFont typeface="Arial" panose="020B0604020202020204" pitchFamily="34" charset="0"/>
-              <a:buChar char="•"/>
-            </a:pPr>
-            <a:r>
-              <a:rPr lang="en-GB" sz="2800" dirty="0">
-                <a:solidFill>
-                  <a:srgbClr val="0070C0"/>
-                </a:solidFill>
-              </a:rPr>
-              <a:t>https://</a:t>
-            </a:r>
-            <a:r>
-              <a:rPr lang="en-GB" sz="2800" dirty="0" err="1">
-                <a:solidFill>
-                  <a:srgbClr val="0070C0"/>
-                </a:solidFill>
-              </a:rPr>
-              <a:t>ourcodingclub.github.io</a:t>
-            </a:r>
-            <a:r>
-              <a:rPr lang="en-GB" sz="2800" dirty="0">
-                <a:solidFill>
-                  <a:srgbClr val="0070C0"/>
-                </a:solidFill>
-              </a:rPr>
-              <a:t>/tutorials/git/</a:t>
-            </a:r>
-          </a:p>
-          <a:p>
-            <a:pPr marL="285750" indent="-285750">
-              <a:buFont typeface="Arial" panose="020B0604020202020204" pitchFamily="34" charset="0"/>
-              <a:buChar char="•"/>
-            </a:pPr>
-            <a:r>
-              <a:rPr lang="en-GB" sz="2800" dirty="0">
-                <a:solidFill>
-                  <a:srgbClr val="0070C0"/>
-                </a:solidFill>
-              </a:rPr>
-              <a:t>Crash course on </a:t>
-            </a:r>
-            <a:r>
-              <a:rPr lang="en-GB" sz="2800" dirty="0" err="1">
-                <a:solidFill>
-                  <a:srgbClr val="0070C0"/>
-                </a:solidFill>
-              </a:rPr>
-              <a:t>youtube</a:t>
-            </a:r>
-            <a:r>
-              <a:rPr lang="en-GB" sz="2800" dirty="0">
-                <a:solidFill>
-                  <a:srgbClr val="0070C0"/>
-                </a:solidFill>
-              </a:rPr>
-              <a:t>: https://</a:t>
-            </a:r>
-            <a:r>
-              <a:rPr lang="en-GB" sz="2800" dirty="0" err="1">
-                <a:solidFill>
-                  <a:srgbClr val="0070C0"/>
-                </a:solidFill>
-              </a:rPr>
-              <a:t>youtu.be</a:t>
-            </a:r>
-            <a:r>
-              <a:rPr lang="en-GB" sz="2800" dirty="0">
-                <a:solidFill>
-                  <a:srgbClr val="0070C0"/>
-                </a:solidFill>
-              </a:rPr>
-              <a:t>/SWYqp7iY_Tc</a:t>
-            </a:r>
-          </a:p>
-          <a:p>
-            <a:pPr marL="285750" indent="-285750">
-              <a:buFont typeface="Arial" panose="020B0604020202020204" pitchFamily="34" charset="0"/>
-              <a:buChar char="•"/>
-            </a:pPr>
-            <a:r>
-              <a:rPr lang="en-GB" sz="2800" dirty="0">
-                <a:solidFill>
-                  <a:srgbClr val="0070C0"/>
-                </a:solidFill>
-              </a:rPr>
-              <a:t>Learn git branching: https://</a:t>
-            </a:r>
-            <a:r>
-              <a:rPr lang="en-GB" sz="2800" dirty="0" err="1">
-                <a:solidFill>
-                  <a:srgbClr val="0070C0"/>
-                </a:solidFill>
-              </a:rPr>
-              <a:t>learngitbranching.js.org</a:t>
-            </a:r>
-            <a:r>
-              <a:rPr lang="en-GB" sz="2800" dirty="0">
-                <a:solidFill>
-                  <a:srgbClr val="0070C0"/>
-                </a:solidFill>
-              </a:rPr>
-              <a:t>/</a:t>
-            </a:r>
-          </a:p>
-          <a:p>
-            <a:pPr marL="285750" indent="-285750">
-              <a:buFont typeface="Arial" panose="020B0604020202020204" pitchFamily="34" charset="0"/>
-              <a:buChar char="•"/>
-            </a:pPr>
-            <a:r>
-              <a:rPr lang="en-GB" sz="2800" dirty="0">
-                <a:solidFill>
-                  <a:srgbClr val="0070C0"/>
-                </a:solidFill>
-              </a:rPr>
-              <a:t>Learn git-game: https://</a:t>
-            </a:r>
-            <a:r>
-              <a:rPr lang="en-GB" sz="2800" dirty="0" err="1">
-                <a:solidFill>
-                  <a:srgbClr val="0070C0"/>
-                </a:solidFill>
-              </a:rPr>
-              <a:t>github.com</a:t>
-            </a:r>
-            <a:r>
-              <a:rPr lang="en-GB" sz="2800" dirty="0">
-                <a:solidFill>
-                  <a:srgbClr val="0070C0"/>
-                </a:solidFill>
-              </a:rPr>
-              <a:t>/git-game/git-game</a:t>
+            <a:pPr algn="ctr"/>
+            <a:r>
+              <a:rPr lang="en-GB" sz="4400" dirty="0">
+                <a:solidFill>
+                  <a:srgbClr val="0070C0"/>
+                </a:solidFill>
+              </a:rPr>
+              <a:t>Manual versioning</a:t>
             </a:r>
           </a:p>
         </p:txBody>
@@ -5759,7 +8061,7 @@
     </p:spTree>
     <p:extLst>
       <p:ext uri="{BB962C8B-B14F-4D97-AF65-F5344CB8AC3E}">
-        <p14:creationId xmlns:p14="http://schemas.microsoft.com/office/powerpoint/2010/main" val="149368189"/>
+        <p14:creationId xmlns:p14="http://schemas.microsoft.com/office/powerpoint/2010/main" val="2106125023"/>
       </p:ext>
     </p:extLst>
   </p:cSld>

</xml_diff>

<commit_message>
Tweaks after test run
</commit_message>
<xml_diff>
--- a/instructors/11-Version_Control_BT.pptx
+++ b/instructors/11-Version_Control_BT.pptx
@@ -5,7 +5,7 @@
     <p:sldMasterId id="2147483648" r:id="rId1"/>
   </p:sldMasterIdLst>
   <p:notesMasterIdLst>
-    <p:notesMasterId r:id="rId22"/>
+    <p:notesMasterId r:id="rId23"/>
   </p:notesMasterIdLst>
   <p:sldIdLst>
     <p:sldId id="276" r:id="rId2"/>
@@ -22,12 +22,13 @@
     <p:sldId id="262" r:id="rId13"/>
     <p:sldId id="272" r:id="rId14"/>
     <p:sldId id="258" r:id="rId15"/>
-    <p:sldId id="269" r:id="rId16"/>
-    <p:sldId id="282" r:id="rId17"/>
-    <p:sldId id="283" r:id="rId18"/>
-    <p:sldId id="275" r:id="rId19"/>
-    <p:sldId id="284" r:id="rId20"/>
-    <p:sldId id="285" r:id="rId21"/>
+    <p:sldId id="286" r:id="rId16"/>
+    <p:sldId id="269" r:id="rId17"/>
+    <p:sldId id="282" r:id="rId18"/>
+    <p:sldId id="283" r:id="rId19"/>
+    <p:sldId id="275" r:id="rId20"/>
+    <p:sldId id="284" r:id="rId21"/>
+    <p:sldId id="285" r:id="rId22"/>
   </p:sldIdLst>
   <p:sldSz cx="12192000" cy="6858000"/>
   <p:notesSz cx="6858000" cy="9144000"/>
@@ -216,7 +217,7 @@
           <a:p>
             <a:fld id="{585C48AE-4A1E-9A43-835F-510354165F99}" type="datetimeFigureOut">
               <a:rPr lang="en-GB" smtClean="0"/>
-              <a:t>06/09/2021</a:t>
+              <a:t>29/09/2021</a:t>
             </a:fld>
             <a:endParaRPr lang="en-GB"/>
           </a:p>
@@ -782,7 +783,7 @@
           <a:p>
             <a:fld id="{5913FB77-D8DB-4AB9-8EA5-EE8C3B57A5E1}" type="datetimeFigureOut">
               <a:rPr lang="en-GB" smtClean="0"/>
-              <a:t>06/09/2021</a:t>
+              <a:t>29/09/2021</a:t>
             </a:fld>
             <a:endParaRPr lang="en-GB"/>
           </a:p>
@@ -982,7 +983,7 @@
           <a:p>
             <a:fld id="{5913FB77-D8DB-4AB9-8EA5-EE8C3B57A5E1}" type="datetimeFigureOut">
               <a:rPr lang="en-GB" smtClean="0"/>
-              <a:t>06/09/2021</a:t>
+              <a:t>29/09/2021</a:t>
             </a:fld>
             <a:endParaRPr lang="en-GB"/>
           </a:p>
@@ -1192,7 +1193,7 @@
           <a:p>
             <a:fld id="{5913FB77-D8DB-4AB9-8EA5-EE8C3B57A5E1}" type="datetimeFigureOut">
               <a:rPr lang="en-GB" smtClean="0"/>
-              <a:t>06/09/2021</a:t>
+              <a:t>29/09/2021</a:t>
             </a:fld>
             <a:endParaRPr lang="en-GB"/>
           </a:p>
@@ -1392,7 +1393,7 @@
           <a:p>
             <a:fld id="{5913FB77-D8DB-4AB9-8EA5-EE8C3B57A5E1}" type="datetimeFigureOut">
               <a:rPr lang="en-GB" smtClean="0"/>
-              <a:t>06/09/2021</a:t>
+              <a:t>29/09/2021</a:t>
             </a:fld>
             <a:endParaRPr lang="en-GB"/>
           </a:p>
@@ -1668,7 +1669,7 @@
           <a:p>
             <a:fld id="{5913FB77-D8DB-4AB9-8EA5-EE8C3B57A5E1}" type="datetimeFigureOut">
               <a:rPr lang="en-GB" smtClean="0"/>
-              <a:t>06/09/2021</a:t>
+              <a:t>29/09/2021</a:t>
             </a:fld>
             <a:endParaRPr lang="en-GB"/>
           </a:p>
@@ -1936,7 +1937,7 @@
           <a:p>
             <a:fld id="{5913FB77-D8DB-4AB9-8EA5-EE8C3B57A5E1}" type="datetimeFigureOut">
               <a:rPr lang="en-GB" smtClean="0"/>
-              <a:t>06/09/2021</a:t>
+              <a:t>29/09/2021</a:t>
             </a:fld>
             <a:endParaRPr lang="en-GB"/>
           </a:p>
@@ -2351,7 +2352,7 @@
           <a:p>
             <a:fld id="{5913FB77-D8DB-4AB9-8EA5-EE8C3B57A5E1}" type="datetimeFigureOut">
               <a:rPr lang="en-GB" smtClean="0"/>
-              <a:t>06/09/2021</a:t>
+              <a:t>29/09/2021</a:t>
             </a:fld>
             <a:endParaRPr lang="en-GB"/>
           </a:p>
@@ -2493,7 +2494,7 @@
           <a:p>
             <a:fld id="{5913FB77-D8DB-4AB9-8EA5-EE8C3B57A5E1}" type="datetimeFigureOut">
               <a:rPr lang="en-GB" smtClean="0"/>
-              <a:t>06/09/2021</a:t>
+              <a:t>29/09/2021</a:t>
             </a:fld>
             <a:endParaRPr lang="en-GB"/>
           </a:p>
@@ -2606,7 +2607,7 @@
           <a:p>
             <a:fld id="{5913FB77-D8DB-4AB9-8EA5-EE8C3B57A5E1}" type="datetimeFigureOut">
               <a:rPr lang="en-GB" smtClean="0"/>
-              <a:t>06/09/2021</a:t>
+              <a:t>29/09/2021</a:t>
             </a:fld>
             <a:endParaRPr lang="en-GB"/>
           </a:p>
@@ -2919,7 +2920,7 @@
           <a:p>
             <a:fld id="{5913FB77-D8DB-4AB9-8EA5-EE8C3B57A5E1}" type="datetimeFigureOut">
               <a:rPr lang="en-GB" smtClean="0"/>
-              <a:t>06/09/2021</a:t>
+              <a:t>29/09/2021</a:t>
             </a:fld>
             <a:endParaRPr lang="en-GB"/>
           </a:p>
@@ -3208,7 +3209,7 @@
           <a:p>
             <a:fld id="{5913FB77-D8DB-4AB9-8EA5-EE8C3B57A5E1}" type="datetimeFigureOut">
               <a:rPr lang="en-GB" smtClean="0"/>
-              <a:t>06/09/2021</a:t>
+              <a:t>29/09/2021</a:t>
             </a:fld>
             <a:endParaRPr lang="en-GB"/>
           </a:p>
@@ -3451,7 +3452,7 @@
           <a:p>
             <a:fld id="{5913FB77-D8DB-4AB9-8EA5-EE8C3B57A5E1}" type="datetimeFigureOut">
               <a:rPr lang="en-GB" smtClean="0"/>
-              <a:t>06/09/2021</a:t>
+              <a:t>29/09/2021</a:t>
             </a:fld>
             <a:endParaRPr lang="en-GB"/>
           </a:p>
@@ -4337,8 +4338,8 @@
         </p:blipFill>
         <p:spPr>
           <a:xfrm>
-            <a:off x="231936" y="698863"/>
-            <a:ext cx="10797540" cy="5009606"/>
+            <a:off x="-96098" y="420238"/>
+            <a:ext cx="12288098" cy="5701162"/>
           </a:xfrm>
           <a:prstGeom prst="rect">
             <a:avLst/>
@@ -4638,7 +4639,7 @@
                   <a14:useLocalDpi xmlns:a14="http://schemas.microsoft.com/office/drawing/2010/main" val="0"/>
                 </a:ext>
                 <a:ext uri="{96DAC541-7B7A-43D3-8B79-37D633B846F1}">
-                  <asvg:svgBlip xmlns:asvg="http://schemas.microsoft.com/office/drawing/2016/SVG/main" xmlns="" r:embed="rId4"/>
+                  <asvg:svgBlip xmlns="" xmlns:asvg="http://schemas.microsoft.com/office/drawing/2016/SVG/main" r:embed="rId4"/>
                 </a:ext>
               </a:extLst>
             </a:blip>
@@ -4677,7 +4678,7 @@
                   <a14:useLocalDpi xmlns:a14="http://schemas.microsoft.com/office/drawing/2010/main" val="0"/>
                 </a:ext>
                 <a:ext uri="{96DAC541-7B7A-43D3-8B79-37D633B846F1}">
-                  <asvg:svgBlip xmlns:asvg="http://schemas.microsoft.com/office/drawing/2016/SVG/main" xmlns="" r:embed="rId6"/>
+                  <asvg:svgBlip xmlns="" xmlns:asvg="http://schemas.microsoft.com/office/drawing/2016/SVG/main" r:embed="rId6"/>
                 </a:ext>
               </a:extLst>
             </a:blip>
@@ -4716,7 +4717,7 @@
                   <a14:useLocalDpi xmlns:a14="http://schemas.microsoft.com/office/drawing/2010/main" val="0"/>
                 </a:ext>
                 <a:ext uri="{96DAC541-7B7A-43D3-8B79-37D633B846F1}">
-                  <asvg:svgBlip xmlns:asvg="http://schemas.microsoft.com/office/drawing/2016/SVG/main" xmlns="" r:embed="rId8"/>
+                  <asvg:svgBlip xmlns="" xmlns:asvg="http://schemas.microsoft.com/office/drawing/2016/SVG/main" r:embed="rId8"/>
                 </a:ext>
               </a:extLst>
             </a:blip>
@@ -4996,7 +4997,7 @@
         <p:spPr>
           <a:xfrm>
             <a:off x="978965" y="2088855"/>
-            <a:ext cx="10195715" cy="3108543"/>
+            <a:ext cx="10195715" cy="1384995"/>
           </a:xfrm>
           <a:prstGeom prst="rect">
             <a:avLst/>
@@ -5013,28 +5014,12 @@
               <a:buChar char="•"/>
             </a:pPr>
             <a:r>
-              <a:rPr lang="en-GB" sz="2800" dirty="0">
-                <a:solidFill>
-                  <a:srgbClr val="0070C0"/>
-                </a:solidFill>
-              </a:rPr>
-              <a:t>Software Carpentry git workshop https://</a:t>
-            </a:r>
-            <a:r>
-              <a:rPr lang="en-GB" sz="2800" dirty="0" err="1">
-                <a:solidFill>
-                  <a:srgbClr val="0070C0"/>
-                </a:solidFill>
-              </a:rPr>
-              <a:t>swcarpentry.github.io</a:t>
-            </a:r>
-            <a:r>
-              <a:rPr lang="en-GB" sz="2800" dirty="0">
-                <a:solidFill>
-                  <a:srgbClr val="0070C0"/>
-                </a:solidFill>
-              </a:rPr>
-              <a:t>/git-novice/</a:t>
+              <a:rPr lang="pl-PL" sz="2800" dirty="0" smtClean="0">
+                <a:solidFill>
+                  <a:srgbClr val="0070C0"/>
+                </a:solidFill>
+              </a:rPr>
+              <a:t>a must for computing</a:t>
             </a:r>
           </a:p>
           <a:p>
@@ -5042,30 +5027,11 @@
               <a:buFont typeface="Arial" panose="020B0604020202020204" pitchFamily="34" charset="0"/>
               <a:buChar char="•"/>
             </a:pPr>
-            <a:r>
-              <a:rPr lang="en-GB" sz="2800" dirty="0">
-                <a:solidFill>
-                  <a:srgbClr val="0070C0"/>
-                </a:solidFill>
-              </a:rPr>
-              <a:t>Edinburgh Carpentries runs courses: https://</a:t>
-            </a:r>
-            <a:r>
-              <a:rPr lang="en-GB" sz="2800" dirty="0" err="1">
-                <a:solidFill>
-                  <a:srgbClr val="0070C0"/>
-                </a:solidFill>
-              </a:rPr>
-              <a:t>edcarp.github.io</a:t>
-            </a:r>
-            <a:r>
-              <a:rPr lang="en-GB" sz="2800" dirty="0">
-                <a:solidFill>
-                  <a:srgbClr val="0070C0"/>
-                </a:solidFill>
-              </a:rPr>
-              <a:t>/</a:t>
-            </a:r>
+            <a:endParaRPr lang="en-GB" sz="2800" dirty="0">
+              <a:solidFill>
+                <a:srgbClr val="0070C0"/>
+              </a:solidFill>
+            </a:endParaRPr>
           </a:p>
           <a:p>
             <a:pPr marL="285750" indent="-285750">
@@ -5073,142 +5039,55 @@
               <a:buChar char="•"/>
             </a:pPr>
             <a:r>
-              <a:rPr lang="en-GB" sz="2800" dirty="0">
-                <a:solidFill>
-                  <a:srgbClr val="0070C0"/>
-                </a:solidFill>
-              </a:rPr>
-              <a:t>https://</a:t>
-            </a:r>
-            <a:r>
-              <a:rPr lang="en-GB" sz="2800" dirty="0" err="1">
-                <a:solidFill>
-                  <a:srgbClr val="0070C0"/>
-                </a:solidFill>
-              </a:rPr>
-              <a:t>ourcodingclub.github.io</a:t>
-            </a:r>
-            <a:r>
-              <a:rPr lang="en-GB" sz="2800" dirty="0">
-                <a:solidFill>
-                  <a:srgbClr val="0070C0"/>
-                </a:solidFill>
-              </a:rPr>
-              <a:t>/tutorials/git/</a:t>
-            </a:r>
-          </a:p>
-          <a:p>
-            <a:pPr marL="285750" indent="-285750">
-              <a:buFont typeface="Arial" panose="020B0604020202020204" pitchFamily="34" charset="0"/>
-              <a:buChar char="•"/>
-            </a:pPr>
-            <a:r>
-              <a:rPr lang="en-GB" sz="2800" dirty="0">
-                <a:solidFill>
-                  <a:srgbClr val="0070C0"/>
-                </a:solidFill>
-              </a:rPr>
-              <a:t>Crash course on </a:t>
-            </a:r>
-            <a:r>
-              <a:rPr lang="en-GB" sz="2800" dirty="0" err="1">
-                <a:solidFill>
-                  <a:srgbClr val="0070C0"/>
-                </a:solidFill>
-              </a:rPr>
-              <a:t>youtube</a:t>
-            </a:r>
-            <a:r>
-              <a:rPr lang="en-GB" sz="2800" dirty="0">
-                <a:solidFill>
-                  <a:srgbClr val="0070C0"/>
-                </a:solidFill>
-              </a:rPr>
-              <a:t>: https://</a:t>
-            </a:r>
-            <a:r>
-              <a:rPr lang="en-GB" sz="2800" dirty="0" err="1">
-                <a:solidFill>
-                  <a:srgbClr val="0070C0"/>
-                </a:solidFill>
-              </a:rPr>
-              <a:t>youtu.be</a:t>
-            </a:r>
-            <a:r>
-              <a:rPr lang="en-GB" sz="2800" dirty="0">
-                <a:solidFill>
-                  <a:srgbClr val="0070C0"/>
-                </a:solidFill>
-              </a:rPr>
-              <a:t>/SWYqp7iY_Tc</a:t>
-            </a:r>
-          </a:p>
-          <a:p>
-            <a:pPr marL="285750" indent="-285750">
-              <a:buFont typeface="Arial" panose="020B0604020202020204" pitchFamily="34" charset="0"/>
-              <a:buChar char="•"/>
-            </a:pPr>
-            <a:r>
-              <a:rPr lang="en-GB" sz="2800" dirty="0">
-                <a:solidFill>
-                  <a:srgbClr val="0070C0"/>
-                </a:solidFill>
-              </a:rPr>
-              <a:t>Learn git branching: https://</a:t>
-            </a:r>
-            <a:r>
-              <a:rPr lang="en-GB" sz="2800" dirty="0" err="1">
-                <a:solidFill>
-                  <a:srgbClr val="0070C0"/>
-                </a:solidFill>
-              </a:rPr>
-              <a:t>learngitbranching.js.org</a:t>
-            </a:r>
-            <a:r>
-              <a:rPr lang="en-GB" sz="2800" dirty="0">
-                <a:solidFill>
-                  <a:srgbClr val="0070C0"/>
-                </a:solidFill>
-              </a:rPr>
-              <a:t>/</a:t>
-            </a:r>
-          </a:p>
-          <a:p>
-            <a:pPr marL="285750" indent="-285750">
-              <a:buFont typeface="Arial" panose="020B0604020202020204" pitchFamily="34" charset="0"/>
-              <a:buChar char="•"/>
-            </a:pPr>
-            <a:r>
-              <a:rPr lang="en-GB" sz="2800" dirty="0">
-                <a:solidFill>
-                  <a:srgbClr val="0070C0"/>
-                </a:solidFill>
-              </a:rPr>
-              <a:t>Learn git-game: https://</a:t>
-            </a:r>
-            <a:r>
-              <a:rPr lang="en-GB" sz="2800" dirty="0" err="1">
-                <a:solidFill>
-                  <a:srgbClr val="0070C0"/>
-                </a:solidFill>
-              </a:rPr>
-              <a:t>github.com</a:t>
-            </a:r>
-            <a:r>
-              <a:rPr lang="en-GB" sz="2800" dirty="0">
-                <a:solidFill>
-                  <a:srgbClr val="0070C0"/>
-                </a:solidFill>
-              </a:rPr>
-              <a:t>/git-game/git-game</a:t>
-            </a:r>
-          </a:p>
-        </p:txBody>
-      </p:sp>
+              <a:rPr lang="pl-PL" sz="2800" dirty="0" smtClean="0">
+                <a:solidFill>
+                  <a:srgbClr val="0070C0"/>
+                </a:solidFill>
+              </a:rPr>
+              <a:t>a worthy skill for everyone</a:t>
+            </a:r>
+            <a:endParaRPr lang="en-GB" sz="2800" dirty="0">
+              <a:solidFill>
+                <a:srgbClr val="0070C0"/>
+              </a:solidFill>
+            </a:endParaRPr>
+          </a:p>
+        </p:txBody>
+      </p:sp>
+      <p:pic>
+        <p:nvPicPr>
+          <p:cNvPr id="3" name="Picture 2"/>
+          <p:cNvPicPr>
+            <a:picLocks noChangeAspect="1"/>
+          </p:cNvPicPr>
+          <p:nvPr/>
+        </p:nvPicPr>
+        <p:blipFill>
+          <a:blip r:embed="rId3">
+            <a:extLst>
+              <a:ext uri="{28A0092B-C50C-407E-A947-70E740481C1C}">
+                <a14:useLocalDpi xmlns:a14="http://schemas.microsoft.com/office/drawing/2010/main" val="0"/>
+              </a:ext>
+            </a:extLst>
+          </a:blip>
+          <a:stretch>
+            <a:fillRect/>
+          </a:stretch>
+        </p:blipFill>
+        <p:spPr>
+          <a:xfrm>
+            <a:off x="6076822" y="91546"/>
+            <a:ext cx="4520696" cy="6548162"/>
+          </a:xfrm>
+          <a:prstGeom prst="rect">
+            <a:avLst/>
+          </a:prstGeom>
+        </p:spPr>
+      </p:pic>
     </p:spTree>
     <p:extLst>
       <p:ext uri="{BB962C8B-B14F-4D97-AF65-F5344CB8AC3E}">
-        <p14:creationId xmlns:p14="http://schemas.microsoft.com/office/powerpoint/2010/main" val="149368189"/>
+        <p14:creationId xmlns:p14="http://schemas.microsoft.com/office/powerpoint/2010/main" val="3907613532"/>
       </p:ext>
     </p:extLst>
   </p:cSld>
@@ -5235,12 +5114,64 @@
           <a:chExt cx="0" cy="0"/>
         </a:xfrm>
       </p:grpSpPr>
+      <p:sp>
+        <p:nvSpPr>
+          <p:cNvPr id="5" name="TextBox 4">
+            <a:extLst>
+              <a:ext uri="{FF2B5EF4-FFF2-40B4-BE49-F238E27FC236}">
+                <a16:creationId xmlns:a16="http://schemas.microsoft.com/office/drawing/2014/main" id="{3A7A1F5C-9C70-4DE3-BA39-7835B2935EB3}"/>
+              </a:ext>
+            </a:extLst>
+          </p:cNvPr>
+          <p:cNvSpPr txBox="1"/>
+          <p:nvPr/>
+        </p:nvSpPr>
+        <p:spPr>
+          <a:xfrm>
+            <a:off x="515880" y="488425"/>
+            <a:ext cx="9464530" cy="1200329"/>
+          </a:xfrm>
+          <a:prstGeom prst="rect">
+            <a:avLst/>
+          </a:prstGeom>
+          <a:noFill/>
+        </p:spPr>
+        <p:txBody>
+          <a:bodyPr wrap="square">
+            <a:spAutoFit/>
+          </a:bodyPr>
+          <a:lstStyle/>
+          <a:p>
+            <a:r>
+              <a:rPr lang="pl-PL" sz="3600" dirty="0" smtClean="0">
+                <a:solidFill>
+                  <a:srgbClr val="0070C0"/>
+                </a:solidFill>
+              </a:rPr>
+              <a:t>Learning git</a:t>
+            </a:r>
+            <a:endParaRPr lang="en-GB" sz="3600" dirty="0">
+              <a:solidFill>
+                <a:srgbClr val="0070C0"/>
+              </a:solidFill>
+            </a:endParaRPr>
+          </a:p>
+          <a:p>
+            <a:pPr algn="ctr"/>
+            <a:endParaRPr lang="en-GB" sz="3600" dirty="0">
+              <a:solidFill>
+                <a:srgbClr val="0070C0"/>
+              </a:solidFill>
+            </a:endParaRPr>
+          </a:p>
+        </p:txBody>
+      </p:sp>
       <p:pic>
         <p:nvPicPr>
-          <p:cNvPr id="6" name="Picture 2" descr="Ed_DaSH">
-            <a:extLst>
-              <a:ext uri="{FF2B5EF4-FFF2-40B4-BE49-F238E27FC236}">
-                <a16:creationId xmlns:a16="http://schemas.microsoft.com/office/drawing/2014/main" id="{6F3CF586-06D2-46C3-A4A3-130E31C4A16F}"/>
+          <p:cNvPr id="4" name="Picture 2" descr="Ed_DaSH">
+            <a:extLst>
+              <a:ext uri="{FF2B5EF4-FFF2-40B4-BE49-F238E27FC236}">
+                <a16:creationId xmlns:a16="http://schemas.microsoft.com/office/drawing/2014/main" id="{A783256F-E39E-4712-96B0-240BD611CFEB}"/>
               </a:ext>
             </a:extLst>
           </p:cNvPr>
@@ -5284,47 +5215,7 @@
       </p:pic>
       <p:sp>
         <p:nvSpPr>
-          <p:cNvPr id="4" name="TextBox 3">
-            <a:extLst>
-              <a:ext uri="{FF2B5EF4-FFF2-40B4-BE49-F238E27FC236}">
-                <a16:creationId xmlns:a16="http://schemas.microsoft.com/office/drawing/2014/main" id="{F4B0FDD5-5348-354F-A378-7241F2AF057B}"/>
-              </a:ext>
-            </a:extLst>
-          </p:cNvPr>
-          <p:cNvSpPr txBox="1"/>
-          <p:nvPr/>
-        </p:nvSpPr>
-        <p:spPr>
-          <a:xfrm>
-            <a:off x="777240" y="379920"/>
-            <a:ext cx="10043430" cy="769441"/>
-          </a:xfrm>
-          <a:prstGeom prst="rect">
-            <a:avLst/>
-          </a:prstGeom>
-          <a:noFill/>
-        </p:spPr>
-        <p:txBody>
-          <a:bodyPr wrap="square" rtlCol="0">
-            <a:spAutoFit/>
-          </a:bodyPr>
-          <a:lstStyle/>
-          <a:p>
-            <a:pPr algn="ctr"/>
-            <a:r>
-              <a:rPr lang="en-GB" sz="4400" dirty="0">
-                <a:solidFill>
-                  <a:srgbClr val="0070C0"/>
-                </a:solidFill>
-              </a:rPr>
-              <a:t>Semantic versioning</a:t>
-            </a:r>
-          </a:p>
-        </p:txBody>
-      </p:sp>
-      <p:sp>
-        <p:nvSpPr>
-          <p:cNvPr id="7" name="Rectangle 6">
+          <p:cNvPr id="2" name="Rectangle 1">
             <a:extLst>
               <a:ext uri="{FF2B5EF4-FFF2-40B4-BE49-F238E27FC236}">
                 <a16:creationId xmlns:a16="http://schemas.microsoft.com/office/drawing/2014/main" id="{7AAE078A-6B0F-0A4D-8D08-92C32F04F022}"/>
@@ -5337,7 +5228,7 @@
         <p:spPr>
           <a:xfrm>
             <a:off x="978965" y="2088855"/>
-            <a:ext cx="10195715" cy="3970318"/>
+            <a:ext cx="10195715" cy="3108543"/>
           </a:xfrm>
           <a:prstGeom prst="rect">
             <a:avLst/>
@@ -5359,32 +5250,54 @@
                   <a:srgbClr val="0070C0"/>
                 </a:solidFill>
               </a:rPr>
-              <a:t>a particular point in time (a set of changes) has its logical </a:t>
-            </a:r>
-            <a:r>
-              <a:rPr lang="en-GB" sz="2800" dirty="0" smtClean="0">
-                <a:solidFill>
-                  <a:srgbClr val="0070C0"/>
-                </a:solidFill>
-              </a:rPr>
-              <a:t>meaning</a:t>
-            </a:r>
-            <a:endParaRPr lang="pl-PL" sz="2800" dirty="0" smtClean="0">
-              <a:solidFill>
-                <a:srgbClr val="0070C0"/>
-              </a:solidFill>
-            </a:endParaRPr>
+              <a:t>Software Carpentry git workshop https://</a:t>
+            </a:r>
+            <a:r>
+              <a:rPr lang="en-GB" sz="2800" dirty="0" err="1">
+                <a:solidFill>
+                  <a:srgbClr val="0070C0"/>
+                </a:solidFill>
+              </a:rPr>
+              <a:t>swcarpentry.github.io</a:t>
+            </a:r>
+            <a:r>
+              <a:rPr lang="en-GB" sz="2800" dirty="0">
+                <a:solidFill>
+                  <a:srgbClr val="0070C0"/>
+                </a:solidFill>
+              </a:rPr>
+              <a:t>/git-novice/</a:t>
+            </a:r>
           </a:p>
           <a:p>
             <a:pPr marL="285750" indent="-285750">
               <a:buFont typeface="Arial" panose="020B0604020202020204" pitchFamily="34" charset="0"/>
               <a:buChar char="•"/>
             </a:pPr>
-            <a:endParaRPr lang="pl-PL" sz="2800" dirty="0">
-              <a:solidFill>
-                <a:srgbClr val="0070C0"/>
-              </a:solidFill>
-            </a:endParaRPr>
+            <a:r>
+              <a:rPr lang="en-GB" sz="2800" dirty="0">
+                <a:solidFill>
+                  <a:srgbClr val="0070C0"/>
+                </a:solidFill>
+              </a:rPr>
+              <a:t>Edinburgh Carpentries runs courses: https://</a:t>
+            </a:r>
+            <a:r>
+              <a:rPr lang="en-GB" sz="2800" dirty="0" err="1">
+                <a:solidFill>
+                  <a:srgbClr val="0070C0"/>
+                </a:solidFill>
+              </a:rPr>
+              <a:t>edcarp.github.io</a:t>
+            </a:r>
+            <a:r>
+              <a:rPr lang="en-GB" sz="2800" dirty="0">
+                <a:solidFill>
+                  <a:srgbClr val="0070C0"/>
+                </a:solidFill>
+              </a:rPr>
+              <a:t>/</a:t>
+            </a:r>
           </a:p>
           <a:p>
             <a:pPr marL="285750" indent="-285750">
@@ -5397,32 +5310,70 @@
                   <a:srgbClr val="0070C0"/>
                 </a:solidFill>
               </a:rPr>
-              <a:t>the “official” point in time (especially if it is meant to be consumed by others) is called release</a:t>
-            </a:r>
-            <a:r>
-              <a:rPr lang="en-GB" sz="2800" dirty="0" smtClean="0">
-                <a:solidFill>
-                  <a:srgbClr val="0070C0"/>
-                </a:solidFill>
-              </a:rPr>
-              <a:t>.</a:t>
-            </a:r>
-            <a:endParaRPr lang="pl-PL" sz="2800" dirty="0" smtClean="0">
-              <a:solidFill>
-                <a:srgbClr val="0070C0"/>
-              </a:solidFill>
-            </a:endParaRPr>
+              <a:t>https://</a:t>
+            </a:r>
+            <a:r>
+              <a:rPr lang="en-GB" sz="2800" dirty="0" err="1">
+                <a:solidFill>
+                  <a:srgbClr val="0070C0"/>
+                </a:solidFill>
+              </a:rPr>
+              <a:t>ourcodingclub.github.io</a:t>
+            </a:r>
+            <a:r>
+              <a:rPr lang="en-GB" sz="2800" dirty="0">
+                <a:solidFill>
+                  <a:srgbClr val="0070C0"/>
+                </a:solidFill>
+              </a:rPr>
+              <a:t>/tutorials/git/</a:t>
+            </a:r>
           </a:p>
           <a:p>
             <a:pPr marL="285750" indent="-285750">
               <a:buFont typeface="Arial" panose="020B0604020202020204" pitchFamily="34" charset="0"/>
               <a:buChar char="•"/>
             </a:pPr>
-            <a:endParaRPr lang="en-GB" sz="2800" dirty="0">
-              <a:solidFill>
-                <a:srgbClr val="0070C0"/>
-              </a:solidFill>
-            </a:endParaRPr>
+            <a:r>
+              <a:rPr lang="en-GB" sz="2800" dirty="0">
+                <a:solidFill>
+                  <a:srgbClr val="0070C0"/>
+                </a:solidFill>
+              </a:rPr>
+              <a:t>Crash course on </a:t>
+            </a:r>
+            <a:r>
+              <a:rPr lang="en-GB" sz="2800" dirty="0" err="1">
+                <a:solidFill>
+                  <a:srgbClr val="0070C0"/>
+                </a:solidFill>
+              </a:rPr>
+              <a:t>youtube</a:t>
+            </a:r>
+            <a:r>
+              <a:rPr lang="en-GB" sz="2800" dirty="0">
+                <a:solidFill>
+                  <a:srgbClr val="0070C0"/>
+                </a:solidFill>
+              </a:rPr>
+              <a:t>: https://</a:t>
+            </a:r>
+            <a:r>
+              <a:rPr lang="en-GB" sz="2800" dirty="0" err="1">
+                <a:solidFill>
+                  <a:srgbClr val="0070C0"/>
+                </a:solidFill>
+              </a:rPr>
+              <a:t>youtu.be</a:t>
+            </a:r>
+            <a:r>
+              <a:rPr lang="en-GB" sz="2800" dirty="0">
+                <a:solidFill>
+                  <a:srgbClr val="0070C0"/>
+                </a:solidFill>
+              </a:rPr>
+              <a:t>/SWYqp7iY_Tc</a:t>
+            </a:r>
           </a:p>
           <a:p>
             <a:pPr marL="285750" indent="-285750">
@@ -5435,50 +5386,61 @@
                   <a:srgbClr val="0070C0"/>
                 </a:solidFill>
               </a:rPr>
-              <a:t>you may not always want to use the latest version of a software. </a:t>
-            </a:r>
-            <a:endParaRPr lang="pl-PL" sz="2800" dirty="0" smtClean="0">
-              <a:solidFill>
-                <a:srgbClr val="0070C0"/>
-              </a:solidFill>
-            </a:endParaRPr>
+              <a:t>Learn git branching: https://</a:t>
+            </a:r>
+            <a:r>
+              <a:rPr lang="en-GB" sz="2800" dirty="0" err="1">
+                <a:solidFill>
+                  <a:srgbClr val="0070C0"/>
+                </a:solidFill>
+              </a:rPr>
+              <a:t>learngitbranching.js.org</a:t>
+            </a:r>
+            <a:r>
+              <a:rPr lang="en-GB" sz="2800" dirty="0">
+                <a:solidFill>
+                  <a:srgbClr val="0070C0"/>
+                </a:solidFill>
+              </a:rPr>
+              <a:t>/</a:t>
+            </a:r>
           </a:p>
           <a:p>
             <a:pPr marL="285750" indent="-285750">
               <a:buFont typeface="Arial" panose="020B0604020202020204" pitchFamily="34" charset="0"/>
               <a:buChar char="•"/>
             </a:pPr>
-            <a:endParaRPr lang="pl-PL" sz="2800" dirty="0" smtClean="0">
-              <a:solidFill>
-                <a:srgbClr val="0070C0"/>
-              </a:solidFill>
-            </a:endParaRPr>
-          </a:p>
-          <a:p>
-            <a:pPr marL="285750" indent="-285750">
-              <a:buFont typeface="Arial" panose="020B0604020202020204" pitchFamily="34" charset="0"/>
-              <a:buChar char="•"/>
-            </a:pPr>
             <a:r>
               <a:rPr lang="en-GB" sz="2800" dirty="0">
                 <a:solidFill>
                   <a:srgbClr val="0070C0"/>
                 </a:solidFill>
               </a:rPr>
-              <a:t>the potential issue when using the “newest version” of a library is well known and called “dependency hell”. </a:t>
-            </a:r>
-            <a:endParaRPr lang="pl-PL" sz="2800" dirty="0">
-              <a:solidFill>
-                <a:srgbClr val="0070C0"/>
-              </a:solidFill>
-            </a:endParaRPr>
+              <a:t>Learn git-game: https://</a:t>
+            </a:r>
+            <a:r>
+              <a:rPr lang="en-GB" sz="2800" dirty="0" err="1">
+                <a:solidFill>
+                  <a:srgbClr val="0070C0"/>
+                </a:solidFill>
+              </a:rPr>
+              <a:t>github.com</a:t>
+            </a:r>
+            <a:r>
+              <a:rPr lang="en-GB" sz="2800" dirty="0">
+                <a:solidFill>
+                  <a:srgbClr val="0070C0"/>
+                </a:solidFill>
+              </a:rPr>
+              <a:t>/git-game/git-game</a:t>
+            </a:r>
           </a:p>
         </p:txBody>
       </p:sp>
     </p:spTree>
     <p:extLst>
       <p:ext uri="{BB962C8B-B14F-4D97-AF65-F5344CB8AC3E}">
-        <p14:creationId xmlns:p14="http://schemas.microsoft.com/office/powerpoint/2010/main" val="3399400293"/>
+        <p14:creationId xmlns:p14="http://schemas.microsoft.com/office/powerpoint/2010/main" val="149368189"/>
       </p:ext>
     </p:extLst>
   </p:cSld>
@@ -5552,57 +5514,22 @@
           </a:extLst>
         </p:spPr>
       </p:pic>
-      <p:pic>
-        <p:nvPicPr>
-          <p:cNvPr id="3" name="Picture 2" descr="Diagram&#10;&#10;Description automatically generated">
-            <a:extLst>
-              <a:ext uri="{FF2B5EF4-FFF2-40B4-BE49-F238E27FC236}">
-                <a16:creationId xmlns:a16="http://schemas.microsoft.com/office/drawing/2014/main" id="{123E5C8E-6DF3-BA4D-A341-65A34873C501}"/>
-              </a:ext>
-            </a:extLst>
-          </p:cNvPr>
-          <p:cNvPicPr>
-            <a:picLocks noChangeAspect="1"/>
-          </p:cNvPicPr>
+      <p:sp>
+        <p:nvSpPr>
+          <p:cNvPr id="4" name="TextBox 3">
+            <a:extLst>
+              <a:ext uri="{FF2B5EF4-FFF2-40B4-BE49-F238E27FC236}">
+                <a16:creationId xmlns:a16="http://schemas.microsoft.com/office/drawing/2014/main" id="{F4B0FDD5-5348-354F-A378-7241F2AF057B}"/>
+              </a:ext>
+            </a:extLst>
+          </p:cNvPr>
+          <p:cNvSpPr txBox="1"/>
           <p:nvPr/>
-        </p:nvPicPr>
-        <p:blipFill rotWithShape="1">
-          <a:blip r:embed="rId3">
-            <a:extLst>
-              <a:ext uri="{28A0092B-C50C-407E-A947-70E740481C1C}">
-                <a14:useLocalDpi xmlns:a14="http://schemas.microsoft.com/office/drawing/2010/main" val="0"/>
-              </a:ext>
-            </a:extLst>
-          </a:blip>
-          <a:srcRect b="4944"/>
-          <a:stretch/>
-        </p:blipFill>
+        </p:nvSpPr>
         <p:spPr>
           <a:xfrm>
-            <a:off x="2864504" y="2019182"/>
-            <a:ext cx="6697705" cy="2996987"/>
-          </a:xfrm>
-          <a:prstGeom prst="rect">
-            <a:avLst/>
-          </a:prstGeom>
-        </p:spPr>
-      </p:pic>
-      <p:sp>
-        <p:nvSpPr>
-          <p:cNvPr id="4" name="TextBox 3">
-            <a:extLst>
-              <a:ext uri="{FF2B5EF4-FFF2-40B4-BE49-F238E27FC236}">
-                <a16:creationId xmlns:a16="http://schemas.microsoft.com/office/drawing/2014/main" id="{F4B0FDD5-5348-354F-A378-7241F2AF057B}"/>
-              </a:ext>
-            </a:extLst>
-          </p:cNvPr>
-          <p:cNvSpPr txBox="1"/>
-          <p:nvPr/>
-        </p:nvSpPr>
-        <p:spPr>
-          <a:xfrm>
-            <a:off x="6041348" y="379920"/>
-            <a:ext cx="4779322" cy="769441"/>
+            <a:off x="777240" y="379920"/>
+            <a:ext cx="10043430" cy="769441"/>
           </a:xfrm>
           <a:prstGeom prst="rect">
             <a:avLst/>
@@ -5610,7 +5537,7 @@
           <a:noFill/>
         </p:spPr>
         <p:txBody>
-          <a:bodyPr wrap="none" rtlCol="0">
+          <a:bodyPr wrap="square" rtlCol="0">
             <a:spAutoFit/>
           </a:bodyPr>
           <a:lstStyle/>
@@ -5627,10 +5554,163 @@
           </a:p>
         </p:txBody>
       </p:sp>
+      <p:sp>
+        <p:nvSpPr>
+          <p:cNvPr id="7" name="Rectangle 6">
+            <a:extLst>
+              <a:ext uri="{FF2B5EF4-FFF2-40B4-BE49-F238E27FC236}">
+                <a16:creationId xmlns:a16="http://schemas.microsoft.com/office/drawing/2014/main" id="{7AAE078A-6B0F-0A4D-8D08-92C32F04F022}"/>
+              </a:ext>
+            </a:extLst>
+          </p:cNvPr>
+          <p:cNvSpPr/>
+          <p:nvPr/>
+        </p:nvSpPr>
+        <p:spPr>
+          <a:xfrm>
+            <a:off x="978965" y="2088855"/>
+            <a:ext cx="10195715" cy="3970318"/>
+          </a:xfrm>
+          <a:prstGeom prst="rect">
+            <a:avLst/>
+          </a:prstGeom>
+        </p:spPr>
+        <p:txBody>
+          <a:bodyPr wrap="square">
+            <a:spAutoFit/>
+          </a:bodyPr>
+          <a:lstStyle/>
+          <a:p>
+            <a:pPr marL="285750" indent="-285750">
+              <a:buFont typeface="Arial" panose="020B0604020202020204" pitchFamily="34" charset="0"/>
+              <a:buChar char="•"/>
+            </a:pPr>
+            <a:r>
+              <a:rPr lang="en-GB" sz="2800" dirty="0">
+                <a:solidFill>
+                  <a:srgbClr val="0070C0"/>
+                </a:solidFill>
+              </a:rPr>
+              <a:t>a particular point in time (a set of changes) has its logical </a:t>
+            </a:r>
+            <a:r>
+              <a:rPr lang="en-GB" sz="2800" dirty="0" smtClean="0">
+                <a:solidFill>
+                  <a:srgbClr val="0070C0"/>
+                </a:solidFill>
+              </a:rPr>
+              <a:t>meaning</a:t>
+            </a:r>
+            <a:endParaRPr lang="pl-PL" sz="2800" dirty="0" smtClean="0">
+              <a:solidFill>
+                <a:srgbClr val="0070C0"/>
+              </a:solidFill>
+            </a:endParaRPr>
+          </a:p>
+          <a:p>
+            <a:pPr marL="285750" indent="-285750">
+              <a:buFont typeface="Arial" panose="020B0604020202020204" pitchFamily="34" charset="0"/>
+              <a:buChar char="•"/>
+            </a:pPr>
+            <a:endParaRPr lang="pl-PL" sz="2800" dirty="0">
+              <a:solidFill>
+                <a:srgbClr val="0070C0"/>
+              </a:solidFill>
+            </a:endParaRPr>
+          </a:p>
+          <a:p>
+            <a:pPr marL="285750" indent="-285750">
+              <a:buFont typeface="Arial" panose="020B0604020202020204" pitchFamily="34" charset="0"/>
+              <a:buChar char="•"/>
+            </a:pPr>
+            <a:r>
+              <a:rPr lang="en-GB" sz="2800" dirty="0">
+                <a:solidFill>
+                  <a:srgbClr val="0070C0"/>
+                </a:solidFill>
+              </a:rPr>
+              <a:t>the “official” point in time (especially if it is meant to be consumed by others) is called release</a:t>
+            </a:r>
+            <a:r>
+              <a:rPr lang="en-GB" sz="2800" dirty="0" smtClean="0">
+                <a:solidFill>
+                  <a:srgbClr val="0070C0"/>
+                </a:solidFill>
+              </a:rPr>
+              <a:t>.</a:t>
+            </a:r>
+            <a:endParaRPr lang="pl-PL" sz="2800" dirty="0" smtClean="0">
+              <a:solidFill>
+                <a:srgbClr val="0070C0"/>
+              </a:solidFill>
+            </a:endParaRPr>
+          </a:p>
+          <a:p>
+            <a:pPr marL="285750" indent="-285750">
+              <a:buFont typeface="Arial" panose="020B0604020202020204" pitchFamily="34" charset="0"/>
+              <a:buChar char="•"/>
+            </a:pPr>
+            <a:endParaRPr lang="en-GB" sz="2800" dirty="0">
+              <a:solidFill>
+                <a:srgbClr val="0070C0"/>
+              </a:solidFill>
+            </a:endParaRPr>
+          </a:p>
+          <a:p>
+            <a:pPr marL="285750" indent="-285750">
+              <a:buFont typeface="Arial" panose="020B0604020202020204" pitchFamily="34" charset="0"/>
+              <a:buChar char="•"/>
+            </a:pPr>
+            <a:r>
+              <a:rPr lang="en-GB" sz="2800" dirty="0">
+                <a:solidFill>
+                  <a:srgbClr val="0070C0"/>
+                </a:solidFill>
+              </a:rPr>
+              <a:t>you may not always want to use the latest version of a software. </a:t>
+            </a:r>
+            <a:endParaRPr lang="pl-PL" sz="2800" dirty="0" smtClean="0">
+              <a:solidFill>
+                <a:srgbClr val="0070C0"/>
+              </a:solidFill>
+            </a:endParaRPr>
+          </a:p>
+          <a:p>
+            <a:pPr marL="285750" indent="-285750">
+              <a:buFont typeface="Arial" panose="020B0604020202020204" pitchFamily="34" charset="0"/>
+              <a:buChar char="•"/>
+            </a:pPr>
+            <a:endParaRPr lang="pl-PL" sz="2800" dirty="0" smtClean="0">
+              <a:solidFill>
+                <a:srgbClr val="0070C0"/>
+              </a:solidFill>
+            </a:endParaRPr>
+          </a:p>
+          <a:p>
+            <a:pPr marL="285750" indent="-285750">
+              <a:buFont typeface="Arial" panose="020B0604020202020204" pitchFamily="34" charset="0"/>
+              <a:buChar char="•"/>
+            </a:pPr>
+            <a:r>
+              <a:rPr lang="en-GB" sz="2800" dirty="0">
+                <a:solidFill>
+                  <a:srgbClr val="0070C0"/>
+                </a:solidFill>
+              </a:rPr>
+              <a:t>the potential issue when using the “newest version” of a library is well known and called “dependency hell”. </a:t>
+            </a:r>
+            <a:endParaRPr lang="pl-PL" sz="2800" dirty="0">
+              <a:solidFill>
+                <a:srgbClr val="0070C0"/>
+              </a:solidFill>
+            </a:endParaRPr>
+          </a:p>
+        </p:txBody>
+      </p:sp>
     </p:spTree>
     <p:extLst>
       <p:ext uri="{BB962C8B-B14F-4D97-AF65-F5344CB8AC3E}">
-        <p14:creationId xmlns:p14="http://schemas.microsoft.com/office/powerpoint/2010/main" val="2081516040"/>
+        <p14:creationId xmlns:p14="http://schemas.microsoft.com/office/powerpoint/2010/main" val="3399400293"/>
       </p:ext>
     </p:extLst>
   </p:cSld>
@@ -5659,42 +5739,6 @@
       </p:grpSpPr>
       <p:pic>
         <p:nvPicPr>
-          <p:cNvPr id="8" name="Picture 7" descr="Diagram&#10;&#10;Description automatically generated with medium confidence">
-            <a:extLst>
-              <a:ext uri="{FF2B5EF4-FFF2-40B4-BE49-F238E27FC236}">
-                <a16:creationId xmlns:a16="http://schemas.microsoft.com/office/drawing/2014/main" id="{241EA632-9D85-9640-A37E-8140E49B7B2C}"/>
-              </a:ext>
-            </a:extLst>
-          </p:cNvPr>
-          <p:cNvPicPr>
-            <a:picLocks noChangeAspect="1"/>
-          </p:cNvPicPr>
-          <p:nvPr/>
-        </p:nvPicPr>
-        <p:blipFill>
-          <a:blip r:embed="rId2">
-            <a:extLst>
-              <a:ext uri="{28A0092B-C50C-407E-A947-70E740481C1C}">
-                <a14:useLocalDpi xmlns:a14="http://schemas.microsoft.com/office/drawing/2010/main" val="0"/>
-              </a:ext>
-            </a:extLst>
-          </a:blip>
-          <a:stretch>
-            <a:fillRect/>
-          </a:stretch>
-        </p:blipFill>
-        <p:spPr>
-          <a:xfrm>
-            <a:off x="2254977" y="1942014"/>
-            <a:ext cx="6697705" cy="4090981"/>
-          </a:xfrm>
-          <a:prstGeom prst="rect">
-            <a:avLst/>
-          </a:prstGeom>
-        </p:spPr>
-      </p:pic>
-      <p:pic>
-        <p:nvPicPr>
           <p:cNvPr id="6" name="Picture 2" descr="Ed_DaSH">
             <a:extLst>
               <a:ext uri="{FF2B5EF4-FFF2-40B4-BE49-F238E27FC236}">
@@ -5708,7 +5752,7 @@
           <p:nvPr/>
         </p:nvPicPr>
         <p:blipFill>
-          <a:blip r:embed="rId3" cstate="hqprint">
+          <a:blip r:embed="rId2" cstate="hqprint">
             <a:extLst>
               <a:ext uri="{28A0092B-C50C-407E-A947-70E740481C1C}">
                 <a14:useLocalDpi xmlns:a14="http://schemas.microsoft.com/office/drawing/2010/main" val="0"/>
@@ -5740,6 +5784,41 @@
           </a:extLst>
         </p:spPr>
       </p:pic>
+      <p:pic>
+        <p:nvPicPr>
+          <p:cNvPr id="3" name="Picture 2" descr="Diagram&#10;&#10;Description automatically generated">
+            <a:extLst>
+              <a:ext uri="{FF2B5EF4-FFF2-40B4-BE49-F238E27FC236}">
+                <a16:creationId xmlns:a16="http://schemas.microsoft.com/office/drawing/2014/main" id="{123E5C8E-6DF3-BA4D-A341-65A34873C501}"/>
+              </a:ext>
+            </a:extLst>
+          </p:cNvPr>
+          <p:cNvPicPr>
+            <a:picLocks noChangeAspect="1"/>
+          </p:cNvPicPr>
+          <p:nvPr/>
+        </p:nvPicPr>
+        <p:blipFill rotWithShape="1">
+          <a:blip r:embed="rId3">
+            <a:extLst>
+              <a:ext uri="{28A0092B-C50C-407E-A947-70E740481C1C}">
+                <a14:useLocalDpi xmlns:a14="http://schemas.microsoft.com/office/drawing/2010/main" val="0"/>
+              </a:ext>
+            </a:extLst>
+          </a:blip>
+          <a:srcRect b="4944"/>
+          <a:stretch/>
+        </p:blipFill>
+        <p:spPr>
+          <a:xfrm>
+            <a:off x="2864504" y="2019182"/>
+            <a:ext cx="6697705" cy="2996987"/>
+          </a:xfrm>
+          <a:prstGeom prst="rect">
+            <a:avLst/>
+          </a:prstGeom>
+        </p:spPr>
+      </p:pic>
       <p:sp>
         <p:nvSpPr>
           <p:cNvPr id="4" name="TextBox 3">
@@ -5783,7 +5862,7 @@
     </p:spTree>
     <p:extLst>
       <p:ext uri="{BB962C8B-B14F-4D97-AF65-F5344CB8AC3E}">
-        <p14:creationId xmlns:p14="http://schemas.microsoft.com/office/powerpoint/2010/main" val="1474349348"/>
+        <p14:creationId xmlns:p14="http://schemas.microsoft.com/office/powerpoint/2010/main" val="2081516040"/>
       </p:ext>
     </p:extLst>
   </p:cSld>
@@ -5812,6 +5891,42 @@
       </p:grpSpPr>
       <p:pic>
         <p:nvPicPr>
+          <p:cNvPr id="8" name="Picture 7" descr="Diagram&#10;&#10;Description automatically generated with medium confidence">
+            <a:extLst>
+              <a:ext uri="{FF2B5EF4-FFF2-40B4-BE49-F238E27FC236}">
+                <a16:creationId xmlns:a16="http://schemas.microsoft.com/office/drawing/2014/main" id="{241EA632-9D85-9640-A37E-8140E49B7B2C}"/>
+              </a:ext>
+            </a:extLst>
+          </p:cNvPr>
+          <p:cNvPicPr>
+            <a:picLocks noChangeAspect="1"/>
+          </p:cNvPicPr>
+          <p:nvPr/>
+        </p:nvPicPr>
+        <p:blipFill>
+          <a:blip r:embed="rId2">
+            <a:extLst>
+              <a:ext uri="{28A0092B-C50C-407E-A947-70E740481C1C}">
+                <a14:useLocalDpi xmlns:a14="http://schemas.microsoft.com/office/drawing/2010/main" val="0"/>
+              </a:ext>
+            </a:extLst>
+          </a:blip>
+          <a:stretch>
+            <a:fillRect/>
+          </a:stretch>
+        </p:blipFill>
+        <p:spPr>
+          <a:xfrm>
+            <a:off x="1186671" y="1942014"/>
+            <a:ext cx="6697705" cy="4090981"/>
+          </a:xfrm>
+          <a:prstGeom prst="rect">
+            <a:avLst/>
+          </a:prstGeom>
+        </p:spPr>
+      </p:pic>
+      <p:pic>
+        <p:nvPicPr>
           <p:cNvPr id="6" name="Picture 2" descr="Ed_DaSH">
             <a:extLst>
               <a:ext uri="{FF2B5EF4-FFF2-40B4-BE49-F238E27FC236}">
@@ -5825,7 +5940,7 @@
           <p:nvPr/>
         </p:nvPicPr>
         <p:blipFill>
-          <a:blip r:embed="rId2" cstate="hqprint">
+          <a:blip r:embed="rId3" cstate="hqprint">
             <a:extLst>
               <a:ext uri="{28A0092B-C50C-407E-A947-70E740481C1C}">
                 <a14:useLocalDpi xmlns:a14="http://schemas.microsoft.com/office/drawing/2010/main" val="0"/>
@@ -5899,115 +6014,165 @@
       </p:sp>
       <p:sp>
         <p:nvSpPr>
-          <p:cNvPr id="5" name="Rectangle 4">
-            <a:extLst>
-              <a:ext uri="{FF2B5EF4-FFF2-40B4-BE49-F238E27FC236}">
-                <a16:creationId xmlns:a16="http://schemas.microsoft.com/office/drawing/2014/main" id="{7AAE078A-6B0F-0A4D-8D08-92C32F04F022}"/>
-              </a:ext>
-            </a:extLst>
-          </p:cNvPr>
+          <p:cNvPr id="2" name="Rectangle 1"/>
           <p:cNvSpPr/>
           <p:nvPr/>
         </p:nvSpPr>
         <p:spPr>
           <a:xfrm>
-            <a:off x="978965" y="2088855"/>
-            <a:ext cx="10195715" cy="2677656"/>
+            <a:off x="8446883" y="2073244"/>
+            <a:ext cx="2716040" cy="1113576"/>
           </a:xfrm>
           <a:prstGeom prst="rect">
             <a:avLst/>
           </a:prstGeom>
+          <a:solidFill>
+            <a:schemeClr val="accent1">
+              <a:lumMod val="60000"/>
+              <a:lumOff val="40000"/>
+            </a:schemeClr>
+          </a:solidFill>
         </p:spPr>
-        <p:txBody>
-          <a:bodyPr wrap="square">
-            <a:spAutoFit/>
-          </a:bodyPr>
+        <p:style>
+          <a:lnRef idx="2">
+            <a:schemeClr val="accent1">
+              <a:shade val="50000"/>
+            </a:schemeClr>
+          </a:lnRef>
+          <a:fillRef idx="1">
+            <a:schemeClr val="accent1"/>
+          </a:fillRef>
+          <a:effectRef idx="0">
+            <a:schemeClr val="accent1"/>
+          </a:effectRef>
+          <a:fontRef idx="minor">
+            <a:schemeClr val="lt1"/>
+          </a:fontRef>
+        </p:style>
+        <p:txBody>
+          <a:bodyPr rtlCol="0" anchor="ctr"/>
           <a:lstStyle/>
           <a:p>
-            <a:r>
-              <a:rPr lang="sv-SE" sz="2800" dirty="0">
-                <a:solidFill>
-                  <a:srgbClr val="0070C0"/>
-                </a:solidFill>
-                <a:latin typeface="Courier New" panose="02070309020205020404" pitchFamily="49" charset="0"/>
-                <a:cs typeface="Courier New" panose="02070309020205020404" pitchFamily="49" charset="0"/>
-              </a:rPr>
-              <a:t>1.91.12</a:t>
-            </a:r>
-          </a:p>
-          <a:p>
-            <a:r>
-              <a:rPr lang="sv-SE" sz="2800" dirty="0">
-                <a:solidFill>
-                  <a:srgbClr val="0070C0"/>
-                </a:solidFill>
-                <a:latin typeface="Courier New" panose="02070309020205020404" pitchFamily="49" charset="0"/>
-                <a:cs typeface="Courier New" panose="02070309020205020404" pitchFamily="49" charset="0"/>
-              </a:rPr>
-              <a:t>1.91.8</a:t>
-            </a:r>
-          </a:p>
-          <a:p>
-            <a:r>
-              <a:rPr lang="sv-SE" sz="2800" dirty="0">
-                <a:solidFill>
-                  <a:srgbClr val="0070C0"/>
-                </a:solidFill>
-                <a:latin typeface="Courier New" panose="02070309020205020404" pitchFamily="49" charset="0"/>
-                <a:cs typeface="Courier New" panose="02070309020205020404" pitchFamily="49" charset="0"/>
-              </a:rPr>
-              <a:t>2.13.3-alpha </a:t>
-            </a:r>
-          </a:p>
-          <a:p>
-            <a:r>
-              <a:rPr lang="sv-SE" sz="2800" dirty="0">
-                <a:solidFill>
-                  <a:srgbClr val="0070C0"/>
-                </a:solidFill>
-                <a:latin typeface="Courier New" panose="02070309020205020404" pitchFamily="49" charset="0"/>
-                <a:cs typeface="Courier New" panose="02070309020205020404" pitchFamily="49" charset="0"/>
-              </a:rPr>
-              <a:t>2.14-alpha </a:t>
-            </a:r>
-          </a:p>
-          <a:p>
-            <a:r>
-              <a:rPr lang="sv-SE" sz="2800" dirty="0">
-                <a:solidFill>
-                  <a:srgbClr val="0070C0"/>
-                </a:solidFill>
-                <a:latin typeface="Courier New" panose="02070309020205020404" pitchFamily="49" charset="0"/>
-                <a:cs typeface="Courier New" panose="02070309020205020404" pitchFamily="49" charset="0"/>
-              </a:rPr>
-              <a:t>2.15-beta</a:t>
-            </a:r>
-          </a:p>
-          <a:p>
-            <a:r>
-              <a:rPr lang="sv-SE" sz="2800" dirty="0">
-                <a:solidFill>
-                  <a:srgbClr val="0070C0"/>
-                </a:solidFill>
-                <a:latin typeface="Courier New" panose="02070309020205020404" pitchFamily="49" charset="0"/>
-                <a:cs typeface="Courier New" panose="02070309020205020404" pitchFamily="49" charset="0"/>
-              </a:rPr>
-              <a:t>3.0.923</a:t>
-            </a:r>
-            <a:endParaRPr lang="pl-PL" sz="2800" dirty="0">
-              <a:solidFill>
-                <a:srgbClr val="0070C0"/>
-              </a:solidFill>
-              <a:latin typeface="Courier New" panose="02070309020205020404" pitchFamily="49" charset="0"/>
-              <a:cs typeface="Courier New" panose="02070309020205020404" pitchFamily="49" charset="0"/>
-            </a:endParaRPr>
+            <a:pPr algn="ctr"/>
+            <a:r>
+              <a:rPr lang="pl-PL" dirty="0" smtClean="0"/>
+              <a:t>for small edits </a:t>
+            </a:r>
+          </a:p>
+          <a:p>
+            <a:pPr algn="ctr"/>
+            <a:r>
+              <a:rPr lang="pl-PL" dirty="0" smtClean="0"/>
+              <a:t>and corrections</a:t>
+            </a:r>
+            <a:endParaRPr lang="en-GB" dirty="0"/>
+          </a:p>
+        </p:txBody>
+      </p:sp>
+      <p:sp>
+        <p:nvSpPr>
+          <p:cNvPr id="7" name="Rectangle 6"/>
+          <p:cNvSpPr/>
+          <p:nvPr/>
+        </p:nvSpPr>
+        <p:spPr>
+          <a:xfrm>
+            <a:off x="8436326" y="3438802"/>
+            <a:ext cx="2716040" cy="1113576"/>
+          </a:xfrm>
+          <a:prstGeom prst="rect">
+            <a:avLst/>
+          </a:prstGeom>
+          <a:solidFill>
+            <a:schemeClr val="accent1">
+              <a:lumMod val="60000"/>
+              <a:lumOff val="40000"/>
+            </a:schemeClr>
+          </a:solidFill>
+        </p:spPr>
+        <p:style>
+          <a:lnRef idx="2">
+            <a:schemeClr val="accent1">
+              <a:shade val="50000"/>
+            </a:schemeClr>
+          </a:lnRef>
+          <a:fillRef idx="1">
+            <a:schemeClr val="accent1"/>
+          </a:fillRef>
+          <a:effectRef idx="0">
+            <a:schemeClr val="accent1"/>
+          </a:effectRef>
+          <a:fontRef idx="minor">
+            <a:schemeClr val="lt1"/>
+          </a:fontRef>
+        </p:style>
+        <p:txBody>
+          <a:bodyPr rtlCol="0" anchor="ctr"/>
+          <a:lstStyle/>
+          <a:p>
+            <a:pPr algn="ctr"/>
+            <a:r>
+              <a:rPr lang="pl-PL" dirty="0" smtClean="0"/>
+              <a:t>for adding new data or details</a:t>
+            </a:r>
+            <a:endParaRPr lang="en-GB" dirty="0"/>
+          </a:p>
+        </p:txBody>
+      </p:sp>
+      <p:sp>
+        <p:nvSpPr>
+          <p:cNvPr id="9" name="Rectangle 8"/>
+          <p:cNvSpPr/>
+          <p:nvPr/>
+        </p:nvSpPr>
+        <p:spPr>
+          <a:xfrm>
+            <a:off x="8443878" y="4831517"/>
+            <a:ext cx="2716040" cy="1113576"/>
+          </a:xfrm>
+          <a:prstGeom prst="rect">
+            <a:avLst/>
+          </a:prstGeom>
+          <a:solidFill>
+            <a:schemeClr val="accent1">
+              <a:lumMod val="60000"/>
+              <a:lumOff val="40000"/>
+            </a:schemeClr>
+          </a:solidFill>
+        </p:spPr>
+        <p:style>
+          <a:lnRef idx="2">
+            <a:schemeClr val="accent1">
+              <a:shade val="50000"/>
+            </a:schemeClr>
+          </a:lnRef>
+          <a:fillRef idx="1">
+            <a:schemeClr val="accent1"/>
+          </a:fillRef>
+          <a:effectRef idx="0">
+            <a:schemeClr val="accent1"/>
+          </a:effectRef>
+          <a:fontRef idx="minor">
+            <a:schemeClr val="lt1"/>
+          </a:fontRef>
+        </p:style>
+        <p:txBody>
+          <a:bodyPr rtlCol="0" anchor="ctr"/>
+          <a:lstStyle/>
+          <a:p>
+            <a:pPr algn="ctr"/>
+            <a:r>
+              <a:rPr lang="pl-PL" dirty="0" smtClean="0"/>
+              <a:t>for re-writes, reformating, renaming</a:t>
+            </a:r>
+            <a:endParaRPr lang="en-GB" dirty="0"/>
           </a:p>
         </p:txBody>
       </p:sp>
     </p:spTree>
     <p:extLst>
       <p:ext uri="{BB962C8B-B14F-4D97-AF65-F5344CB8AC3E}">
-        <p14:creationId xmlns:p14="http://schemas.microsoft.com/office/powerpoint/2010/main" val="310600574"/>
+        <p14:creationId xmlns:p14="http://schemas.microsoft.com/office/powerpoint/2010/main" val="1474349348"/>
       </p:ext>
     </p:extLst>
   </p:cSld>
@@ -6249,6 +6414,230 @@
         <p:spPr>
           <a:xfrm>
             <a:off x="978965" y="2088855"/>
+            <a:ext cx="10195715" cy="2677656"/>
+          </a:xfrm>
+          <a:prstGeom prst="rect">
+            <a:avLst/>
+          </a:prstGeom>
+        </p:spPr>
+        <p:txBody>
+          <a:bodyPr wrap="square">
+            <a:spAutoFit/>
+          </a:bodyPr>
+          <a:lstStyle/>
+          <a:p>
+            <a:r>
+              <a:rPr lang="sv-SE" sz="2800" dirty="0">
+                <a:solidFill>
+                  <a:srgbClr val="0070C0"/>
+                </a:solidFill>
+                <a:latin typeface="Courier New" panose="02070309020205020404" pitchFamily="49" charset="0"/>
+                <a:cs typeface="Courier New" panose="02070309020205020404" pitchFamily="49" charset="0"/>
+              </a:rPr>
+              <a:t>1.91.12</a:t>
+            </a:r>
+          </a:p>
+          <a:p>
+            <a:r>
+              <a:rPr lang="sv-SE" sz="2800" dirty="0">
+                <a:solidFill>
+                  <a:srgbClr val="0070C0"/>
+                </a:solidFill>
+                <a:latin typeface="Courier New" panose="02070309020205020404" pitchFamily="49" charset="0"/>
+                <a:cs typeface="Courier New" panose="02070309020205020404" pitchFamily="49" charset="0"/>
+              </a:rPr>
+              <a:t>1.91.8</a:t>
+            </a:r>
+          </a:p>
+          <a:p>
+            <a:r>
+              <a:rPr lang="sv-SE" sz="2800" dirty="0">
+                <a:solidFill>
+                  <a:srgbClr val="0070C0"/>
+                </a:solidFill>
+                <a:latin typeface="Courier New" panose="02070309020205020404" pitchFamily="49" charset="0"/>
+                <a:cs typeface="Courier New" panose="02070309020205020404" pitchFamily="49" charset="0"/>
+              </a:rPr>
+              <a:t>2.13.3-alpha </a:t>
+            </a:r>
+          </a:p>
+          <a:p>
+            <a:r>
+              <a:rPr lang="sv-SE" sz="2800" dirty="0">
+                <a:solidFill>
+                  <a:srgbClr val="0070C0"/>
+                </a:solidFill>
+                <a:latin typeface="Courier New" panose="02070309020205020404" pitchFamily="49" charset="0"/>
+                <a:cs typeface="Courier New" panose="02070309020205020404" pitchFamily="49" charset="0"/>
+              </a:rPr>
+              <a:t>2.14-alpha </a:t>
+            </a:r>
+          </a:p>
+          <a:p>
+            <a:r>
+              <a:rPr lang="sv-SE" sz="2800" dirty="0">
+                <a:solidFill>
+                  <a:srgbClr val="0070C0"/>
+                </a:solidFill>
+                <a:latin typeface="Courier New" panose="02070309020205020404" pitchFamily="49" charset="0"/>
+                <a:cs typeface="Courier New" panose="02070309020205020404" pitchFamily="49" charset="0"/>
+              </a:rPr>
+              <a:t>2.15-beta</a:t>
+            </a:r>
+          </a:p>
+          <a:p>
+            <a:r>
+              <a:rPr lang="sv-SE" sz="2800" dirty="0">
+                <a:solidFill>
+                  <a:srgbClr val="0070C0"/>
+                </a:solidFill>
+                <a:latin typeface="Courier New" panose="02070309020205020404" pitchFamily="49" charset="0"/>
+                <a:cs typeface="Courier New" panose="02070309020205020404" pitchFamily="49" charset="0"/>
+              </a:rPr>
+              <a:t>3.0.923</a:t>
+            </a:r>
+            <a:endParaRPr lang="pl-PL" sz="2800" dirty="0">
+              <a:solidFill>
+                <a:srgbClr val="0070C0"/>
+              </a:solidFill>
+              <a:latin typeface="Courier New" panose="02070309020205020404" pitchFamily="49" charset="0"/>
+              <a:cs typeface="Courier New" panose="02070309020205020404" pitchFamily="49" charset="0"/>
+            </a:endParaRPr>
+          </a:p>
+        </p:txBody>
+      </p:sp>
+    </p:spTree>
+    <p:extLst>
+      <p:ext uri="{BB962C8B-B14F-4D97-AF65-F5344CB8AC3E}">
+        <p14:creationId xmlns:p14="http://schemas.microsoft.com/office/powerpoint/2010/main" val="310600574"/>
+      </p:ext>
+    </p:extLst>
+  </p:cSld>
+  <p:clrMapOvr>
+    <a:masterClrMapping/>
+  </p:clrMapOvr>
+</p:sld>
+</file>
+
+<file path=ppt/slides/slide21.xml><?xml version="1.0" encoding="utf-8"?>
+<p:sld xmlns:a="http://schemas.openxmlformats.org/drawingml/2006/main" xmlns:r="http://schemas.openxmlformats.org/officeDocument/2006/relationships" xmlns:p="http://schemas.openxmlformats.org/presentationml/2006/main">
+  <p:cSld>
+    <p:spTree>
+      <p:nvGrpSpPr>
+        <p:cNvPr id="1" name=""/>
+        <p:cNvGrpSpPr/>
+        <p:nvPr/>
+      </p:nvGrpSpPr>
+      <p:grpSpPr>
+        <a:xfrm>
+          <a:off x="0" y="0"/>
+          <a:ext cx="0" cy="0"/>
+          <a:chOff x="0" y="0"/>
+          <a:chExt cx="0" cy="0"/>
+        </a:xfrm>
+      </p:grpSpPr>
+      <p:pic>
+        <p:nvPicPr>
+          <p:cNvPr id="6" name="Picture 2" descr="Ed_DaSH">
+            <a:extLst>
+              <a:ext uri="{FF2B5EF4-FFF2-40B4-BE49-F238E27FC236}">
+                <a16:creationId xmlns:a16="http://schemas.microsoft.com/office/drawing/2014/main" id="{6F3CF586-06D2-46C3-A4A3-130E31C4A16F}"/>
+              </a:ext>
+            </a:extLst>
+          </p:cNvPr>
+          <p:cNvPicPr>
+            <a:picLocks noChangeAspect="1" noChangeArrowheads="1"/>
+          </p:cNvPicPr>
+          <p:nvPr/>
+        </p:nvPicPr>
+        <p:blipFill>
+          <a:blip r:embed="rId2" cstate="hqprint">
+            <a:extLst>
+              <a:ext uri="{28A0092B-C50C-407E-A947-70E740481C1C}">
+                <a14:useLocalDpi xmlns:a14="http://schemas.microsoft.com/office/drawing/2010/main" val="0"/>
+              </a:ext>
+            </a:extLst>
+          </a:blip>
+          <a:srcRect/>
+          <a:stretch>
+            <a:fillRect/>
+          </a:stretch>
+        </p:blipFill>
+        <p:spPr bwMode="auto">
+          <a:xfrm>
+            <a:off x="10820670" y="5458691"/>
+            <a:ext cx="1289214" cy="1325418"/>
+          </a:xfrm>
+          <a:prstGeom prst="rect">
+            <a:avLst/>
+          </a:prstGeom>
+          <a:noFill/>
+          <a:extLst>
+            <a:ext uri="{909E8E84-426E-40DD-AFC4-6F175D3DCCD1}">
+              <a14:hiddenFill xmlns:a14="http://schemas.microsoft.com/office/drawing/2010/main">
+                <a:solidFill>
+                  <a:srgbClr val="FFFFFF"/>
+                </a:solidFill>
+              </a14:hiddenFill>
+            </a:ext>
+          </a:extLst>
+        </p:spPr>
+      </p:pic>
+      <p:sp>
+        <p:nvSpPr>
+          <p:cNvPr id="4" name="TextBox 3">
+            <a:extLst>
+              <a:ext uri="{FF2B5EF4-FFF2-40B4-BE49-F238E27FC236}">
+                <a16:creationId xmlns:a16="http://schemas.microsoft.com/office/drawing/2014/main" id="{F4B0FDD5-5348-354F-A378-7241F2AF057B}"/>
+              </a:ext>
+            </a:extLst>
+          </p:cNvPr>
+          <p:cNvSpPr txBox="1"/>
+          <p:nvPr/>
+        </p:nvSpPr>
+        <p:spPr>
+          <a:xfrm>
+            <a:off x="6041348" y="379920"/>
+            <a:ext cx="4779322" cy="769441"/>
+          </a:xfrm>
+          <a:prstGeom prst="rect">
+            <a:avLst/>
+          </a:prstGeom>
+          <a:noFill/>
+        </p:spPr>
+        <p:txBody>
+          <a:bodyPr wrap="none" rtlCol="0">
+            <a:spAutoFit/>
+          </a:bodyPr>
+          <a:lstStyle/>
+          <a:p>
+            <a:pPr algn="ctr"/>
+            <a:r>
+              <a:rPr lang="en-GB" sz="4400" dirty="0">
+                <a:solidFill>
+                  <a:srgbClr val="0070C0"/>
+                </a:solidFill>
+              </a:rPr>
+              <a:t>Semantic versioning</a:t>
+            </a:r>
+          </a:p>
+        </p:txBody>
+      </p:sp>
+      <p:sp>
+        <p:nvSpPr>
+          <p:cNvPr id="5" name="Rectangle 4">
+            <a:extLst>
+              <a:ext uri="{FF2B5EF4-FFF2-40B4-BE49-F238E27FC236}">
+                <a16:creationId xmlns:a16="http://schemas.microsoft.com/office/drawing/2014/main" id="{7AAE078A-6B0F-0A4D-8D08-92C32F04F022}"/>
+              </a:ext>
+            </a:extLst>
+          </p:cNvPr>
+          <p:cNvSpPr/>
+          <p:nvPr/>
+        </p:nvSpPr>
+        <p:spPr>
+          <a:xfrm>
+            <a:off x="978965" y="2088855"/>
             <a:ext cx="10195715" cy="523220"/>
           </a:xfrm>
           <a:prstGeom prst="rect">
@@ -6452,11 +6841,6 @@
               </a:rPr>
               <a:t>share and co-edit data or text file</a:t>
             </a:r>
-            <a:endParaRPr lang="en-GB" sz="2800" dirty="0">
-              <a:solidFill>
-                <a:srgbClr val="0070C0"/>
-              </a:solidFill>
-            </a:endParaRPr>
           </a:p>
         </p:txBody>
       </p:sp>
@@ -6887,11 +7271,6 @@
               </a:rPr>
               <a:t>to collate concurrent changes from collaborators e.g. “resolve conflicts”</a:t>
             </a:r>
-            <a:endParaRPr lang="en-GB" sz="2800" dirty="0">
-              <a:solidFill>
-                <a:srgbClr val="0070C0"/>
-              </a:solidFill>
-            </a:endParaRPr>
           </a:p>
         </p:txBody>
       </p:sp>
@@ -7008,11 +7387,6 @@
               </a:rPr>
               <a:t>Addressing those issues by tracking changes is called version control. .</a:t>
             </a:r>
-            <a:endParaRPr lang="en-GB" sz="2800" dirty="0">
-              <a:solidFill>
-                <a:srgbClr val="0070C0"/>
-              </a:solidFill>
-            </a:endParaRPr>
           </a:p>
           <a:p>
             <a:endParaRPr lang="en-GB" sz="2800" dirty="0">
@@ -7365,13 +7739,6 @@
               </a:rPr>
               <a:t>question about staph exposure (can be inferred from blood test results).</a:t>
             </a:r>
-            <a:endParaRPr lang="en-GB" sz="2000" dirty="0">
-              <a:solidFill>
-                <a:srgbClr val="0070C0"/>
-              </a:solidFill>
-              <a:latin typeface="Courier New" panose="02070309020205020404" pitchFamily="49" charset="0"/>
-              <a:cs typeface="Courier New" panose="02070309020205020404" pitchFamily="49" charset="0"/>
-            </a:endParaRPr>
           </a:p>
         </p:txBody>
       </p:sp>

</xml_diff>